<commit_message>
Added more slides involving the linux kernel structures.
</commit_message>
<xml_diff>
--- a/final_presentation.pptx
+++ b/final_presentation.pptx
@@ -5,18 +5,22 @@
     <p:sldMasterId id="2147483648" r:id="rId1"/>
   </p:sldMasterIdLst>
   <p:notesMasterIdLst>
-    <p:notesMasterId r:id="rId11"/>
+    <p:notesMasterId r:id="rId15"/>
   </p:notesMasterIdLst>
   <p:sldIdLst>
     <p:sldId id="256" r:id="rId2"/>
     <p:sldId id="257" r:id="rId3"/>
     <p:sldId id="258" r:id="rId4"/>
-    <p:sldId id="259" r:id="rId5"/>
-    <p:sldId id="263" r:id="rId6"/>
-    <p:sldId id="264" r:id="rId7"/>
-    <p:sldId id="260" r:id="rId8"/>
-    <p:sldId id="261" r:id="rId9"/>
-    <p:sldId id="262" r:id="rId10"/>
+    <p:sldId id="263" r:id="rId5"/>
+    <p:sldId id="264" r:id="rId6"/>
+    <p:sldId id="267" r:id="rId7"/>
+    <p:sldId id="266" r:id="rId8"/>
+    <p:sldId id="268" r:id="rId9"/>
+    <p:sldId id="259" r:id="rId10"/>
+    <p:sldId id="265" r:id="rId11"/>
+    <p:sldId id="260" r:id="rId12"/>
+    <p:sldId id="261" r:id="rId13"/>
+    <p:sldId id="262" r:id="rId14"/>
   </p:sldIdLst>
   <p:sldSz cx="9144000" cy="6858000" type="screen4x3"/>
   <p:notesSz cx="6858000" cy="9144000"/>
@@ -217,7 +221,7 @@
             <a:fld id="{8274FB44-D9BB-4AE5-A1A8-90C00510A7C0}" type="datetimeFigureOut">
               <a:rPr lang="en-US" smtClean="0"/>
               <a:pPr/>
-              <a:t>4/25/2016</a:t>
+              <a:t>4/26/2016</a:t>
             </a:fld>
             <a:endParaRPr lang="en-US"/>
           </a:p>
@@ -3479,6 +3483,581 @@
 </p:sld>
 </file>
 
+<file path=ppt/slides/slide10.xml><?xml version="1.0" encoding="utf-8"?>
+<p:sld xmlns:a="http://schemas.openxmlformats.org/drawingml/2006/main" xmlns:r="http://schemas.openxmlformats.org/officeDocument/2006/relationships" xmlns:p="http://schemas.openxmlformats.org/presentationml/2006/main">
+  <p:cSld>
+    <p:spTree>
+      <p:nvGrpSpPr>
+        <p:cNvPr id="1" name=""/>
+        <p:cNvGrpSpPr/>
+        <p:nvPr/>
+      </p:nvGrpSpPr>
+      <p:grpSpPr>
+        <a:xfrm>
+          <a:off x="0" y="0"/>
+          <a:ext cx="0" cy="0"/>
+          <a:chOff x="0" y="0"/>
+          <a:chExt cx="0" cy="0"/>
+        </a:xfrm>
+      </p:grpSpPr>
+      <p:sp>
+        <p:nvSpPr>
+          <p:cNvPr id="2" name="Title 1"/>
+          <p:cNvSpPr>
+            <a:spLocks noGrp="1"/>
+          </p:cNvSpPr>
+          <p:nvPr>
+            <p:ph type="title"/>
+          </p:nvPr>
+        </p:nvSpPr>
+        <p:spPr/>
+        <p:txBody>
+          <a:bodyPr/>
+          <a:lstStyle/>
+          <a:p>
+            <a:r>
+              <a:rPr lang="en-US" dirty="0" err="1" smtClean="0"/>
+              <a:t>Tskdmp</a:t>
+            </a:r>
+            <a:r>
+              <a:rPr lang="en-US" dirty="0" smtClean="0"/>
+              <a:t> Interface</a:t>
+            </a:r>
+            <a:endParaRPr lang="en-US" dirty="0"/>
+          </a:p>
+        </p:txBody>
+      </p:sp>
+      <p:sp>
+        <p:nvSpPr>
+          <p:cNvPr id="4" name="Footer Placeholder 3"/>
+          <p:cNvSpPr>
+            <a:spLocks noGrp="1"/>
+          </p:cNvSpPr>
+          <p:nvPr>
+            <p:ph type="ftr" sz="quarter" idx="11"/>
+          </p:nvPr>
+        </p:nvSpPr>
+        <p:spPr/>
+        <p:txBody>
+          <a:bodyPr/>
+          <a:lstStyle/>
+          <a:p>
+            <a:r>
+              <a:rPr lang="en-US" smtClean="0"/>
+              <a:t>CSE 522S – Advanced Operating Systems</a:t>
+            </a:r>
+            <a:endParaRPr lang="en-US" dirty="0"/>
+          </a:p>
+        </p:txBody>
+      </p:sp>
+      <p:sp>
+        <p:nvSpPr>
+          <p:cNvPr id="5" name="Slide Number Placeholder 4"/>
+          <p:cNvSpPr>
+            <a:spLocks noGrp="1"/>
+          </p:cNvSpPr>
+          <p:nvPr>
+            <p:ph type="sldNum" sz="quarter" idx="12"/>
+          </p:nvPr>
+        </p:nvSpPr>
+        <p:spPr/>
+        <p:txBody>
+          <a:bodyPr/>
+          <a:lstStyle/>
+          <a:p>
+            <a:fld id="{A773B20C-5347-4FF9-A9F0-76F937F60217}" type="slidenum">
+              <a:rPr lang="en-US" smtClean="0"/>
+              <a:pPr/>
+              <a:t>10</a:t>
+            </a:fld>
+            <a:endParaRPr lang="en-US"/>
+          </a:p>
+        </p:txBody>
+      </p:sp>
+      <p:sp>
+        <p:nvSpPr>
+          <p:cNvPr id="7" name="Content Placeholder 6"/>
+          <p:cNvSpPr>
+            <a:spLocks noGrp="1"/>
+          </p:cNvSpPr>
+          <p:nvPr>
+            <p:ph idx="1"/>
+          </p:nvPr>
+        </p:nvSpPr>
+        <p:spPr>
+          <a:xfrm>
+            <a:off x="457200" y="1600200"/>
+            <a:ext cx="4114800" cy="4525963"/>
+          </a:xfrm>
+        </p:spPr>
+        <p:txBody>
+          <a:bodyPr/>
+          <a:lstStyle/>
+          <a:p>
+            <a:endParaRPr lang="en-US" dirty="0"/>
+          </a:p>
+        </p:txBody>
+      </p:sp>
+      <p:pic>
+        <p:nvPicPr>
+          <p:cNvPr id="8" name="Picture 7"/>
+          <p:cNvPicPr>
+            <a:picLocks noChangeAspect="1"/>
+          </p:cNvPicPr>
+          <p:nvPr/>
+        </p:nvPicPr>
+        <p:blipFill>
+          <a:blip r:embed="rId2"/>
+          <a:stretch>
+            <a:fillRect/>
+          </a:stretch>
+        </p:blipFill>
+        <p:spPr>
+          <a:xfrm>
+            <a:off x="4714875" y="2057400"/>
+            <a:ext cx="3971925" cy="2943225"/>
+          </a:xfrm>
+          <a:prstGeom prst="rect">
+            <a:avLst/>
+          </a:prstGeom>
+        </p:spPr>
+      </p:pic>
+    </p:spTree>
+    <p:extLst>
+      <p:ext uri="{BB962C8B-B14F-4D97-AF65-F5344CB8AC3E}">
+        <p14:creationId xmlns:p14="http://schemas.microsoft.com/office/powerpoint/2010/main" val="2374119210"/>
+      </p:ext>
+    </p:extLst>
+  </p:cSld>
+  <p:clrMapOvr>
+    <a:masterClrMapping/>
+  </p:clrMapOvr>
+</p:sld>
+</file>
+
+<file path=ppt/slides/slide11.xml><?xml version="1.0" encoding="utf-8"?>
+<p:sld xmlns:a="http://schemas.openxmlformats.org/drawingml/2006/main" xmlns:r="http://schemas.openxmlformats.org/officeDocument/2006/relationships" xmlns:p="http://schemas.openxmlformats.org/presentationml/2006/main">
+  <p:cSld>
+    <p:spTree>
+      <p:nvGrpSpPr>
+        <p:cNvPr id="1" name=""/>
+        <p:cNvGrpSpPr/>
+        <p:nvPr/>
+      </p:nvGrpSpPr>
+      <p:grpSpPr>
+        <a:xfrm>
+          <a:off x="0" y="0"/>
+          <a:ext cx="0" cy="0"/>
+          <a:chOff x="0" y="0"/>
+          <a:chExt cx="0" cy="0"/>
+        </a:xfrm>
+      </p:grpSpPr>
+      <p:sp>
+        <p:nvSpPr>
+          <p:cNvPr id="2" name="Title 1"/>
+          <p:cNvSpPr>
+            <a:spLocks noGrp="1"/>
+          </p:cNvSpPr>
+          <p:nvPr>
+            <p:ph type="title"/>
+          </p:nvPr>
+        </p:nvSpPr>
+        <p:spPr/>
+        <p:txBody>
+          <a:bodyPr/>
+          <a:lstStyle/>
+          <a:p>
+            <a:r>
+              <a:rPr lang="en-US" dirty="0" smtClean="0"/>
+              <a:t>Challenges</a:t>
+            </a:r>
+            <a:endParaRPr lang="en-US" dirty="0"/>
+          </a:p>
+        </p:txBody>
+      </p:sp>
+      <p:sp>
+        <p:nvSpPr>
+          <p:cNvPr id="3" name="Content Placeholder 2"/>
+          <p:cNvSpPr>
+            <a:spLocks noGrp="1"/>
+          </p:cNvSpPr>
+          <p:nvPr>
+            <p:ph idx="1"/>
+          </p:nvPr>
+        </p:nvSpPr>
+        <p:spPr>
+          <a:xfrm>
+            <a:off x="457200" y="1219200"/>
+            <a:ext cx="8229600" cy="4525963"/>
+          </a:xfrm>
+        </p:spPr>
+        <p:txBody>
+          <a:bodyPr/>
+          <a:lstStyle/>
+          <a:p>
+            <a:r>
+              <a:rPr lang="en-US" dirty="0" smtClean="0"/>
+              <a:t>Kernel Synchronization</a:t>
+            </a:r>
+          </a:p>
+          <a:p>
+            <a:r>
+              <a:rPr lang="en-US" dirty="0" smtClean="0"/>
+              <a:t>Complex and Multi-tiered </a:t>
+            </a:r>
+            <a:r>
+              <a:rPr lang="en-US" dirty="0" err="1" smtClean="0"/>
+              <a:t>struct</a:t>
+            </a:r>
+            <a:r>
+              <a:rPr lang="en-US" dirty="0" smtClean="0"/>
+              <a:t> definitions</a:t>
+            </a:r>
+          </a:p>
+          <a:p>
+            <a:r>
+              <a:rPr lang="en-US" dirty="0" smtClean="0"/>
+              <a:t>Breadth of involved kernel sub-systems</a:t>
+            </a:r>
+          </a:p>
+          <a:p>
+            <a:r>
+              <a:rPr lang="en-US" dirty="0" smtClean="0"/>
+              <a:t>Kernel vs Module (symbol availability)</a:t>
+            </a:r>
+          </a:p>
+          <a:p>
+            <a:r>
+              <a:rPr lang="en-US" dirty="0" smtClean="0"/>
+              <a:t>Lack of formalized documentation on </a:t>
+            </a:r>
+            <a:r>
+              <a:rPr lang="en-US" dirty="0"/>
+              <a:t>L</a:t>
+            </a:r>
+            <a:r>
+              <a:rPr lang="en-US" dirty="0" smtClean="0"/>
+              <a:t>inux kernel</a:t>
+            </a:r>
+            <a:endParaRPr lang="en-US" dirty="0"/>
+          </a:p>
+        </p:txBody>
+      </p:sp>
+      <p:sp>
+        <p:nvSpPr>
+          <p:cNvPr id="4" name="Footer Placeholder 3"/>
+          <p:cNvSpPr>
+            <a:spLocks noGrp="1"/>
+          </p:cNvSpPr>
+          <p:nvPr>
+            <p:ph type="ftr" sz="quarter" idx="11"/>
+          </p:nvPr>
+        </p:nvSpPr>
+        <p:spPr/>
+        <p:txBody>
+          <a:bodyPr/>
+          <a:lstStyle/>
+          <a:p>
+            <a:r>
+              <a:rPr lang="en-US" smtClean="0"/>
+              <a:t>CSE 522S – Advanced Operating Systems</a:t>
+            </a:r>
+            <a:endParaRPr lang="en-US" dirty="0"/>
+          </a:p>
+        </p:txBody>
+      </p:sp>
+      <p:sp>
+        <p:nvSpPr>
+          <p:cNvPr id="5" name="Slide Number Placeholder 4"/>
+          <p:cNvSpPr>
+            <a:spLocks noGrp="1"/>
+          </p:cNvSpPr>
+          <p:nvPr>
+            <p:ph type="sldNum" sz="quarter" idx="12"/>
+          </p:nvPr>
+        </p:nvSpPr>
+        <p:spPr/>
+        <p:txBody>
+          <a:bodyPr/>
+          <a:lstStyle/>
+          <a:p>
+            <a:fld id="{A773B20C-5347-4FF9-A9F0-76F937F60217}" type="slidenum">
+              <a:rPr lang="en-US" smtClean="0"/>
+              <a:pPr/>
+              <a:t>11</a:t>
+            </a:fld>
+            <a:endParaRPr lang="en-US"/>
+          </a:p>
+        </p:txBody>
+      </p:sp>
+    </p:spTree>
+  </p:cSld>
+  <p:clrMapOvr>
+    <a:masterClrMapping/>
+  </p:clrMapOvr>
+  <p:timing>
+    <p:tnLst>
+      <p:par>
+        <p:cTn id="1" dur="indefinite" restart="never" nodeType="tmRoot"/>
+      </p:par>
+    </p:tnLst>
+  </p:timing>
+</p:sld>
+</file>
+
+<file path=ppt/slides/slide12.xml><?xml version="1.0" encoding="utf-8"?>
+<p:sld xmlns:a="http://schemas.openxmlformats.org/drawingml/2006/main" xmlns:r="http://schemas.openxmlformats.org/officeDocument/2006/relationships" xmlns:p="http://schemas.openxmlformats.org/presentationml/2006/main">
+  <p:cSld>
+    <p:spTree>
+      <p:nvGrpSpPr>
+        <p:cNvPr id="1" name=""/>
+        <p:cNvGrpSpPr/>
+        <p:nvPr/>
+      </p:nvGrpSpPr>
+      <p:grpSpPr>
+        <a:xfrm>
+          <a:off x="0" y="0"/>
+          <a:ext cx="0" cy="0"/>
+          <a:chOff x="0" y="0"/>
+          <a:chExt cx="0" cy="0"/>
+        </a:xfrm>
+      </p:grpSpPr>
+      <p:sp>
+        <p:nvSpPr>
+          <p:cNvPr id="2" name="Title 1"/>
+          <p:cNvSpPr>
+            <a:spLocks noGrp="1"/>
+          </p:cNvSpPr>
+          <p:nvPr>
+            <p:ph type="title"/>
+          </p:nvPr>
+        </p:nvSpPr>
+        <p:spPr/>
+        <p:txBody>
+          <a:bodyPr/>
+          <a:lstStyle/>
+          <a:p>
+            <a:r>
+              <a:rPr lang="en-US" dirty="0" smtClean="0"/>
+              <a:t>Lessons Learned</a:t>
+            </a:r>
+            <a:endParaRPr lang="en-US" dirty="0"/>
+          </a:p>
+        </p:txBody>
+      </p:sp>
+      <p:sp>
+        <p:nvSpPr>
+          <p:cNvPr id="4" name="Footer Placeholder 3"/>
+          <p:cNvSpPr>
+            <a:spLocks noGrp="1"/>
+          </p:cNvSpPr>
+          <p:nvPr>
+            <p:ph type="ftr" sz="quarter" idx="11"/>
+          </p:nvPr>
+        </p:nvSpPr>
+        <p:spPr/>
+        <p:txBody>
+          <a:bodyPr/>
+          <a:lstStyle/>
+          <a:p>
+            <a:r>
+              <a:rPr lang="en-US" smtClean="0"/>
+              <a:t>CSE 522S – Advanced Operating Systems</a:t>
+            </a:r>
+            <a:endParaRPr lang="en-US" dirty="0"/>
+          </a:p>
+        </p:txBody>
+      </p:sp>
+      <p:sp>
+        <p:nvSpPr>
+          <p:cNvPr id="5" name="Slide Number Placeholder 4"/>
+          <p:cNvSpPr>
+            <a:spLocks noGrp="1"/>
+          </p:cNvSpPr>
+          <p:nvPr>
+            <p:ph type="sldNum" sz="quarter" idx="12"/>
+          </p:nvPr>
+        </p:nvSpPr>
+        <p:spPr/>
+        <p:txBody>
+          <a:bodyPr/>
+          <a:lstStyle/>
+          <a:p>
+            <a:fld id="{A773B20C-5347-4FF9-A9F0-76F937F60217}" type="slidenum">
+              <a:rPr lang="en-US" smtClean="0"/>
+              <a:pPr/>
+              <a:t>12</a:t>
+            </a:fld>
+            <a:endParaRPr lang="en-US"/>
+          </a:p>
+        </p:txBody>
+      </p:sp>
+      <p:sp>
+        <p:nvSpPr>
+          <p:cNvPr id="42" name="Content Placeholder 2"/>
+          <p:cNvSpPr>
+            <a:spLocks noGrp="1"/>
+          </p:cNvSpPr>
+          <p:nvPr>
+            <p:ph idx="1"/>
+          </p:nvPr>
+        </p:nvSpPr>
+        <p:spPr>
+          <a:xfrm>
+            <a:off x="457200" y="1219200"/>
+            <a:ext cx="8229600" cy="4525963"/>
+          </a:xfrm>
+        </p:spPr>
+        <p:txBody>
+          <a:bodyPr>
+            <a:noAutofit/>
+          </a:bodyPr>
+          <a:lstStyle/>
+          <a:p>
+            <a:endParaRPr lang="en-US" sz="2400" dirty="0" smtClean="0"/>
+          </a:p>
+          <a:p>
+            <a:endParaRPr lang="en-US" sz="2400" dirty="0" smtClean="0"/>
+          </a:p>
+          <a:p>
+            <a:endParaRPr lang="en-US" sz="2400" dirty="0" smtClean="0"/>
+          </a:p>
+          <a:p>
+            <a:pPr>
+              <a:buNone/>
+            </a:pPr>
+            <a:endParaRPr lang="en-US" sz="2400" dirty="0" smtClean="0"/>
+          </a:p>
+        </p:txBody>
+      </p:sp>
+    </p:spTree>
+  </p:cSld>
+  <p:clrMapOvr>
+    <a:masterClrMapping/>
+  </p:clrMapOvr>
+</p:sld>
+</file>
+
+<file path=ppt/slides/slide13.xml><?xml version="1.0" encoding="utf-8"?>
+<p:sld xmlns:a="http://schemas.openxmlformats.org/drawingml/2006/main" xmlns:r="http://schemas.openxmlformats.org/officeDocument/2006/relationships" xmlns:p="http://schemas.openxmlformats.org/presentationml/2006/main">
+  <p:cSld>
+    <p:spTree>
+      <p:nvGrpSpPr>
+        <p:cNvPr id="1" name=""/>
+        <p:cNvGrpSpPr/>
+        <p:nvPr/>
+      </p:nvGrpSpPr>
+      <p:grpSpPr>
+        <a:xfrm>
+          <a:off x="0" y="0"/>
+          <a:ext cx="0" cy="0"/>
+          <a:chOff x="0" y="0"/>
+          <a:chExt cx="0" cy="0"/>
+        </a:xfrm>
+      </p:grpSpPr>
+      <p:sp>
+        <p:nvSpPr>
+          <p:cNvPr id="2" name="Title 1"/>
+          <p:cNvSpPr>
+            <a:spLocks noGrp="1"/>
+          </p:cNvSpPr>
+          <p:nvPr>
+            <p:ph type="title"/>
+          </p:nvPr>
+        </p:nvSpPr>
+        <p:spPr/>
+        <p:txBody>
+          <a:bodyPr/>
+          <a:lstStyle/>
+          <a:p>
+            <a:r>
+              <a:rPr lang="en-US" dirty="0" smtClean="0"/>
+              <a:t>Future Work</a:t>
+            </a:r>
+            <a:endParaRPr lang="en-US" dirty="0"/>
+          </a:p>
+        </p:txBody>
+      </p:sp>
+      <p:sp>
+        <p:nvSpPr>
+          <p:cNvPr id="3" name="Content Placeholder 2"/>
+          <p:cNvSpPr>
+            <a:spLocks noGrp="1"/>
+          </p:cNvSpPr>
+          <p:nvPr>
+            <p:ph idx="1"/>
+          </p:nvPr>
+        </p:nvSpPr>
+        <p:spPr/>
+        <p:txBody>
+          <a:bodyPr>
+            <a:normAutofit/>
+          </a:bodyPr>
+          <a:lstStyle/>
+          <a:p>
+            <a:pPr marL="514350" indent="-514350">
+              <a:buFont typeface="+mj-lt"/>
+              <a:buAutoNum type="arabicPeriod"/>
+            </a:pPr>
+            <a:endParaRPr lang="en-US" sz="2400" dirty="0"/>
+          </a:p>
+        </p:txBody>
+      </p:sp>
+      <p:sp>
+        <p:nvSpPr>
+          <p:cNvPr id="4" name="Footer Placeholder 3"/>
+          <p:cNvSpPr>
+            <a:spLocks noGrp="1"/>
+          </p:cNvSpPr>
+          <p:nvPr>
+            <p:ph type="ftr" sz="quarter" idx="11"/>
+          </p:nvPr>
+        </p:nvSpPr>
+        <p:spPr/>
+        <p:txBody>
+          <a:bodyPr/>
+          <a:lstStyle/>
+          <a:p>
+            <a:r>
+              <a:rPr lang="en-US" smtClean="0"/>
+              <a:t>CSE 522S – Advanced Operating Systems</a:t>
+            </a:r>
+            <a:endParaRPr lang="en-US" dirty="0"/>
+          </a:p>
+        </p:txBody>
+      </p:sp>
+      <p:sp>
+        <p:nvSpPr>
+          <p:cNvPr id="5" name="Slide Number Placeholder 4"/>
+          <p:cNvSpPr>
+            <a:spLocks noGrp="1"/>
+          </p:cNvSpPr>
+          <p:nvPr>
+            <p:ph type="sldNum" sz="quarter" idx="12"/>
+          </p:nvPr>
+        </p:nvSpPr>
+        <p:spPr/>
+        <p:txBody>
+          <a:bodyPr/>
+          <a:lstStyle/>
+          <a:p>
+            <a:fld id="{A773B20C-5347-4FF9-A9F0-76F937F60217}" type="slidenum">
+              <a:rPr lang="en-US" smtClean="0"/>
+              <a:pPr/>
+              <a:t>13</a:t>
+            </a:fld>
+            <a:endParaRPr lang="en-US"/>
+          </a:p>
+        </p:txBody>
+      </p:sp>
+    </p:spTree>
+  </p:cSld>
+  <p:clrMapOvr>
+    <a:masterClrMapping/>
+  </p:clrMapOvr>
+</p:sld>
+</file>
+
 <file path=ppt/slides/slide2.xml><?xml version="1.0" encoding="utf-8"?>
 <p:sld xmlns:a="http://schemas.openxmlformats.org/drawingml/2006/main" xmlns:r="http://schemas.openxmlformats.org/officeDocument/2006/relationships" xmlns:p="http://schemas.openxmlformats.org/presentationml/2006/main">
   <p:cSld>
@@ -3922,7 +4501,6 @@
               <a:rPr lang="en-US" sz="800" dirty="0"/>
               <a:t>http://www.kpcb.com/blog/three-boardroom-questions-every-cybersecurity-entrepreneur-must-answer</a:t>
             </a:r>
-            <a:endParaRPr lang="en-US" sz="800" dirty="0"/>
           </a:p>
         </p:txBody>
       </p:sp>
@@ -3975,9 +4553,117 @@
           <a:p>
             <a:r>
               <a:rPr lang="en-US" dirty="0" smtClean="0"/>
-              <a:t>Architecture</a:t>
+              <a:t>Linux </a:t>
+            </a:r>
+            <a:r>
+              <a:rPr lang="en-US" dirty="0" smtClean="0"/>
+              <a:t>Process</a:t>
             </a:r>
             <a:endParaRPr lang="en-US" dirty="0"/>
+          </a:p>
+        </p:txBody>
+      </p:sp>
+      <p:sp>
+        <p:nvSpPr>
+          <p:cNvPr id="3" name="Content Placeholder 2"/>
+          <p:cNvSpPr>
+            <a:spLocks noGrp="1"/>
+          </p:cNvSpPr>
+          <p:nvPr>
+            <p:ph idx="1"/>
+          </p:nvPr>
+        </p:nvSpPr>
+        <p:spPr>
+          <a:xfrm>
+            <a:off x="457200" y="1295400"/>
+            <a:ext cx="4419600" cy="4830763"/>
+          </a:xfrm>
+        </p:spPr>
+        <p:txBody>
+          <a:bodyPr>
+            <a:normAutofit/>
+          </a:bodyPr>
+          <a:lstStyle/>
+          <a:p>
+            <a:r>
+              <a:rPr lang="en-US" sz="1800" dirty="0" smtClean="0"/>
+              <a:t>Represented by the </a:t>
+            </a:r>
+            <a:r>
+              <a:rPr lang="en-US" sz="1800" dirty="0" err="1" smtClean="0"/>
+              <a:t>task_struct</a:t>
+            </a:r>
+            <a:endParaRPr lang="en-US" sz="1800" dirty="0" smtClean="0"/>
+          </a:p>
+          <a:p>
+            <a:r>
+              <a:rPr lang="en-US" sz="1800" dirty="0" smtClean="0"/>
+              <a:t>Processes </a:t>
+            </a:r>
+            <a:r>
+              <a:rPr lang="en-US" sz="1800" dirty="0" err="1" smtClean="0"/>
+              <a:t>task_structs</a:t>
+            </a:r>
+            <a:r>
+              <a:rPr lang="en-US" sz="1800" dirty="0" smtClean="0"/>
+              <a:t> are linked together</a:t>
+            </a:r>
+          </a:p>
+          <a:p>
+            <a:r>
+              <a:rPr lang="en-US" sz="1800" dirty="0" smtClean="0"/>
+              <a:t>Approximately 1700 bytes in size, much of which are pointers</a:t>
+            </a:r>
+          </a:p>
+          <a:p>
+            <a:r>
+              <a:rPr lang="en-US" sz="1800" dirty="0" smtClean="0"/>
+              <a:t>Included attributes touch many sub-systems in kernel</a:t>
+            </a:r>
+          </a:p>
+          <a:p>
+            <a:pPr lvl="1"/>
+            <a:r>
+              <a:rPr lang="en-US" sz="1600" dirty="0" smtClean="0"/>
+              <a:t>Memory Management Unit (MMU)</a:t>
+            </a:r>
+          </a:p>
+          <a:p>
+            <a:pPr lvl="1"/>
+            <a:r>
+              <a:rPr lang="en-US" sz="1600" dirty="0" smtClean="0"/>
+              <a:t>File System (FS)</a:t>
+            </a:r>
+          </a:p>
+          <a:p>
+            <a:pPr lvl="1"/>
+            <a:r>
+              <a:rPr lang="en-US" sz="1600" dirty="0" smtClean="0"/>
+              <a:t>Completely Fair Scheduler (CFS)</a:t>
+            </a:r>
+          </a:p>
+          <a:p>
+            <a:r>
+              <a:rPr lang="en-US" sz="1800" dirty="0" smtClean="0"/>
+              <a:t>Exported by the module when the “--task” command is provided to </a:t>
+            </a:r>
+            <a:r>
+              <a:rPr lang="en-US" sz="1800" dirty="0" err="1" smtClean="0"/>
+              <a:t>tskdmp</a:t>
+            </a:r>
+            <a:endParaRPr lang="en-US" sz="1800" dirty="0" smtClean="0"/>
+          </a:p>
+          <a:p>
+            <a:endParaRPr lang="en-US" sz="1800" dirty="0" smtClean="0"/>
+          </a:p>
+          <a:p>
+            <a:endParaRPr lang="en-US" sz="1800" dirty="0" smtClean="0"/>
+          </a:p>
+          <a:p>
+            <a:endParaRPr lang="en-US" sz="1800" dirty="0" smtClean="0"/>
+          </a:p>
+          <a:p>
+            <a:endParaRPr lang="en-US" sz="1800" dirty="0"/>
           </a:p>
         </p:txBody>
       </p:sp>
@@ -4023,6 +4709,2953 @@
               <a:rPr lang="en-US" smtClean="0"/>
               <a:pPr/>
               <a:t>4</a:t>
+            </a:fld>
+            <a:endParaRPr lang="en-US"/>
+          </a:p>
+        </p:txBody>
+      </p:sp>
+      <p:pic>
+        <p:nvPicPr>
+          <p:cNvPr id="7" name="Picture 6"/>
+          <p:cNvPicPr>
+            <a:picLocks noChangeAspect="1"/>
+          </p:cNvPicPr>
+          <p:nvPr/>
+        </p:nvPicPr>
+        <p:blipFill>
+          <a:blip r:embed="rId2"/>
+          <a:stretch>
+            <a:fillRect/>
+          </a:stretch>
+        </p:blipFill>
+        <p:spPr>
+          <a:xfrm>
+            <a:off x="5029200" y="1524000"/>
+            <a:ext cx="3829050" cy="4038600"/>
+          </a:xfrm>
+          <a:prstGeom prst="rect">
+            <a:avLst/>
+          </a:prstGeom>
+        </p:spPr>
+      </p:pic>
+    </p:spTree>
+    <p:extLst>
+      <p:ext uri="{BB962C8B-B14F-4D97-AF65-F5344CB8AC3E}">
+        <p14:creationId xmlns:p14="http://schemas.microsoft.com/office/powerpoint/2010/main" val="3130208776"/>
+      </p:ext>
+    </p:extLst>
+  </p:cSld>
+  <p:clrMapOvr>
+    <a:masterClrMapping/>
+  </p:clrMapOvr>
+</p:sld>
+</file>
+
+<file path=ppt/slides/slide5.xml><?xml version="1.0" encoding="utf-8"?>
+<p:sld xmlns:a="http://schemas.openxmlformats.org/drawingml/2006/main" xmlns:r="http://schemas.openxmlformats.org/officeDocument/2006/relationships" xmlns:p="http://schemas.openxmlformats.org/presentationml/2006/main">
+  <p:cSld>
+    <p:spTree>
+      <p:nvGrpSpPr>
+        <p:cNvPr id="1" name=""/>
+        <p:cNvGrpSpPr/>
+        <p:nvPr/>
+      </p:nvGrpSpPr>
+      <p:grpSpPr>
+        <a:xfrm>
+          <a:off x="0" y="0"/>
+          <a:ext cx="0" cy="0"/>
+          <a:chOff x="0" y="0"/>
+          <a:chExt cx="0" cy="0"/>
+        </a:xfrm>
+      </p:grpSpPr>
+      <p:sp>
+        <p:nvSpPr>
+          <p:cNvPr id="2" name="Title 1"/>
+          <p:cNvSpPr>
+            <a:spLocks noGrp="1"/>
+          </p:cNvSpPr>
+          <p:nvPr>
+            <p:ph type="title"/>
+          </p:nvPr>
+        </p:nvSpPr>
+        <p:spPr/>
+        <p:txBody>
+          <a:bodyPr/>
+          <a:lstStyle/>
+          <a:p>
+            <a:r>
+              <a:rPr lang="en-US" dirty="0" smtClean="0"/>
+              <a:t>Linux </a:t>
+            </a:r>
+            <a:r>
+              <a:rPr lang="en-US" dirty="0" smtClean="0"/>
+              <a:t>Address Space</a:t>
+            </a:r>
+            <a:endParaRPr lang="en-US" dirty="0"/>
+          </a:p>
+        </p:txBody>
+      </p:sp>
+      <p:sp>
+        <p:nvSpPr>
+          <p:cNvPr id="3" name="Content Placeholder 2"/>
+          <p:cNvSpPr>
+            <a:spLocks noGrp="1"/>
+          </p:cNvSpPr>
+          <p:nvPr>
+            <p:ph idx="1"/>
+          </p:nvPr>
+        </p:nvSpPr>
+        <p:spPr>
+          <a:xfrm>
+            <a:off x="457199" y="1219200"/>
+            <a:ext cx="4257675" cy="4906963"/>
+          </a:xfrm>
+        </p:spPr>
+        <p:txBody>
+          <a:bodyPr>
+            <a:normAutofit/>
+          </a:bodyPr>
+          <a:lstStyle/>
+          <a:p>
+            <a:r>
+              <a:rPr lang="en-US" sz="1800" dirty="0" smtClean="0"/>
+              <a:t>Represented by the </a:t>
+            </a:r>
+            <a:r>
+              <a:rPr lang="en-US" sz="1800" dirty="0" err="1" smtClean="0"/>
+              <a:t>mm_struct</a:t>
+            </a:r>
+            <a:endParaRPr lang="en-US" sz="1800" dirty="0" smtClean="0"/>
+          </a:p>
+          <a:p>
+            <a:r>
+              <a:rPr lang="en-US" sz="1800" dirty="0" smtClean="0"/>
+              <a:t>Contains a </a:t>
+            </a:r>
+            <a:r>
+              <a:rPr lang="en-US" sz="1800" dirty="0" err="1" smtClean="0"/>
+              <a:t>vm_area_struct</a:t>
+            </a:r>
+            <a:r>
+              <a:rPr lang="en-US" sz="1800" dirty="0" smtClean="0"/>
+              <a:t> for each section of memory (stack, heap, </a:t>
+            </a:r>
+            <a:r>
+              <a:rPr lang="en-US" sz="1800" dirty="0" err="1" smtClean="0"/>
+              <a:t>etc</a:t>
+            </a:r>
+            <a:r>
+              <a:rPr lang="en-US" sz="1800" dirty="0" smtClean="0"/>
+              <a:t>…)</a:t>
+            </a:r>
+          </a:p>
+          <a:p>
+            <a:r>
+              <a:rPr lang="en-US" sz="1800" dirty="0" smtClean="0"/>
+              <a:t>Contains atomic usage counters </a:t>
+            </a:r>
+            <a:r>
+              <a:rPr lang="en-US" sz="1800" dirty="0" smtClean="0"/>
+              <a:t>for synchronization</a:t>
+            </a:r>
+          </a:p>
+          <a:p>
+            <a:r>
+              <a:rPr lang="en-US" sz="1800" dirty="0" smtClean="0"/>
+              <a:t>Attribute </a:t>
+            </a:r>
+            <a:r>
+              <a:rPr lang="en-US" sz="1800" dirty="0" smtClean="0"/>
+              <a:t>of the </a:t>
+            </a:r>
+            <a:r>
+              <a:rPr lang="en-US" sz="1800" dirty="0" err="1" smtClean="0"/>
+              <a:t>task_struct</a:t>
+            </a:r>
+            <a:r>
+              <a:rPr lang="en-US" sz="1800" dirty="0" smtClean="0"/>
+              <a:t> for the associated </a:t>
+            </a:r>
+            <a:r>
+              <a:rPr lang="en-US" sz="1800" dirty="0" smtClean="0"/>
+              <a:t>process</a:t>
+            </a:r>
+          </a:p>
+          <a:p>
+            <a:r>
+              <a:rPr lang="en-US" sz="1800" dirty="0" smtClean="0"/>
+              <a:t>Holds reference to page tables to support virtual to physical address translations</a:t>
+            </a:r>
+            <a:endParaRPr lang="en-US" sz="1800" dirty="0" smtClean="0"/>
+          </a:p>
+          <a:p>
+            <a:r>
+              <a:rPr lang="en-US" sz="1800" dirty="0" smtClean="0"/>
+              <a:t>Exported by the module when the “--mem“ command is provided to </a:t>
+            </a:r>
+            <a:r>
+              <a:rPr lang="en-US" sz="1800" dirty="0" err="1" smtClean="0"/>
+              <a:t>tskdmp</a:t>
+            </a:r>
+            <a:endParaRPr lang="en-US" sz="1800" dirty="0"/>
+          </a:p>
+        </p:txBody>
+      </p:sp>
+      <p:sp>
+        <p:nvSpPr>
+          <p:cNvPr id="4" name="Footer Placeholder 3"/>
+          <p:cNvSpPr>
+            <a:spLocks noGrp="1"/>
+          </p:cNvSpPr>
+          <p:nvPr>
+            <p:ph type="ftr" sz="quarter" idx="11"/>
+          </p:nvPr>
+        </p:nvSpPr>
+        <p:spPr/>
+        <p:txBody>
+          <a:bodyPr/>
+          <a:lstStyle/>
+          <a:p>
+            <a:r>
+              <a:rPr lang="en-US" smtClean="0"/>
+              <a:t>CSE 522S – Advanced Operating Systems</a:t>
+            </a:r>
+            <a:endParaRPr lang="en-US" dirty="0"/>
+          </a:p>
+        </p:txBody>
+      </p:sp>
+      <p:sp>
+        <p:nvSpPr>
+          <p:cNvPr id="5" name="Slide Number Placeholder 4"/>
+          <p:cNvSpPr>
+            <a:spLocks noGrp="1"/>
+          </p:cNvSpPr>
+          <p:nvPr>
+            <p:ph type="sldNum" sz="quarter" idx="12"/>
+          </p:nvPr>
+        </p:nvSpPr>
+        <p:spPr/>
+        <p:txBody>
+          <a:bodyPr/>
+          <a:lstStyle/>
+          <a:p>
+            <a:fld id="{A773B20C-5347-4FF9-A9F0-76F937F60217}" type="slidenum">
+              <a:rPr lang="en-US" smtClean="0"/>
+              <a:pPr/>
+              <a:t>5</a:t>
+            </a:fld>
+            <a:endParaRPr lang="en-US"/>
+          </a:p>
+        </p:txBody>
+      </p:sp>
+      <p:pic>
+        <p:nvPicPr>
+          <p:cNvPr id="6" name="Picture 5"/>
+          <p:cNvPicPr>
+            <a:picLocks noChangeAspect="1"/>
+          </p:cNvPicPr>
+          <p:nvPr/>
+        </p:nvPicPr>
+        <p:blipFill>
+          <a:blip r:embed="rId2"/>
+          <a:stretch>
+            <a:fillRect/>
+          </a:stretch>
+        </p:blipFill>
+        <p:spPr>
+          <a:xfrm>
+            <a:off x="4800600" y="1219200"/>
+            <a:ext cx="3971925" cy="4143375"/>
+          </a:xfrm>
+          <a:prstGeom prst="rect">
+            <a:avLst/>
+          </a:prstGeom>
+        </p:spPr>
+      </p:pic>
+    </p:spTree>
+    <p:extLst>
+      <p:ext uri="{BB962C8B-B14F-4D97-AF65-F5344CB8AC3E}">
+        <p14:creationId xmlns:p14="http://schemas.microsoft.com/office/powerpoint/2010/main" val="2744021405"/>
+      </p:ext>
+    </p:extLst>
+  </p:cSld>
+  <p:clrMapOvr>
+    <a:masterClrMapping/>
+  </p:clrMapOvr>
+</p:sld>
+</file>
+
+<file path=ppt/slides/slide6.xml><?xml version="1.0" encoding="utf-8"?>
+<p:sld xmlns:a="http://schemas.openxmlformats.org/drawingml/2006/main" xmlns:r="http://schemas.openxmlformats.org/officeDocument/2006/relationships" xmlns:p="http://schemas.openxmlformats.org/presentationml/2006/main">
+  <p:cSld>
+    <p:spTree>
+      <p:nvGrpSpPr>
+        <p:cNvPr id="1" name=""/>
+        <p:cNvGrpSpPr/>
+        <p:nvPr/>
+      </p:nvGrpSpPr>
+      <p:grpSpPr>
+        <a:xfrm>
+          <a:off x="0" y="0"/>
+          <a:ext cx="0" cy="0"/>
+          <a:chOff x="0" y="0"/>
+          <a:chExt cx="0" cy="0"/>
+        </a:xfrm>
+      </p:grpSpPr>
+      <p:sp>
+        <p:nvSpPr>
+          <p:cNvPr id="2" name="Title 1"/>
+          <p:cNvSpPr>
+            <a:spLocks noGrp="1"/>
+          </p:cNvSpPr>
+          <p:nvPr>
+            <p:ph type="title"/>
+          </p:nvPr>
+        </p:nvSpPr>
+        <p:spPr/>
+        <p:txBody>
+          <a:bodyPr/>
+          <a:lstStyle/>
+          <a:p>
+            <a:r>
+              <a:rPr lang="en-US" dirty="0" smtClean="0"/>
+              <a:t>Linux Virtual Memory Region</a:t>
+            </a:r>
+            <a:endParaRPr lang="en-US" dirty="0"/>
+          </a:p>
+        </p:txBody>
+      </p:sp>
+      <p:sp>
+        <p:nvSpPr>
+          <p:cNvPr id="3" name="Content Placeholder 2"/>
+          <p:cNvSpPr>
+            <a:spLocks noGrp="1"/>
+          </p:cNvSpPr>
+          <p:nvPr>
+            <p:ph idx="1"/>
+          </p:nvPr>
+        </p:nvSpPr>
+        <p:spPr>
+          <a:xfrm>
+            <a:off x="457200" y="1600200"/>
+            <a:ext cx="3962400" cy="4525963"/>
+          </a:xfrm>
+        </p:spPr>
+        <p:txBody>
+          <a:bodyPr>
+            <a:normAutofit/>
+          </a:bodyPr>
+          <a:lstStyle/>
+          <a:p>
+            <a:r>
+              <a:rPr lang="en-US" sz="1800" dirty="0" smtClean="0"/>
+              <a:t>Represented by the </a:t>
+            </a:r>
+            <a:r>
+              <a:rPr lang="en-US" sz="1800" dirty="0" err="1" smtClean="0"/>
+              <a:t>vm_area_struct</a:t>
+            </a:r>
+            <a:endParaRPr lang="en-US" sz="1800" dirty="0" smtClean="0"/>
+          </a:p>
+          <a:p>
+            <a:r>
+              <a:rPr lang="en-US" sz="1800" dirty="0" smtClean="0"/>
+              <a:t>All virtual memory allocated (VMA) regions connected through linked list</a:t>
+            </a:r>
+          </a:p>
+          <a:p>
+            <a:r>
+              <a:rPr lang="en-US" sz="1800" dirty="0" smtClean="0"/>
+              <a:t>VMA Flags</a:t>
+            </a:r>
+          </a:p>
+          <a:p>
+            <a:pPr lvl="1"/>
+            <a:r>
+              <a:rPr lang="en-US" sz="1400" dirty="0" smtClean="0"/>
+              <a:t>VM_READ</a:t>
+            </a:r>
+          </a:p>
+          <a:p>
+            <a:pPr lvl="1"/>
+            <a:r>
+              <a:rPr lang="en-US" sz="1400" dirty="0" smtClean="0"/>
+              <a:t>VM_WRITE</a:t>
+            </a:r>
+          </a:p>
+          <a:p>
+            <a:pPr lvl="1"/>
+            <a:r>
+              <a:rPr lang="en-US" sz="1400" dirty="0" smtClean="0"/>
+              <a:t>VM_EXEC</a:t>
+            </a:r>
+          </a:p>
+          <a:p>
+            <a:pPr lvl="1"/>
+            <a:r>
+              <a:rPr lang="en-US" sz="1400" dirty="0" smtClean="0"/>
+              <a:t>…</a:t>
+            </a:r>
+          </a:p>
+          <a:p>
+            <a:r>
+              <a:rPr lang="en-US" sz="1800" dirty="0"/>
+              <a:t>Exported by the module when the “--mem“ command is provided to </a:t>
+            </a:r>
+            <a:r>
+              <a:rPr lang="en-US" sz="1800" dirty="0" err="1"/>
+              <a:t>tskdmp</a:t>
+            </a:r>
+            <a:endParaRPr lang="en-US" sz="1800" dirty="0"/>
+          </a:p>
+          <a:p>
+            <a:endParaRPr lang="en-US" sz="1800" dirty="0" smtClean="0"/>
+          </a:p>
+        </p:txBody>
+      </p:sp>
+      <p:sp>
+        <p:nvSpPr>
+          <p:cNvPr id="4" name="Footer Placeholder 3"/>
+          <p:cNvSpPr>
+            <a:spLocks noGrp="1"/>
+          </p:cNvSpPr>
+          <p:nvPr>
+            <p:ph type="ftr" sz="quarter" idx="11"/>
+          </p:nvPr>
+        </p:nvSpPr>
+        <p:spPr/>
+        <p:txBody>
+          <a:bodyPr/>
+          <a:lstStyle/>
+          <a:p>
+            <a:r>
+              <a:rPr lang="en-US" smtClean="0"/>
+              <a:t>CSE 522S – Advanced Operating Systems</a:t>
+            </a:r>
+            <a:endParaRPr lang="en-US" dirty="0"/>
+          </a:p>
+        </p:txBody>
+      </p:sp>
+      <p:sp>
+        <p:nvSpPr>
+          <p:cNvPr id="5" name="Slide Number Placeholder 4"/>
+          <p:cNvSpPr>
+            <a:spLocks noGrp="1"/>
+          </p:cNvSpPr>
+          <p:nvPr>
+            <p:ph type="sldNum" sz="quarter" idx="12"/>
+          </p:nvPr>
+        </p:nvSpPr>
+        <p:spPr/>
+        <p:txBody>
+          <a:bodyPr/>
+          <a:lstStyle/>
+          <a:p>
+            <a:fld id="{A773B20C-5347-4FF9-A9F0-76F937F60217}" type="slidenum">
+              <a:rPr lang="en-US" smtClean="0"/>
+              <a:pPr/>
+              <a:t>6</a:t>
+            </a:fld>
+            <a:endParaRPr lang="en-US"/>
+          </a:p>
+        </p:txBody>
+      </p:sp>
+      <p:pic>
+        <p:nvPicPr>
+          <p:cNvPr id="6" name="Picture 5"/>
+          <p:cNvPicPr>
+            <a:picLocks noChangeAspect="1"/>
+          </p:cNvPicPr>
+          <p:nvPr/>
+        </p:nvPicPr>
+        <p:blipFill>
+          <a:blip r:embed="rId2"/>
+          <a:stretch>
+            <a:fillRect/>
+          </a:stretch>
+        </p:blipFill>
+        <p:spPr>
+          <a:xfrm>
+            <a:off x="4605337" y="1622425"/>
+            <a:ext cx="4081463" cy="4041546"/>
+          </a:xfrm>
+          <a:prstGeom prst="rect">
+            <a:avLst/>
+          </a:prstGeom>
+        </p:spPr>
+      </p:pic>
+    </p:spTree>
+    <p:extLst>
+      <p:ext uri="{BB962C8B-B14F-4D97-AF65-F5344CB8AC3E}">
+        <p14:creationId xmlns:p14="http://schemas.microsoft.com/office/powerpoint/2010/main" val="1365404592"/>
+      </p:ext>
+    </p:extLst>
+  </p:cSld>
+  <p:clrMapOvr>
+    <a:masterClrMapping/>
+  </p:clrMapOvr>
+</p:sld>
+</file>
+
+<file path=ppt/slides/slide7.xml><?xml version="1.0" encoding="utf-8"?>
+<p:sld xmlns:a="http://schemas.openxmlformats.org/drawingml/2006/main" xmlns:r="http://schemas.openxmlformats.org/officeDocument/2006/relationships" xmlns:p="http://schemas.openxmlformats.org/presentationml/2006/main">
+  <p:cSld>
+    <p:spTree>
+      <p:nvGrpSpPr>
+        <p:cNvPr id="1" name=""/>
+        <p:cNvGrpSpPr/>
+        <p:nvPr/>
+      </p:nvGrpSpPr>
+      <p:grpSpPr>
+        <a:xfrm>
+          <a:off x="0" y="0"/>
+          <a:ext cx="0" cy="0"/>
+          <a:chOff x="0" y="0"/>
+          <a:chExt cx="0" cy="0"/>
+        </a:xfrm>
+      </p:grpSpPr>
+      <p:sp>
+        <p:nvSpPr>
+          <p:cNvPr id="2" name="Title 1"/>
+          <p:cNvSpPr>
+            <a:spLocks noGrp="1"/>
+          </p:cNvSpPr>
+          <p:nvPr>
+            <p:ph type="title"/>
+          </p:nvPr>
+        </p:nvSpPr>
+        <p:spPr/>
+        <p:txBody>
+          <a:bodyPr/>
+          <a:lstStyle/>
+          <a:p>
+            <a:r>
+              <a:rPr lang="en-US" dirty="0" smtClean="0"/>
+              <a:t>Linux Memory Architecture</a:t>
+            </a:r>
+            <a:endParaRPr lang="en-US" dirty="0"/>
+          </a:p>
+        </p:txBody>
+      </p:sp>
+      <p:sp>
+        <p:nvSpPr>
+          <p:cNvPr id="4" name="Footer Placeholder 3"/>
+          <p:cNvSpPr>
+            <a:spLocks noGrp="1"/>
+          </p:cNvSpPr>
+          <p:nvPr>
+            <p:ph type="ftr" sz="quarter" idx="11"/>
+          </p:nvPr>
+        </p:nvSpPr>
+        <p:spPr/>
+        <p:txBody>
+          <a:bodyPr/>
+          <a:lstStyle/>
+          <a:p>
+            <a:r>
+              <a:rPr lang="en-US" smtClean="0"/>
+              <a:t>CSE 522S – Advanced Operating Systems</a:t>
+            </a:r>
+            <a:endParaRPr lang="en-US" dirty="0"/>
+          </a:p>
+        </p:txBody>
+      </p:sp>
+      <p:sp>
+        <p:nvSpPr>
+          <p:cNvPr id="5" name="Slide Number Placeholder 4"/>
+          <p:cNvSpPr>
+            <a:spLocks noGrp="1"/>
+          </p:cNvSpPr>
+          <p:nvPr>
+            <p:ph type="sldNum" sz="quarter" idx="12"/>
+          </p:nvPr>
+        </p:nvSpPr>
+        <p:spPr/>
+        <p:txBody>
+          <a:bodyPr/>
+          <a:lstStyle/>
+          <a:p>
+            <a:fld id="{A773B20C-5347-4FF9-A9F0-76F937F60217}" type="slidenum">
+              <a:rPr lang="en-US" smtClean="0"/>
+              <a:pPr/>
+              <a:t>7</a:t>
+            </a:fld>
+            <a:endParaRPr lang="en-US"/>
+          </a:p>
+        </p:txBody>
+      </p:sp>
+      <p:grpSp>
+        <p:nvGrpSpPr>
+          <p:cNvPr id="15" name="Group 14"/>
+          <p:cNvGrpSpPr/>
+          <p:nvPr/>
+        </p:nvGrpSpPr>
+        <p:grpSpPr>
+          <a:xfrm>
+            <a:off x="774700" y="1420516"/>
+            <a:ext cx="1244600" cy="1512332"/>
+            <a:chOff x="469900" y="1611868"/>
+            <a:chExt cx="1244600" cy="1512332"/>
+          </a:xfrm>
+        </p:grpSpPr>
+        <p:grpSp>
+          <p:nvGrpSpPr>
+            <p:cNvPr id="13" name="Group 12"/>
+            <p:cNvGrpSpPr/>
+            <p:nvPr/>
+          </p:nvGrpSpPr>
+          <p:grpSpPr>
+            <a:xfrm>
+              <a:off x="482600" y="1981200"/>
+              <a:ext cx="1219200" cy="1143000"/>
+              <a:chOff x="3352800" y="1930400"/>
+              <a:chExt cx="1219200" cy="1143000"/>
+            </a:xfrm>
+          </p:grpSpPr>
+          <p:sp>
+            <p:nvSpPr>
+              <p:cNvPr id="7" name="Rectangle 6"/>
+              <p:cNvSpPr/>
+              <p:nvPr/>
+            </p:nvSpPr>
+            <p:spPr>
+              <a:xfrm>
+                <a:off x="3352800" y="1930400"/>
+                <a:ext cx="1219200" cy="228600"/>
+              </a:xfrm>
+              <a:prstGeom prst="rect">
+                <a:avLst/>
+              </a:prstGeom>
+              <a:ln>
+                <a:solidFill>
+                  <a:schemeClr val="tx1"/>
+                </a:solidFill>
+              </a:ln>
+            </p:spPr>
+            <p:style>
+              <a:lnRef idx="2">
+                <a:schemeClr val="accent6"/>
+              </a:lnRef>
+              <a:fillRef idx="1">
+                <a:schemeClr val="lt1"/>
+              </a:fillRef>
+              <a:effectRef idx="0">
+                <a:schemeClr val="accent6"/>
+              </a:effectRef>
+              <a:fontRef idx="minor">
+                <a:schemeClr val="dk1"/>
+              </a:fontRef>
+            </p:style>
+            <p:txBody>
+              <a:bodyPr rtlCol="0" anchor="ctr"/>
+              <a:lstStyle/>
+              <a:p>
+                <a:pPr algn="ctr"/>
+                <a:r>
+                  <a:rPr lang="en-US" dirty="0" err="1" smtClean="0"/>
+                  <a:t>pid</a:t>
+                </a:r>
+                <a:endParaRPr lang="en-US" dirty="0"/>
+              </a:p>
+            </p:txBody>
+          </p:sp>
+          <p:sp>
+            <p:nvSpPr>
+              <p:cNvPr id="8" name="Rectangle 7"/>
+              <p:cNvSpPr/>
+              <p:nvPr/>
+            </p:nvSpPr>
+            <p:spPr>
+              <a:xfrm>
+                <a:off x="3352800" y="2387600"/>
+                <a:ext cx="1219200" cy="228600"/>
+              </a:xfrm>
+              <a:prstGeom prst="rect">
+                <a:avLst/>
+              </a:prstGeom>
+              <a:ln>
+                <a:solidFill>
+                  <a:schemeClr val="tx1"/>
+                </a:solidFill>
+              </a:ln>
+            </p:spPr>
+            <p:style>
+              <a:lnRef idx="2">
+                <a:schemeClr val="accent6"/>
+              </a:lnRef>
+              <a:fillRef idx="1">
+                <a:schemeClr val="lt1"/>
+              </a:fillRef>
+              <a:effectRef idx="0">
+                <a:schemeClr val="accent6"/>
+              </a:effectRef>
+              <a:fontRef idx="minor">
+                <a:schemeClr val="dk1"/>
+              </a:fontRef>
+            </p:style>
+            <p:txBody>
+              <a:bodyPr rtlCol="0" anchor="ctr"/>
+              <a:lstStyle/>
+              <a:p>
+                <a:pPr algn="ctr"/>
+                <a:r>
+                  <a:rPr lang="en-US" dirty="0" smtClean="0"/>
+                  <a:t>mm</a:t>
+                </a:r>
+                <a:endParaRPr lang="en-US" dirty="0"/>
+              </a:p>
+            </p:txBody>
+          </p:sp>
+          <p:sp>
+            <p:nvSpPr>
+              <p:cNvPr id="9" name="Rectangle 8"/>
+              <p:cNvSpPr/>
+              <p:nvPr/>
+            </p:nvSpPr>
+            <p:spPr>
+              <a:xfrm>
+                <a:off x="3352800" y="2616200"/>
+                <a:ext cx="1219200" cy="228600"/>
+              </a:xfrm>
+              <a:prstGeom prst="rect">
+                <a:avLst/>
+              </a:prstGeom>
+              <a:ln>
+                <a:solidFill>
+                  <a:schemeClr val="tx1"/>
+                </a:solidFill>
+              </a:ln>
+            </p:spPr>
+            <p:style>
+              <a:lnRef idx="2">
+                <a:schemeClr val="accent6"/>
+              </a:lnRef>
+              <a:fillRef idx="1">
+                <a:schemeClr val="lt1"/>
+              </a:fillRef>
+              <a:effectRef idx="0">
+                <a:schemeClr val="accent6"/>
+              </a:effectRef>
+              <a:fontRef idx="minor">
+                <a:schemeClr val="dk1"/>
+              </a:fontRef>
+            </p:style>
+            <p:txBody>
+              <a:bodyPr rtlCol="0" anchor="ctr"/>
+              <a:lstStyle/>
+              <a:p>
+                <a:pPr algn="ctr"/>
+                <a:r>
+                  <a:rPr lang="en-US" dirty="0" err="1" smtClean="0"/>
+                  <a:t>mm_rb</a:t>
+                </a:r>
+                <a:endParaRPr lang="en-US" dirty="0"/>
+              </a:p>
+            </p:txBody>
+          </p:sp>
+          <p:sp>
+            <p:nvSpPr>
+              <p:cNvPr id="11" name="Rectangle 10"/>
+              <p:cNvSpPr/>
+              <p:nvPr/>
+            </p:nvSpPr>
+            <p:spPr>
+              <a:xfrm>
+                <a:off x="3352800" y="2844800"/>
+                <a:ext cx="1219200" cy="228600"/>
+              </a:xfrm>
+              <a:prstGeom prst="rect">
+                <a:avLst/>
+              </a:prstGeom>
+              <a:ln>
+                <a:solidFill>
+                  <a:schemeClr val="tx1"/>
+                </a:solidFill>
+              </a:ln>
+            </p:spPr>
+            <p:style>
+              <a:lnRef idx="2">
+                <a:schemeClr val="accent6"/>
+              </a:lnRef>
+              <a:fillRef idx="1">
+                <a:schemeClr val="lt1"/>
+              </a:fillRef>
+              <a:effectRef idx="0">
+                <a:schemeClr val="accent6"/>
+              </a:effectRef>
+              <a:fontRef idx="minor">
+                <a:schemeClr val="dk1"/>
+              </a:fontRef>
+            </p:style>
+            <p:txBody>
+              <a:bodyPr rtlCol="0" anchor="ctr"/>
+              <a:lstStyle/>
+              <a:p>
+                <a:pPr algn="ctr"/>
+                <a:r>
+                  <a:rPr lang="en-US" dirty="0" smtClean="0"/>
+                  <a:t>…</a:t>
+                </a:r>
+                <a:endParaRPr lang="en-US" dirty="0"/>
+              </a:p>
+            </p:txBody>
+          </p:sp>
+          <p:sp>
+            <p:nvSpPr>
+              <p:cNvPr id="12" name="Rectangle 11"/>
+              <p:cNvSpPr/>
+              <p:nvPr/>
+            </p:nvSpPr>
+            <p:spPr>
+              <a:xfrm>
+                <a:off x="3352800" y="2159000"/>
+                <a:ext cx="1219200" cy="228600"/>
+              </a:xfrm>
+              <a:prstGeom prst="rect">
+                <a:avLst/>
+              </a:prstGeom>
+              <a:ln>
+                <a:solidFill>
+                  <a:schemeClr val="tx1"/>
+                </a:solidFill>
+              </a:ln>
+            </p:spPr>
+            <p:style>
+              <a:lnRef idx="2">
+                <a:schemeClr val="accent6"/>
+              </a:lnRef>
+              <a:fillRef idx="1">
+                <a:schemeClr val="lt1"/>
+              </a:fillRef>
+              <a:effectRef idx="0">
+                <a:schemeClr val="accent6"/>
+              </a:effectRef>
+              <a:fontRef idx="minor">
+                <a:schemeClr val="dk1"/>
+              </a:fontRef>
+            </p:style>
+            <p:txBody>
+              <a:bodyPr rtlCol="0" anchor="ctr"/>
+              <a:lstStyle/>
+              <a:p>
+                <a:pPr algn="ctr"/>
+                <a:r>
+                  <a:rPr lang="en-US" dirty="0"/>
+                  <a:t>s</a:t>
+                </a:r>
+                <a:r>
+                  <a:rPr lang="en-US" dirty="0" smtClean="0"/>
+                  <a:t>tate</a:t>
+                </a:r>
+              </a:p>
+            </p:txBody>
+          </p:sp>
+        </p:grpSp>
+        <p:sp>
+          <p:nvSpPr>
+            <p:cNvPr id="14" name="TextBox 13"/>
+            <p:cNvSpPr txBox="1"/>
+            <p:nvPr/>
+          </p:nvSpPr>
+          <p:spPr>
+            <a:xfrm>
+              <a:off x="469900" y="1611868"/>
+              <a:ext cx="1244600" cy="369332"/>
+            </a:xfrm>
+            <a:prstGeom prst="rect">
+              <a:avLst/>
+            </a:prstGeom>
+            <a:noFill/>
+          </p:spPr>
+          <p:txBody>
+            <a:bodyPr wrap="square" rtlCol="0">
+              <a:spAutoFit/>
+            </a:bodyPr>
+            <a:lstStyle/>
+            <a:p>
+              <a:r>
+                <a:rPr lang="en-US" dirty="0" err="1" smtClean="0"/>
+                <a:t>task_struct</a:t>
+              </a:r>
+              <a:endParaRPr lang="en-US" dirty="0"/>
+            </a:p>
+          </p:txBody>
+        </p:sp>
+      </p:grpSp>
+      <p:grpSp>
+        <p:nvGrpSpPr>
+          <p:cNvPr id="24" name="Group 23"/>
+          <p:cNvGrpSpPr/>
+          <p:nvPr/>
+        </p:nvGrpSpPr>
+        <p:grpSpPr>
+          <a:xfrm>
+            <a:off x="3505200" y="1605430"/>
+            <a:ext cx="1219200" cy="1735892"/>
+            <a:chOff x="3124200" y="1618496"/>
+            <a:chExt cx="1219200" cy="1735892"/>
+          </a:xfrm>
+        </p:grpSpPr>
+        <p:grpSp>
+          <p:nvGrpSpPr>
+            <p:cNvPr id="23" name="Group 22"/>
+            <p:cNvGrpSpPr/>
+            <p:nvPr/>
+          </p:nvGrpSpPr>
+          <p:grpSpPr>
+            <a:xfrm>
+              <a:off x="3124200" y="1987828"/>
+              <a:ext cx="1219200" cy="1366560"/>
+              <a:chOff x="3124200" y="1987828"/>
+              <a:chExt cx="1219200" cy="1366560"/>
+            </a:xfrm>
+          </p:grpSpPr>
+          <p:sp>
+            <p:nvSpPr>
+              <p:cNvPr id="16" name="Rectangle 15"/>
+              <p:cNvSpPr/>
+              <p:nvPr/>
+            </p:nvSpPr>
+            <p:spPr>
+              <a:xfrm>
+                <a:off x="3124200" y="1987828"/>
+                <a:ext cx="1219200" cy="228600"/>
+              </a:xfrm>
+              <a:prstGeom prst="rect">
+                <a:avLst/>
+              </a:prstGeom>
+              <a:ln>
+                <a:solidFill>
+                  <a:schemeClr val="tx1"/>
+                </a:solidFill>
+              </a:ln>
+            </p:spPr>
+            <p:style>
+              <a:lnRef idx="2">
+                <a:schemeClr val="accent6"/>
+              </a:lnRef>
+              <a:fillRef idx="1">
+                <a:schemeClr val="lt1"/>
+              </a:fillRef>
+              <a:effectRef idx="0">
+                <a:schemeClr val="accent6"/>
+              </a:effectRef>
+              <a:fontRef idx="minor">
+                <a:schemeClr val="dk1"/>
+              </a:fontRef>
+            </p:style>
+            <p:txBody>
+              <a:bodyPr rtlCol="0" anchor="ctr"/>
+              <a:lstStyle/>
+              <a:p>
+                <a:pPr algn="ctr"/>
+                <a:r>
+                  <a:rPr lang="en-US" dirty="0" err="1" smtClean="0"/>
+                  <a:t>mmap</a:t>
+                </a:r>
+                <a:endParaRPr lang="en-US" dirty="0"/>
+              </a:p>
+            </p:txBody>
+          </p:sp>
+          <p:sp>
+            <p:nvSpPr>
+              <p:cNvPr id="17" name="Rectangle 16"/>
+              <p:cNvSpPr/>
+              <p:nvPr/>
+            </p:nvSpPr>
+            <p:spPr>
+              <a:xfrm>
+                <a:off x="3124200" y="2216428"/>
+                <a:ext cx="1219200" cy="228600"/>
+              </a:xfrm>
+              <a:prstGeom prst="rect">
+                <a:avLst/>
+              </a:prstGeom>
+              <a:ln>
+                <a:solidFill>
+                  <a:schemeClr val="tx1"/>
+                </a:solidFill>
+              </a:ln>
+            </p:spPr>
+            <p:style>
+              <a:lnRef idx="2">
+                <a:schemeClr val="accent6"/>
+              </a:lnRef>
+              <a:fillRef idx="1">
+                <a:schemeClr val="lt1"/>
+              </a:fillRef>
+              <a:effectRef idx="0">
+                <a:schemeClr val="accent6"/>
+              </a:effectRef>
+              <a:fontRef idx="minor">
+                <a:schemeClr val="dk1"/>
+              </a:fontRef>
+            </p:style>
+            <p:txBody>
+              <a:bodyPr rtlCol="0" anchor="ctr"/>
+              <a:lstStyle/>
+              <a:p>
+                <a:pPr algn="ctr"/>
+                <a:r>
+                  <a:rPr lang="en-US" dirty="0" err="1" smtClean="0"/>
+                  <a:t>pgd</a:t>
+                </a:r>
+                <a:endParaRPr lang="en-US" dirty="0"/>
+              </a:p>
+            </p:txBody>
+          </p:sp>
+          <p:sp>
+            <p:nvSpPr>
+              <p:cNvPr id="18" name="Rectangle 17"/>
+              <p:cNvSpPr/>
+              <p:nvPr/>
+            </p:nvSpPr>
+            <p:spPr>
+              <a:xfrm>
+                <a:off x="3124200" y="3125788"/>
+                <a:ext cx="1219200" cy="228600"/>
+              </a:xfrm>
+              <a:prstGeom prst="rect">
+                <a:avLst/>
+              </a:prstGeom>
+              <a:ln>
+                <a:solidFill>
+                  <a:schemeClr val="tx1"/>
+                </a:solidFill>
+              </a:ln>
+            </p:spPr>
+            <p:style>
+              <a:lnRef idx="2">
+                <a:schemeClr val="accent6"/>
+              </a:lnRef>
+              <a:fillRef idx="1">
+                <a:schemeClr val="lt1"/>
+              </a:fillRef>
+              <a:effectRef idx="0">
+                <a:schemeClr val="accent6"/>
+              </a:effectRef>
+              <a:fontRef idx="minor">
+                <a:schemeClr val="dk1"/>
+              </a:fontRef>
+            </p:style>
+            <p:txBody>
+              <a:bodyPr rtlCol="0" anchor="ctr"/>
+              <a:lstStyle/>
+              <a:p>
+                <a:pPr algn="ctr"/>
+                <a:r>
+                  <a:rPr lang="en-US" dirty="0" smtClean="0"/>
+                  <a:t>…</a:t>
+                </a:r>
+                <a:endParaRPr lang="en-US" dirty="0"/>
+              </a:p>
+            </p:txBody>
+          </p:sp>
+          <p:sp>
+            <p:nvSpPr>
+              <p:cNvPr id="19" name="Rectangle 18"/>
+              <p:cNvSpPr/>
+              <p:nvPr/>
+            </p:nvSpPr>
+            <p:spPr>
+              <a:xfrm>
+                <a:off x="3124200" y="2897188"/>
+                <a:ext cx="1219200" cy="228600"/>
+              </a:xfrm>
+              <a:prstGeom prst="rect">
+                <a:avLst/>
+              </a:prstGeom>
+              <a:ln>
+                <a:solidFill>
+                  <a:schemeClr val="tx1"/>
+                </a:solidFill>
+              </a:ln>
+            </p:spPr>
+            <p:style>
+              <a:lnRef idx="2">
+                <a:schemeClr val="accent6"/>
+              </a:lnRef>
+              <a:fillRef idx="1">
+                <a:schemeClr val="lt1"/>
+              </a:fillRef>
+              <a:effectRef idx="0">
+                <a:schemeClr val="accent6"/>
+              </a:effectRef>
+              <a:fontRef idx="minor">
+                <a:schemeClr val="dk1"/>
+              </a:fontRef>
+            </p:style>
+            <p:txBody>
+              <a:bodyPr rtlCol="0" anchor="ctr"/>
+              <a:lstStyle/>
+              <a:p>
+                <a:pPr algn="ctr"/>
+                <a:r>
+                  <a:rPr lang="en-US" dirty="0" err="1" smtClean="0"/>
+                  <a:t>start_stack</a:t>
+                </a:r>
+                <a:endParaRPr lang="en-US" dirty="0"/>
+              </a:p>
+            </p:txBody>
+          </p:sp>
+          <p:sp>
+            <p:nvSpPr>
+              <p:cNvPr id="20" name="Rectangle 19"/>
+              <p:cNvSpPr/>
+              <p:nvPr/>
+            </p:nvSpPr>
+            <p:spPr>
+              <a:xfrm>
+                <a:off x="3124200" y="2673628"/>
+                <a:ext cx="1219200" cy="228600"/>
+              </a:xfrm>
+              <a:prstGeom prst="rect">
+                <a:avLst/>
+              </a:prstGeom>
+              <a:ln>
+                <a:solidFill>
+                  <a:schemeClr val="tx1"/>
+                </a:solidFill>
+              </a:ln>
+            </p:spPr>
+            <p:style>
+              <a:lnRef idx="2">
+                <a:schemeClr val="accent6"/>
+              </a:lnRef>
+              <a:fillRef idx="1">
+                <a:schemeClr val="lt1"/>
+              </a:fillRef>
+              <a:effectRef idx="0">
+                <a:schemeClr val="accent6"/>
+              </a:effectRef>
+              <a:fontRef idx="minor">
+                <a:schemeClr val="dk1"/>
+              </a:fontRef>
+            </p:style>
+            <p:txBody>
+              <a:bodyPr rtlCol="0" anchor="ctr"/>
+              <a:lstStyle/>
+              <a:p>
+                <a:pPr algn="ctr"/>
+                <a:r>
+                  <a:rPr lang="en-US" dirty="0" err="1" smtClean="0"/>
+                  <a:t>mm_count</a:t>
+                </a:r>
+                <a:endParaRPr lang="en-US" dirty="0"/>
+              </a:p>
+            </p:txBody>
+          </p:sp>
+          <p:sp>
+            <p:nvSpPr>
+              <p:cNvPr id="21" name="Rectangle 20"/>
+              <p:cNvSpPr/>
+              <p:nvPr/>
+            </p:nvSpPr>
+            <p:spPr>
+              <a:xfrm>
+                <a:off x="3124200" y="2445028"/>
+                <a:ext cx="1219200" cy="228600"/>
+              </a:xfrm>
+              <a:prstGeom prst="rect">
+                <a:avLst/>
+              </a:prstGeom>
+              <a:ln>
+                <a:solidFill>
+                  <a:schemeClr val="tx1"/>
+                </a:solidFill>
+              </a:ln>
+            </p:spPr>
+            <p:style>
+              <a:lnRef idx="2">
+                <a:schemeClr val="accent6"/>
+              </a:lnRef>
+              <a:fillRef idx="1">
+                <a:schemeClr val="lt1"/>
+              </a:fillRef>
+              <a:effectRef idx="0">
+                <a:schemeClr val="accent6"/>
+              </a:effectRef>
+              <a:fontRef idx="minor">
+                <a:schemeClr val="dk1"/>
+              </a:fontRef>
+            </p:style>
+            <p:txBody>
+              <a:bodyPr rtlCol="0" anchor="ctr"/>
+              <a:lstStyle/>
+              <a:p>
+                <a:pPr algn="ctr"/>
+                <a:r>
+                  <a:rPr lang="en-US" dirty="0" err="1" smtClean="0"/>
+                  <a:t>mm_users</a:t>
+                </a:r>
+                <a:endParaRPr lang="en-US" dirty="0"/>
+              </a:p>
+            </p:txBody>
+          </p:sp>
+        </p:grpSp>
+        <p:sp>
+          <p:nvSpPr>
+            <p:cNvPr id="22" name="TextBox 21"/>
+            <p:cNvSpPr txBox="1"/>
+            <p:nvPr/>
+          </p:nvSpPr>
+          <p:spPr>
+            <a:xfrm>
+              <a:off x="3124200" y="1618496"/>
+              <a:ext cx="1219200" cy="369332"/>
+            </a:xfrm>
+            <a:prstGeom prst="rect">
+              <a:avLst/>
+            </a:prstGeom>
+            <a:noFill/>
+          </p:spPr>
+          <p:txBody>
+            <a:bodyPr wrap="square" rtlCol="0">
+              <a:spAutoFit/>
+            </a:bodyPr>
+            <a:lstStyle/>
+            <a:p>
+              <a:r>
+                <a:rPr lang="en-US" dirty="0" err="1" smtClean="0"/>
+                <a:t>mm_struct</a:t>
+              </a:r>
+              <a:endParaRPr lang="en-US" dirty="0"/>
+            </a:p>
+          </p:txBody>
+        </p:sp>
+      </p:grpSp>
+      <p:cxnSp>
+        <p:nvCxnSpPr>
+          <p:cNvPr id="26" name="Straight Arrow Connector 25"/>
+          <p:cNvCxnSpPr>
+            <a:stCxn id="8" idx="3"/>
+            <a:endCxn id="16" idx="1"/>
+          </p:cNvCxnSpPr>
+          <p:nvPr/>
+        </p:nvCxnSpPr>
+        <p:spPr>
+          <a:xfrm flipV="1">
+            <a:off x="2006600" y="2089062"/>
+            <a:ext cx="1498600" cy="272286"/>
+          </a:xfrm>
+          <a:prstGeom prst="straightConnector1">
+            <a:avLst/>
+          </a:prstGeom>
+          <a:ln>
+            <a:tailEnd type="triangle"/>
+          </a:ln>
+        </p:spPr>
+        <p:style>
+          <a:lnRef idx="1">
+            <a:schemeClr val="dk1"/>
+          </a:lnRef>
+          <a:fillRef idx="0">
+            <a:schemeClr val="dk1"/>
+          </a:fillRef>
+          <a:effectRef idx="0">
+            <a:schemeClr val="dk1"/>
+          </a:effectRef>
+          <a:fontRef idx="minor">
+            <a:schemeClr val="tx1"/>
+          </a:fontRef>
+        </p:style>
+      </p:cxnSp>
+      <p:grpSp>
+        <p:nvGrpSpPr>
+          <p:cNvPr id="34" name="Group 33"/>
+          <p:cNvGrpSpPr/>
+          <p:nvPr/>
+        </p:nvGrpSpPr>
+        <p:grpSpPr>
+          <a:xfrm>
+            <a:off x="3238500" y="3820280"/>
+            <a:ext cx="1752600" cy="1763851"/>
+            <a:chOff x="5295900" y="2175769"/>
+            <a:chExt cx="1752600" cy="1763851"/>
+          </a:xfrm>
+        </p:grpSpPr>
+        <p:sp>
+          <p:nvSpPr>
+            <p:cNvPr id="27" name="Rectangle 26"/>
+            <p:cNvSpPr/>
+            <p:nvPr/>
+          </p:nvSpPr>
+          <p:spPr>
+            <a:xfrm>
+              <a:off x="5562600" y="2573060"/>
+              <a:ext cx="1219200" cy="228600"/>
+            </a:xfrm>
+            <a:prstGeom prst="rect">
+              <a:avLst/>
+            </a:prstGeom>
+            <a:ln>
+              <a:solidFill>
+                <a:schemeClr val="tx1"/>
+              </a:solidFill>
+            </a:ln>
+          </p:spPr>
+          <p:style>
+            <a:lnRef idx="2">
+              <a:schemeClr val="accent6"/>
+            </a:lnRef>
+            <a:fillRef idx="1">
+              <a:schemeClr val="lt1"/>
+            </a:fillRef>
+            <a:effectRef idx="0">
+              <a:schemeClr val="accent6"/>
+            </a:effectRef>
+            <a:fontRef idx="minor">
+              <a:schemeClr val="dk1"/>
+            </a:fontRef>
+          </p:style>
+          <p:txBody>
+            <a:bodyPr rtlCol="0" anchor="ctr"/>
+            <a:lstStyle/>
+            <a:p>
+              <a:pPr algn="ctr"/>
+              <a:r>
+                <a:rPr lang="en-US" dirty="0" err="1" smtClean="0"/>
+                <a:t>vm_start</a:t>
+              </a:r>
+              <a:endParaRPr lang="en-US" dirty="0"/>
+            </a:p>
+          </p:txBody>
+        </p:sp>
+        <p:sp>
+          <p:nvSpPr>
+            <p:cNvPr id="28" name="Rectangle 27"/>
+            <p:cNvSpPr/>
+            <p:nvPr/>
+          </p:nvSpPr>
+          <p:spPr>
+            <a:xfrm>
+              <a:off x="5562600" y="3711020"/>
+              <a:ext cx="1219200" cy="228600"/>
+            </a:xfrm>
+            <a:prstGeom prst="rect">
+              <a:avLst/>
+            </a:prstGeom>
+            <a:ln>
+              <a:solidFill>
+                <a:schemeClr val="tx1"/>
+              </a:solidFill>
+            </a:ln>
+          </p:spPr>
+          <p:style>
+            <a:lnRef idx="2">
+              <a:schemeClr val="accent6"/>
+            </a:lnRef>
+            <a:fillRef idx="1">
+              <a:schemeClr val="lt1"/>
+            </a:fillRef>
+            <a:effectRef idx="0">
+              <a:schemeClr val="accent6"/>
+            </a:effectRef>
+            <a:fontRef idx="minor">
+              <a:schemeClr val="dk1"/>
+            </a:fontRef>
+          </p:style>
+          <p:txBody>
+            <a:bodyPr rtlCol="0" anchor="ctr"/>
+            <a:lstStyle/>
+            <a:p>
+              <a:pPr algn="ctr"/>
+              <a:r>
+                <a:rPr lang="en-US" dirty="0" smtClean="0"/>
+                <a:t>…</a:t>
+              </a:r>
+              <a:endParaRPr lang="en-US" dirty="0"/>
+            </a:p>
+          </p:txBody>
+        </p:sp>
+        <p:sp>
+          <p:nvSpPr>
+            <p:cNvPr id="29" name="Rectangle 28"/>
+            <p:cNvSpPr/>
+            <p:nvPr/>
+          </p:nvSpPr>
+          <p:spPr>
+            <a:xfrm>
+              <a:off x="5562600" y="3482420"/>
+              <a:ext cx="1219200" cy="228600"/>
+            </a:xfrm>
+            <a:prstGeom prst="rect">
+              <a:avLst/>
+            </a:prstGeom>
+            <a:ln>
+              <a:solidFill>
+                <a:schemeClr val="tx1"/>
+              </a:solidFill>
+            </a:ln>
+          </p:spPr>
+          <p:style>
+            <a:lnRef idx="2">
+              <a:schemeClr val="accent6"/>
+            </a:lnRef>
+            <a:fillRef idx="1">
+              <a:schemeClr val="lt1"/>
+            </a:fillRef>
+            <a:effectRef idx="0">
+              <a:schemeClr val="accent6"/>
+            </a:effectRef>
+            <a:fontRef idx="minor">
+              <a:schemeClr val="dk1"/>
+            </a:fontRef>
+          </p:style>
+          <p:txBody>
+            <a:bodyPr rtlCol="0" anchor="ctr"/>
+            <a:lstStyle/>
+            <a:p>
+              <a:pPr algn="ctr"/>
+              <a:r>
+                <a:rPr lang="en-US" dirty="0" err="1" smtClean="0"/>
+                <a:t>vm_flags</a:t>
+              </a:r>
+              <a:endParaRPr lang="en-US" dirty="0"/>
+            </a:p>
+          </p:txBody>
+        </p:sp>
+        <p:sp>
+          <p:nvSpPr>
+            <p:cNvPr id="30" name="Rectangle 29"/>
+            <p:cNvSpPr/>
+            <p:nvPr/>
+          </p:nvSpPr>
+          <p:spPr>
+            <a:xfrm>
+              <a:off x="5562600" y="3253820"/>
+              <a:ext cx="1219200" cy="228600"/>
+            </a:xfrm>
+            <a:prstGeom prst="rect">
+              <a:avLst/>
+            </a:prstGeom>
+            <a:ln>
+              <a:solidFill>
+                <a:schemeClr val="tx1"/>
+              </a:solidFill>
+            </a:ln>
+          </p:spPr>
+          <p:style>
+            <a:lnRef idx="2">
+              <a:schemeClr val="accent6"/>
+            </a:lnRef>
+            <a:fillRef idx="1">
+              <a:schemeClr val="lt1"/>
+            </a:fillRef>
+            <a:effectRef idx="0">
+              <a:schemeClr val="accent6"/>
+            </a:effectRef>
+            <a:fontRef idx="minor">
+              <a:schemeClr val="dk1"/>
+            </a:fontRef>
+          </p:style>
+          <p:txBody>
+            <a:bodyPr rtlCol="0" anchor="ctr"/>
+            <a:lstStyle/>
+            <a:p>
+              <a:pPr algn="ctr"/>
+              <a:r>
+                <a:rPr lang="en-US" dirty="0" err="1"/>
+                <a:t>v</a:t>
+              </a:r>
+              <a:r>
+                <a:rPr lang="en-US" dirty="0" err="1" smtClean="0"/>
+                <a:t>m_prev</a:t>
+              </a:r>
+              <a:endParaRPr lang="en-US" dirty="0"/>
+            </a:p>
+          </p:txBody>
+        </p:sp>
+        <p:sp>
+          <p:nvSpPr>
+            <p:cNvPr id="31" name="Rectangle 30"/>
+            <p:cNvSpPr/>
+            <p:nvPr/>
+          </p:nvSpPr>
+          <p:spPr>
+            <a:xfrm>
+              <a:off x="5562600" y="3024565"/>
+              <a:ext cx="1219200" cy="228600"/>
+            </a:xfrm>
+            <a:prstGeom prst="rect">
+              <a:avLst/>
+            </a:prstGeom>
+            <a:ln>
+              <a:solidFill>
+                <a:schemeClr val="tx1"/>
+              </a:solidFill>
+            </a:ln>
+          </p:spPr>
+          <p:style>
+            <a:lnRef idx="2">
+              <a:schemeClr val="accent6"/>
+            </a:lnRef>
+            <a:fillRef idx="1">
+              <a:schemeClr val="lt1"/>
+            </a:fillRef>
+            <a:effectRef idx="0">
+              <a:schemeClr val="accent6"/>
+            </a:effectRef>
+            <a:fontRef idx="minor">
+              <a:schemeClr val="dk1"/>
+            </a:fontRef>
+          </p:style>
+          <p:txBody>
+            <a:bodyPr rtlCol="0" anchor="ctr"/>
+            <a:lstStyle/>
+            <a:p>
+              <a:pPr algn="ctr"/>
+              <a:r>
+                <a:rPr lang="en-US" dirty="0" err="1"/>
+                <a:t>v</a:t>
+              </a:r>
+              <a:r>
+                <a:rPr lang="en-US" dirty="0" err="1" smtClean="0"/>
+                <a:t>m_next</a:t>
+              </a:r>
+              <a:endParaRPr lang="en-US" dirty="0"/>
+            </a:p>
+          </p:txBody>
+        </p:sp>
+        <p:sp>
+          <p:nvSpPr>
+            <p:cNvPr id="32" name="Rectangle 31"/>
+            <p:cNvSpPr/>
+            <p:nvPr/>
+          </p:nvSpPr>
+          <p:spPr>
+            <a:xfrm>
+              <a:off x="5562600" y="2811940"/>
+              <a:ext cx="1219200" cy="228600"/>
+            </a:xfrm>
+            <a:prstGeom prst="rect">
+              <a:avLst/>
+            </a:prstGeom>
+            <a:ln>
+              <a:solidFill>
+                <a:schemeClr val="tx1"/>
+              </a:solidFill>
+            </a:ln>
+          </p:spPr>
+          <p:style>
+            <a:lnRef idx="2">
+              <a:schemeClr val="accent6"/>
+            </a:lnRef>
+            <a:fillRef idx="1">
+              <a:schemeClr val="lt1"/>
+            </a:fillRef>
+            <a:effectRef idx="0">
+              <a:schemeClr val="accent6"/>
+            </a:effectRef>
+            <a:fontRef idx="minor">
+              <a:schemeClr val="dk1"/>
+            </a:fontRef>
+          </p:style>
+          <p:txBody>
+            <a:bodyPr rtlCol="0" anchor="ctr"/>
+            <a:lstStyle/>
+            <a:p>
+              <a:pPr algn="ctr"/>
+              <a:r>
+                <a:rPr lang="en-US" dirty="0" err="1" smtClean="0"/>
+                <a:t>vm_end</a:t>
+              </a:r>
+              <a:endParaRPr lang="en-US" dirty="0"/>
+            </a:p>
+          </p:txBody>
+        </p:sp>
+        <p:sp>
+          <p:nvSpPr>
+            <p:cNvPr id="33" name="TextBox 32"/>
+            <p:cNvSpPr txBox="1"/>
+            <p:nvPr/>
+          </p:nvSpPr>
+          <p:spPr>
+            <a:xfrm>
+              <a:off x="5295900" y="2175769"/>
+              <a:ext cx="1752600" cy="369332"/>
+            </a:xfrm>
+            <a:prstGeom prst="rect">
+              <a:avLst/>
+            </a:prstGeom>
+            <a:noFill/>
+          </p:spPr>
+          <p:txBody>
+            <a:bodyPr wrap="square" rtlCol="0">
+              <a:spAutoFit/>
+            </a:bodyPr>
+            <a:lstStyle/>
+            <a:p>
+              <a:r>
+                <a:rPr lang="en-US" dirty="0" err="1" smtClean="0"/>
+                <a:t>vm_area_struct</a:t>
+              </a:r>
+              <a:endParaRPr lang="en-US" dirty="0"/>
+            </a:p>
+          </p:txBody>
+        </p:sp>
+      </p:grpSp>
+      <p:grpSp>
+        <p:nvGrpSpPr>
+          <p:cNvPr id="35" name="Group 34"/>
+          <p:cNvGrpSpPr/>
+          <p:nvPr/>
+        </p:nvGrpSpPr>
+        <p:grpSpPr>
+          <a:xfrm>
+            <a:off x="5257800" y="3820280"/>
+            <a:ext cx="1752600" cy="1763851"/>
+            <a:chOff x="5295900" y="2175769"/>
+            <a:chExt cx="1752600" cy="1763851"/>
+          </a:xfrm>
+        </p:grpSpPr>
+        <p:sp>
+          <p:nvSpPr>
+            <p:cNvPr id="36" name="Rectangle 35"/>
+            <p:cNvSpPr/>
+            <p:nvPr/>
+          </p:nvSpPr>
+          <p:spPr>
+            <a:xfrm>
+              <a:off x="5562600" y="2573060"/>
+              <a:ext cx="1219200" cy="228600"/>
+            </a:xfrm>
+            <a:prstGeom prst="rect">
+              <a:avLst/>
+            </a:prstGeom>
+            <a:ln>
+              <a:solidFill>
+                <a:schemeClr val="tx1"/>
+              </a:solidFill>
+            </a:ln>
+          </p:spPr>
+          <p:style>
+            <a:lnRef idx="2">
+              <a:schemeClr val="accent6"/>
+            </a:lnRef>
+            <a:fillRef idx="1">
+              <a:schemeClr val="lt1"/>
+            </a:fillRef>
+            <a:effectRef idx="0">
+              <a:schemeClr val="accent6"/>
+            </a:effectRef>
+            <a:fontRef idx="minor">
+              <a:schemeClr val="dk1"/>
+            </a:fontRef>
+          </p:style>
+          <p:txBody>
+            <a:bodyPr rtlCol="0" anchor="ctr"/>
+            <a:lstStyle/>
+            <a:p>
+              <a:pPr algn="ctr"/>
+              <a:r>
+                <a:rPr lang="en-US" dirty="0" err="1" smtClean="0"/>
+                <a:t>vm_start</a:t>
+              </a:r>
+              <a:endParaRPr lang="en-US" dirty="0"/>
+            </a:p>
+          </p:txBody>
+        </p:sp>
+        <p:sp>
+          <p:nvSpPr>
+            <p:cNvPr id="37" name="Rectangle 36"/>
+            <p:cNvSpPr/>
+            <p:nvPr/>
+          </p:nvSpPr>
+          <p:spPr>
+            <a:xfrm>
+              <a:off x="5562600" y="3711020"/>
+              <a:ext cx="1219200" cy="228600"/>
+            </a:xfrm>
+            <a:prstGeom prst="rect">
+              <a:avLst/>
+            </a:prstGeom>
+            <a:ln>
+              <a:solidFill>
+                <a:schemeClr val="tx1"/>
+              </a:solidFill>
+            </a:ln>
+          </p:spPr>
+          <p:style>
+            <a:lnRef idx="2">
+              <a:schemeClr val="accent6"/>
+            </a:lnRef>
+            <a:fillRef idx="1">
+              <a:schemeClr val="lt1"/>
+            </a:fillRef>
+            <a:effectRef idx="0">
+              <a:schemeClr val="accent6"/>
+            </a:effectRef>
+            <a:fontRef idx="minor">
+              <a:schemeClr val="dk1"/>
+            </a:fontRef>
+          </p:style>
+          <p:txBody>
+            <a:bodyPr rtlCol="0" anchor="ctr"/>
+            <a:lstStyle/>
+            <a:p>
+              <a:pPr algn="ctr"/>
+              <a:r>
+                <a:rPr lang="en-US" dirty="0" smtClean="0"/>
+                <a:t>…</a:t>
+              </a:r>
+              <a:endParaRPr lang="en-US" dirty="0"/>
+            </a:p>
+          </p:txBody>
+        </p:sp>
+        <p:sp>
+          <p:nvSpPr>
+            <p:cNvPr id="38" name="Rectangle 37"/>
+            <p:cNvSpPr/>
+            <p:nvPr/>
+          </p:nvSpPr>
+          <p:spPr>
+            <a:xfrm>
+              <a:off x="5562600" y="3482420"/>
+              <a:ext cx="1219200" cy="228600"/>
+            </a:xfrm>
+            <a:prstGeom prst="rect">
+              <a:avLst/>
+            </a:prstGeom>
+            <a:ln>
+              <a:solidFill>
+                <a:schemeClr val="tx1"/>
+              </a:solidFill>
+            </a:ln>
+          </p:spPr>
+          <p:style>
+            <a:lnRef idx="2">
+              <a:schemeClr val="accent6"/>
+            </a:lnRef>
+            <a:fillRef idx="1">
+              <a:schemeClr val="lt1"/>
+            </a:fillRef>
+            <a:effectRef idx="0">
+              <a:schemeClr val="accent6"/>
+            </a:effectRef>
+            <a:fontRef idx="minor">
+              <a:schemeClr val="dk1"/>
+            </a:fontRef>
+          </p:style>
+          <p:txBody>
+            <a:bodyPr rtlCol="0" anchor="ctr"/>
+            <a:lstStyle/>
+            <a:p>
+              <a:pPr algn="ctr"/>
+              <a:r>
+                <a:rPr lang="en-US" dirty="0" err="1" smtClean="0"/>
+                <a:t>vm_flags</a:t>
+              </a:r>
+              <a:endParaRPr lang="en-US" dirty="0"/>
+            </a:p>
+          </p:txBody>
+        </p:sp>
+        <p:sp>
+          <p:nvSpPr>
+            <p:cNvPr id="39" name="Rectangle 38"/>
+            <p:cNvSpPr/>
+            <p:nvPr/>
+          </p:nvSpPr>
+          <p:spPr>
+            <a:xfrm>
+              <a:off x="5562600" y="3253820"/>
+              <a:ext cx="1219200" cy="228600"/>
+            </a:xfrm>
+            <a:prstGeom prst="rect">
+              <a:avLst/>
+            </a:prstGeom>
+            <a:ln>
+              <a:solidFill>
+                <a:schemeClr val="tx1"/>
+              </a:solidFill>
+            </a:ln>
+          </p:spPr>
+          <p:style>
+            <a:lnRef idx="2">
+              <a:schemeClr val="accent6"/>
+            </a:lnRef>
+            <a:fillRef idx="1">
+              <a:schemeClr val="lt1"/>
+            </a:fillRef>
+            <a:effectRef idx="0">
+              <a:schemeClr val="accent6"/>
+            </a:effectRef>
+            <a:fontRef idx="minor">
+              <a:schemeClr val="dk1"/>
+            </a:fontRef>
+          </p:style>
+          <p:txBody>
+            <a:bodyPr rtlCol="0" anchor="ctr"/>
+            <a:lstStyle/>
+            <a:p>
+              <a:pPr algn="ctr"/>
+              <a:r>
+                <a:rPr lang="en-US" dirty="0" err="1"/>
+                <a:t>v</a:t>
+              </a:r>
+              <a:r>
+                <a:rPr lang="en-US" dirty="0" err="1" smtClean="0"/>
+                <a:t>m_prev</a:t>
+              </a:r>
+              <a:endParaRPr lang="en-US" dirty="0"/>
+            </a:p>
+          </p:txBody>
+        </p:sp>
+        <p:sp>
+          <p:nvSpPr>
+            <p:cNvPr id="40" name="Rectangle 39"/>
+            <p:cNvSpPr/>
+            <p:nvPr/>
+          </p:nvSpPr>
+          <p:spPr>
+            <a:xfrm>
+              <a:off x="5562600" y="3024565"/>
+              <a:ext cx="1219200" cy="228600"/>
+            </a:xfrm>
+            <a:prstGeom prst="rect">
+              <a:avLst/>
+            </a:prstGeom>
+            <a:ln>
+              <a:solidFill>
+                <a:schemeClr val="tx1"/>
+              </a:solidFill>
+            </a:ln>
+          </p:spPr>
+          <p:style>
+            <a:lnRef idx="2">
+              <a:schemeClr val="accent6"/>
+            </a:lnRef>
+            <a:fillRef idx="1">
+              <a:schemeClr val="lt1"/>
+            </a:fillRef>
+            <a:effectRef idx="0">
+              <a:schemeClr val="accent6"/>
+            </a:effectRef>
+            <a:fontRef idx="minor">
+              <a:schemeClr val="dk1"/>
+            </a:fontRef>
+          </p:style>
+          <p:txBody>
+            <a:bodyPr rtlCol="0" anchor="ctr"/>
+            <a:lstStyle/>
+            <a:p>
+              <a:pPr algn="ctr"/>
+              <a:r>
+                <a:rPr lang="en-US" dirty="0" err="1"/>
+                <a:t>v</a:t>
+              </a:r>
+              <a:r>
+                <a:rPr lang="en-US" dirty="0" err="1" smtClean="0"/>
+                <a:t>m_next</a:t>
+              </a:r>
+              <a:endParaRPr lang="en-US" dirty="0"/>
+            </a:p>
+          </p:txBody>
+        </p:sp>
+        <p:sp>
+          <p:nvSpPr>
+            <p:cNvPr id="41" name="Rectangle 40"/>
+            <p:cNvSpPr/>
+            <p:nvPr/>
+          </p:nvSpPr>
+          <p:spPr>
+            <a:xfrm>
+              <a:off x="5562600" y="2811940"/>
+              <a:ext cx="1219200" cy="228600"/>
+            </a:xfrm>
+            <a:prstGeom prst="rect">
+              <a:avLst/>
+            </a:prstGeom>
+            <a:ln>
+              <a:solidFill>
+                <a:schemeClr val="tx1"/>
+              </a:solidFill>
+            </a:ln>
+          </p:spPr>
+          <p:style>
+            <a:lnRef idx="2">
+              <a:schemeClr val="accent6"/>
+            </a:lnRef>
+            <a:fillRef idx="1">
+              <a:schemeClr val="lt1"/>
+            </a:fillRef>
+            <a:effectRef idx="0">
+              <a:schemeClr val="accent6"/>
+            </a:effectRef>
+            <a:fontRef idx="minor">
+              <a:schemeClr val="dk1"/>
+            </a:fontRef>
+          </p:style>
+          <p:txBody>
+            <a:bodyPr rtlCol="0" anchor="ctr"/>
+            <a:lstStyle/>
+            <a:p>
+              <a:pPr algn="ctr"/>
+              <a:r>
+                <a:rPr lang="en-US" dirty="0" err="1" smtClean="0"/>
+                <a:t>vm_end</a:t>
+              </a:r>
+              <a:endParaRPr lang="en-US" dirty="0"/>
+            </a:p>
+          </p:txBody>
+        </p:sp>
+        <p:sp>
+          <p:nvSpPr>
+            <p:cNvPr id="42" name="TextBox 41"/>
+            <p:cNvSpPr txBox="1"/>
+            <p:nvPr/>
+          </p:nvSpPr>
+          <p:spPr>
+            <a:xfrm>
+              <a:off x="5295900" y="2175769"/>
+              <a:ext cx="1752600" cy="369332"/>
+            </a:xfrm>
+            <a:prstGeom prst="rect">
+              <a:avLst/>
+            </a:prstGeom>
+            <a:noFill/>
+          </p:spPr>
+          <p:txBody>
+            <a:bodyPr wrap="square" rtlCol="0">
+              <a:spAutoFit/>
+            </a:bodyPr>
+            <a:lstStyle/>
+            <a:p>
+              <a:r>
+                <a:rPr lang="en-US" dirty="0" err="1" smtClean="0"/>
+                <a:t>vm_area_struct</a:t>
+              </a:r>
+              <a:endParaRPr lang="en-US" dirty="0"/>
+            </a:p>
+          </p:txBody>
+        </p:sp>
+      </p:grpSp>
+      <p:grpSp>
+        <p:nvGrpSpPr>
+          <p:cNvPr id="43" name="Group 42"/>
+          <p:cNvGrpSpPr/>
+          <p:nvPr/>
+        </p:nvGrpSpPr>
+        <p:grpSpPr>
+          <a:xfrm>
+            <a:off x="7258050" y="3820280"/>
+            <a:ext cx="1752600" cy="1763851"/>
+            <a:chOff x="5295900" y="2175769"/>
+            <a:chExt cx="1752600" cy="1763851"/>
+          </a:xfrm>
+        </p:grpSpPr>
+        <p:sp>
+          <p:nvSpPr>
+            <p:cNvPr id="44" name="Rectangle 43"/>
+            <p:cNvSpPr/>
+            <p:nvPr/>
+          </p:nvSpPr>
+          <p:spPr>
+            <a:xfrm>
+              <a:off x="5562600" y="2573060"/>
+              <a:ext cx="1219200" cy="228600"/>
+            </a:xfrm>
+            <a:prstGeom prst="rect">
+              <a:avLst/>
+            </a:prstGeom>
+            <a:ln>
+              <a:solidFill>
+                <a:schemeClr val="tx1"/>
+              </a:solidFill>
+            </a:ln>
+          </p:spPr>
+          <p:style>
+            <a:lnRef idx="2">
+              <a:schemeClr val="accent6"/>
+            </a:lnRef>
+            <a:fillRef idx="1">
+              <a:schemeClr val="lt1"/>
+            </a:fillRef>
+            <a:effectRef idx="0">
+              <a:schemeClr val="accent6"/>
+            </a:effectRef>
+            <a:fontRef idx="minor">
+              <a:schemeClr val="dk1"/>
+            </a:fontRef>
+          </p:style>
+          <p:txBody>
+            <a:bodyPr rtlCol="0" anchor="ctr"/>
+            <a:lstStyle/>
+            <a:p>
+              <a:pPr algn="ctr"/>
+              <a:r>
+                <a:rPr lang="en-US" dirty="0" err="1" smtClean="0"/>
+                <a:t>vm_start</a:t>
+              </a:r>
+              <a:endParaRPr lang="en-US" dirty="0"/>
+            </a:p>
+          </p:txBody>
+        </p:sp>
+        <p:sp>
+          <p:nvSpPr>
+            <p:cNvPr id="45" name="Rectangle 44"/>
+            <p:cNvSpPr/>
+            <p:nvPr/>
+          </p:nvSpPr>
+          <p:spPr>
+            <a:xfrm>
+              <a:off x="5562600" y="3711020"/>
+              <a:ext cx="1219200" cy="228600"/>
+            </a:xfrm>
+            <a:prstGeom prst="rect">
+              <a:avLst/>
+            </a:prstGeom>
+            <a:ln>
+              <a:solidFill>
+                <a:schemeClr val="tx1"/>
+              </a:solidFill>
+            </a:ln>
+          </p:spPr>
+          <p:style>
+            <a:lnRef idx="2">
+              <a:schemeClr val="accent6"/>
+            </a:lnRef>
+            <a:fillRef idx="1">
+              <a:schemeClr val="lt1"/>
+            </a:fillRef>
+            <a:effectRef idx="0">
+              <a:schemeClr val="accent6"/>
+            </a:effectRef>
+            <a:fontRef idx="minor">
+              <a:schemeClr val="dk1"/>
+            </a:fontRef>
+          </p:style>
+          <p:txBody>
+            <a:bodyPr rtlCol="0" anchor="ctr"/>
+            <a:lstStyle/>
+            <a:p>
+              <a:pPr algn="ctr"/>
+              <a:r>
+                <a:rPr lang="en-US" dirty="0" smtClean="0"/>
+                <a:t>…</a:t>
+              </a:r>
+              <a:endParaRPr lang="en-US" dirty="0"/>
+            </a:p>
+          </p:txBody>
+        </p:sp>
+        <p:sp>
+          <p:nvSpPr>
+            <p:cNvPr id="46" name="Rectangle 45"/>
+            <p:cNvSpPr/>
+            <p:nvPr/>
+          </p:nvSpPr>
+          <p:spPr>
+            <a:xfrm>
+              <a:off x="5562600" y="3482420"/>
+              <a:ext cx="1219200" cy="228600"/>
+            </a:xfrm>
+            <a:prstGeom prst="rect">
+              <a:avLst/>
+            </a:prstGeom>
+            <a:ln>
+              <a:solidFill>
+                <a:schemeClr val="tx1"/>
+              </a:solidFill>
+            </a:ln>
+          </p:spPr>
+          <p:style>
+            <a:lnRef idx="2">
+              <a:schemeClr val="accent6"/>
+            </a:lnRef>
+            <a:fillRef idx="1">
+              <a:schemeClr val="lt1"/>
+            </a:fillRef>
+            <a:effectRef idx="0">
+              <a:schemeClr val="accent6"/>
+            </a:effectRef>
+            <a:fontRef idx="minor">
+              <a:schemeClr val="dk1"/>
+            </a:fontRef>
+          </p:style>
+          <p:txBody>
+            <a:bodyPr rtlCol="0" anchor="ctr"/>
+            <a:lstStyle/>
+            <a:p>
+              <a:pPr algn="ctr"/>
+              <a:r>
+                <a:rPr lang="en-US" dirty="0" err="1" smtClean="0"/>
+                <a:t>vm_flags</a:t>
+              </a:r>
+              <a:endParaRPr lang="en-US" dirty="0"/>
+            </a:p>
+          </p:txBody>
+        </p:sp>
+        <p:sp>
+          <p:nvSpPr>
+            <p:cNvPr id="47" name="Rectangle 46"/>
+            <p:cNvSpPr/>
+            <p:nvPr/>
+          </p:nvSpPr>
+          <p:spPr>
+            <a:xfrm>
+              <a:off x="5562600" y="3253820"/>
+              <a:ext cx="1219200" cy="228600"/>
+            </a:xfrm>
+            <a:prstGeom prst="rect">
+              <a:avLst/>
+            </a:prstGeom>
+            <a:ln>
+              <a:solidFill>
+                <a:schemeClr val="tx1"/>
+              </a:solidFill>
+            </a:ln>
+          </p:spPr>
+          <p:style>
+            <a:lnRef idx="2">
+              <a:schemeClr val="accent6"/>
+            </a:lnRef>
+            <a:fillRef idx="1">
+              <a:schemeClr val="lt1"/>
+            </a:fillRef>
+            <a:effectRef idx="0">
+              <a:schemeClr val="accent6"/>
+            </a:effectRef>
+            <a:fontRef idx="minor">
+              <a:schemeClr val="dk1"/>
+            </a:fontRef>
+          </p:style>
+          <p:txBody>
+            <a:bodyPr rtlCol="0" anchor="ctr"/>
+            <a:lstStyle/>
+            <a:p>
+              <a:pPr algn="ctr"/>
+              <a:r>
+                <a:rPr lang="en-US" dirty="0" err="1"/>
+                <a:t>v</a:t>
+              </a:r>
+              <a:r>
+                <a:rPr lang="en-US" dirty="0" err="1" smtClean="0"/>
+                <a:t>m_prev</a:t>
+              </a:r>
+              <a:endParaRPr lang="en-US" dirty="0"/>
+            </a:p>
+          </p:txBody>
+        </p:sp>
+        <p:sp>
+          <p:nvSpPr>
+            <p:cNvPr id="48" name="Rectangle 47"/>
+            <p:cNvSpPr/>
+            <p:nvPr/>
+          </p:nvSpPr>
+          <p:spPr>
+            <a:xfrm>
+              <a:off x="5562600" y="3024565"/>
+              <a:ext cx="1219200" cy="228600"/>
+            </a:xfrm>
+            <a:prstGeom prst="rect">
+              <a:avLst/>
+            </a:prstGeom>
+            <a:ln>
+              <a:solidFill>
+                <a:schemeClr val="tx1"/>
+              </a:solidFill>
+            </a:ln>
+          </p:spPr>
+          <p:style>
+            <a:lnRef idx="2">
+              <a:schemeClr val="accent6"/>
+            </a:lnRef>
+            <a:fillRef idx="1">
+              <a:schemeClr val="lt1"/>
+            </a:fillRef>
+            <a:effectRef idx="0">
+              <a:schemeClr val="accent6"/>
+            </a:effectRef>
+            <a:fontRef idx="minor">
+              <a:schemeClr val="dk1"/>
+            </a:fontRef>
+          </p:style>
+          <p:txBody>
+            <a:bodyPr rtlCol="0" anchor="ctr"/>
+            <a:lstStyle/>
+            <a:p>
+              <a:pPr algn="ctr"/>
+              <a:r>
+                <a:rPr lang="en-US" dirty="0" err="1"/>
+                <a:t>v</a:t>
+              </a:r>
+              <a:r>
+                <a:rPr lang="en-US" dirty="0" err="1" smtClean="0"/>
+                <a:t>m_next</a:t>
+              </a:r>
+              <a:endParaRPr lang="en-US" dirty="0"/>
+            </a:p>
+          </p:txBody>
+        </p:sp>
+        <p:sp>
+          <p:nvSpPr>
+            <p:cNvPr id="49" name="Rectangle 48"/>
+            <p:cNvSpPr/>
+            <p:nvPr/>
+          </p:nvSpPr>
+          <p:spPr>
+            <a:xfrm>
+              <a:off x="5562600" y="2811940"/>
+              <a:ext cx="1219200" cy="228600"/>
+            </a:xfrm>
+            <a:prstGeom prst="rect">
+              <a:avLst/>
+            </a:prstGeom>
+            <a:ln>
+              <a:solidFill>
+                <a:schemeClr val="tx1"/>
+              </a:solidFill>
+            </a:ln>
+          </p:spPr>
+          <p:style>
+            <a:lnRef idx="2">
+              <a:schemeClr val="accent6"/>
+            </a:lnRef>
+            <a:fillRef idx="1">
+              <a:schemeClr val="lt1"/>
+            </a:fillRef>
+            <a:effectRef idx="0">
+              <a:schemeClr val="accent6"/>
+            </a:effectRef>
+            <a:fontRef idx="minor">
+              <a:schemeClr val="dk1"/>
+            </a:fontRef>
+          </p:style>
+          <p:txBody>
+            <a:bodyPr rtlCol="0" anchor="ctr"/>
+            <a:lstStyle/>
+            <a:p>
+              <a:pPr algn="ctr"/>
+              <a:r>
+                <a:rPr lang="en-US" dirty="0" err="1" smtClean="0"/>
+                <a:t>vm_end</a:t>
+              </a:r>
+              <a:endParaRPr lang="en-US" dirty="0"/>
+            </a:p>
+          </p:txBody>
+        </p:sp>
+        <p:sp>
+          <p:nvSpPr>
+            <p:cNvPr id="50" name="TextBox 49"/>
+            <p:cNvSpPr txBox="1"/>
+            <p:nvPr/>
+          </p:nvSpPr>
+          <p:spPr>
+            <a:xfrm>
+              <a:off x="5295900" y="2175769"/>
+              <a:ext cx="1752600" cy="369332"/>
+            </a:xfrm>
+            <a:prstGeom prst="rect">
+              <a:avLst/>
+            </a:prstGeom>
+            <a:noFill/>
+          </p:spPr>
+          <p:txBody>
+            <a:bodyPr wrap="square" rtlCol="0">
+              <a:spAutoFit/>
+            </a:bodyPr>
+            <a:lstStyle/>
+            <a:p>
+              <a:r>
+                <a:rPr lang="en-US" dirty="0" err="1" smtClean="0"/>
+                <a:t>vm_area_struct</a:t>
+              </a:r>
+              <a:endParaRPr lang="en-US" dirty="0"/>
+            </a:p>
+          </p:txBody>
+        </p:sp>
+      </p:grpSp>
+      <p:cxnSp>
+        <p:nvCxnSpPr>
+          <p:cNvPr id="54" name="Straight Arrow Connector 53"/>
+          <p:cNvCxnSpPr>
+            <a:stCxn id="31" idx="3"/>
+            <a:endCxn id="40" idx="1"/>
+          </p:cNvCxnSpPr>
+          <p:nvPr/>
+        </p:nvCxnSpPr>
+        <p:spPr>
+          <a:xfrm>
+            <a:off x="4724400" y="4783376"/>
+            <a:ext cx="800100" cy="0"/>
+          </a:xfrm>
+          <a:prstGeom prst="straightConnector1">
+            <a:avLst/>
+          </a:prstGeom>
+          <a:ln>
+            <a:tailEnd type="triangle"/>
+          </a:ln>
+        </p:spPr>
+        <p:style>
+          <a:lnRef idx="1">
+            <a:schemeClr val="dk1"/>
+          </a:lnRef>
+          <a:fillRef idx="0">
+            <a:schemeClr val="dk1"/>
+          </a:fillRef>
+          <a:effectRef idx="0">
+            <a:schemeClr val="dk1"/>
+          </a:effectRef>
+          <a:fontRef idx="minor">
+            <a:schemeClr val="tx1"/>
+          </a:fontRef>
+        </p:style>
+      </p:cxnSp>
+      <p:cxnSp>
+        <p:nvCxnSpPr>
+          <p:cNvPr id="56" name="Straight Arrow Connector 55"/>
+          <p:cNvCxnSpPr>
+            <a:stCxn id="40" idx="3"/>
+            <a:endCxn id="48" idx="1"/>
+          </p:cNvCxnSpPr>
+          <p:nvPr/>
+        </p:nvCxnSpPr>
+        <p:spPr>
+          <a:xfrm>
+            <a:off x="6743700" y="4783376"/>
+            <a:ext cx="781050" cy="0"/>
+          </a:xfrm>
+          <a:prstGeom prst="straightConnector1">
+            <a:avLst/>
+          </a:prstGeom>
+          <a:ln>
+            <a:tailEnd type="triangle"/>
+          </a:ln>
+        </p:spPr>
+        <p:style>
+          <a:lnRef idx="1">
+            <a:schemeClr val="dk1"/>
+          </a:lnRef>
+          <a:fillRef idx="0">
+            <a:schemeClr val="dk1"/>
+          </a:fillRef>
+          <a:effectRef idx="0">
+            <a:schemeClr val="dk1"/>
+          </a:effectRef>
+          <a:fontRef idx="minor">
+            <a:schemeClr val="tx1"/>
+          </a:fontRef>
+        </p:style>
+      </p:cxnSp>
+      <p:cxnSp>
+        <p:nvCxnSpPr>
+          <p:cNvPr id="58" name="Straight Arrow Connector 57"/>
+          <p:cNvCxnSpPr>
+            <a:stCxn id="39" idx="1"/>
+            <a:endCxn id="30" idx="3"/>
+          </p:cNvCxnSpPr>
+          <p:nvPr/>
+        </p:nvCxnSpPr>
+        <p:spPr>
+          <a:xfrm flipH="1">
+            <a:off x="4724400" y="5012631"/>
+            <a:ext cx="800100" cy="0"/>
+          </a:xfrm>
+          <a:prstGeom prst="straightConnector1">
+            <a:avLst/>
+          </a:prstGeom>
+          <a:ln>
+            <a:tailEnd type="triangle"/>
+          </a:ln>
+        </p:spPr>
+        <p:style>
+          <a:lnRef idx="1">
+            <a:schemeClr val="dk1"/>
+          </a:lnRef>
+          <a:fillRef idx="0">
+            <a:schemeClr val="dk1"/>
+          </a:fillRef>
+          <a:effectRef idx="0">
+            <a:schemeClr val="dk1"/>
+          </a:effectRef>
+          <a:fontRef idx="minor">
+            <a:schemeClr val="tx1"/>
+          </a:fontRef>
+        </p:style>
+      </p:cxnSp>
+      <p:cxnSp>
+        <p:nvCxnSpPr>
+          <p:cNvPr id="60" name="Straight Arrow Connector 59"/>
+          <p:cNvCxnSpPr>
+            <a:stCxn id="47" idx="1"/>
+            <a:endCxn id="39" idx="3"/>
+          </p:cNvCxnSpPr>
+          <p:nvPr/>
+        </p:nvCxnSpPr>
+        <p:spPr>
+          <a:xfrm flipH="1">
+            <a:off x="6743700" y="5012631"/>
+            <a:ext cx="781050" cy="0"/>
+          </a:xfrm>
+          <a:prstGeom prst="straightConnector1">
+            <a:avLst/>
+          </a:prstGeom>
+          <a:ln>
+            <a:tailEnd type="triangle"/>
+          </a:ln>
+        </p:spPr>
+        <p:style>
+          <a:lnRef idx="1">
+            <a:schemeClr val="dk1"/>
+          </a:lnRef>
+          <a:fillRef idx="0">
+            <a:schemeClr val="dk1"/>
+          </a:fillRef>
+          <a:effectRef idx="0">
+            <a:schemeClr val="dk1"/>
+          </a:effectRef>
+          <a:fontRef idx="minor">
+            <a:schemeClr val="tx1"/>
+          </a:fontRef>
+        </p:style>
+      </p:cxnSp>
+      <p:cxnSp>
+        <p:nvCxnSpPr>
+          <p:cNvPr id="62" name="Elbow Connector 61"/>
+          <p:cNvCxnSpPr>
+            <a:stCxn id="16" idx="3"/>
+            <a:endCxn id="42" idx="0"/>
+          </p:cNvCxnSpPr>
+          <p:nvPr/>
+        </p:nvCxnSpPr>
+        <p:spPr>
+          <a:xfrm>
+            <a:off x="4724400" y="2089062"/>
+            <a:ext cx="1409700" cy="1731218"/>
+          </a:xfrm>
+          <a:prstGeom prst="bentConnector2">
+            <a:avLst/>
+          </a:prstGeom>
+          <a:ln>
+            <a:tailEnd type="triangle"/>
+          </a:ln>
+        </p:spPr>
+        <p:style>
+          <a:lnRef idx="1">
+            <a:schemeClr val="dk1"/>
+          </a:lnRef>
+          <a:fillRef idx="0">
+            <a:schemeClr val="dk1"/>
+          </a:fillRef>
+          <a:effectRef idx="0">
+            <a:schemeClr val="dk1"/>
+          </a:effectRef>
+          <a:fontRef idx="minor">
+            <a:schemeClr val="tx1"/>
+          </a:fontRef>
+        </p:style>
+      </p:cxnSp>
+      <p:grpSp>
+        <p:nvGrpSpPr>
+          <p:cNvPr id="76" name="Group 75"/>
+          <p:cNvGrpSpPr/>
+          <p:nvPr/>
+        </p:nvGrpSpPr>
+        <p:grpSpPr>
+          <a:xfrm>
+            <a:off x="628650" y="3354394"/>
+            <a:ext cx="1485900" cy="2814673"/>
+            <a:chOff x="628650" y="3354394"/>
+            <a:chExt cx="1485900" cy="2814673"/>
+          </a:xfrm>
+        </p:grpSpPr>
+        <p:sp>
+          <p:nvSpPr>
+            <p:cNvPr id="64" name="TextBox 63"/>
+            <p:cNvSpPr txBox="1"/>
+            <p:nvPr/>
+          </p:nvSpPr>
+          <p:spPr>
+            <a:xfrm>
+              <a:off x="628650" y="3354394"/>
+              <a:ext cx="1485900" cy="646331"/>
+            </a:xfrm>
+            <a:prstGeom prst="rect">
+              <a:avLst/>
+            </a:prstGeom>
+            <a:noFill/>
+          </p:spPr>
+          <p:txBody>
+            <a:bodyPr wrap="square" rtlCol="0">
+              <a:spAutoFit/>
+            </a:bodyPr>
+            <a:lstStyle/>
+            <a:p>
+              <a:pPr algn="ctr"/>
+              <a:r>
+                <a:rPr lang="en-US" dirty="0" smtClean="0"/>
+                <a:t>Virtual Memory</a:t>
+              </a:r>
+              <a:endParaRPr lang="en-US" dirty="0"/>
+            </a:p>
+          </p:txBody>
+        </p:sp>
+        <p:grpSp>
+          <p:nvGrpSpPr>
+            <p:cNvPr id="75" name="Group 74"/>
+            <p:cNvGrpSpPr/>
+            <p:nvPr/>
+          </p:nvGrpSpPr>
+          <p:grpSpPr>
+            <a:xfrm>
+              <a:off x="723900" y="3969547"/>
+              <a:ext cx="1295400" cy="2199520"/>
+              <a:chOff x="723900" y="3969547"/>
+              <a:chExt cx="1295400" cy="2199520"/>
+            </a:xfrm>
+          </p:grpSpPr>
+          <p:grpSp>
+            <p:nvGrpSpPr>
+              <p:cNvPr id="74" name="Group 73"/>
+              <p:cNvGrpSpPr/>
+              <p:nvPr/>
+            </p:nvGrpSpPr>
+            <p:grpSpPr>
+              <a:xfrm>
+                <a:off x="723900" y="3969547"/>
+                <a:ext cx="1295400" cy="2199520"/>
+                <a:chOff x="723900" y="3969547"/>
+                <a:chExt cx="1295400" cy="2199520"/>
+              </a:xfrm>
+            </p:grpSpPr>
+            <p:sp>
+              <p:nvSpPr>
+                <p:cNvPr id="63" name="Rectangle 62"/>
+                <p:cNvSpPr/>
+                <p:nvPr/>
+              </p:nvSpPr>
+              <p:spPr>
+                <a:xfrm>
+                  <a:off x="723900" y="3969547"/>
+                  <a:ext cx="1295400" cy="2199520"/>
+                </a:xfrm>
+                <a:prstGeom prst="rect">
+                  <a:avLst/>
+                </a:prstGeom>
+                <a:solidFill>
+                  <a:schemeClr val="bg1"/>
+                </a:solidFill>
+                <a:ln>
+                  <a:solidFill>
+                    <a:schemeClr val="tx1"/>
+                  </a:solidFill>
+                </a:ln>
+              </p:spPr>
+              <p:style>
+                <a:lnRef idx="2">
+                  <a:schemeClr val="accent1">
+                    <a:shade val="50000"/>
+                  </a:schemeClr>
+                </a:lnRef>
+                <a:fillRef idx="1">
+                  <a:schemeClr val="accent1"/>
+                </a:fillRef>
+                <a:effectRef idx="0">
+                  <a:schemeClr val="accent1"/>
+                </a:effectRef>
+                <a:fontRef idx="minor">
+                  <a:schemeClr val="lt1"/>
+                </a:fontRef>
+              </p:style>
+              <p:txBody>
+                <a:bodyPr rtlCol="0" anchor="ctr"/>
+                <a:lstStyle/>
+                <a:p>
+                  <a:pPr algn="ctr"/>
+                  <a:endParaRPr lang="en-US"/>
+                </a:p>
+              </p:txBody>
+            </p:sp>
+            <p:cxnSp>
+              <p:nvCxnSpPr>
+                <p:cNvPr id="66" name="Straight Connector 65"/>
+                <p:cNvCxnSpPr/>
+                <p:nvPr/>
+              </p:nvCxnSpPr>
+              <p:spPr>
+                <a:xfrm flipV="1">
+                  <a:off x="723900" y="4452891"/>
+                  <a:ext cx="1295400" cy="3560"/>
+                </a:xfrm>
+                <a:prstGeom prst="line">
+                  <a:avLst/>
+                </a:prstGeom>
+              </p:spPr>
+              <p:style>
+                <a:lnRef idx="1">
+                  <a:schemeClr val="dk1"/>
+                </a:lnRef>
+                <a:fillRef idx="0">
+                  <a:schemeClr val="dk1"/>
+                </a:fillRef>
+                <a:effectRef idx="0">
+                  <a:schemeClr val="dk1"/>
+                </a:effectRef>
+                <a:fontRef idx="minor">
+                  <a:schemeClr val="tx1"/>
+                </a:fontRef>
+              </p:style>
+            </p:cxnSp>
+            <p:sp>
+              <p:nvSpPr>
+                <p:cNvPr id="73" name="TextBox 72"/>
+                <p:cNvSpPr txBox="1"/>
+                <p:nvPr/>
+              </p:nvSpPr>
+              <p:spPr>
+                <a:xfrm>
+                  <a:off x="977900" y="4568373"/>
+                  <a:ext cx="901700" cy="369332"/>
+                </a:xfrm>
+                <a:prstGeom prst="rect">
+                  <a:avLst/>
+                </a:prstGeom>
+                <a:noFill/>
+              </p:spPr>
+              <p:txBody>
+                <a:bodyPr wrap="square" rtlCol="0">
+                  <a:spAutoFit/>
+                </a:bodyPr>
+                <a:lstStyle/>
+                <a:p>
+                  <a:r>
+                    <a:rPr lang="en-US" dirty="0" smtClean="0"/>
+                    <a:t>Stack</a:t>
+                  </a:r>
+                  <a:endParaRPr lang="en-US" dirty="0"/>
+                </a:p>
+              </p:txBody>
+            </p:sp>
+          </p:grpSp>
+          <p:cxnSp>
+            <p:nvCxnSpPr>
+              <p:cNvPr id="68" name="Straight Connector 67"/>
+              <p:cNvCxnSpPr/>
+              <p:nvPr/>
+            </p:nvCxnSpPr>
+            <p:spPr>
+              <a:xfrm flipV="1">
+                <a:off x="723900" y="5063232"/>
+                <a:ext cx="1295400" cy="3560"/>
+              </a:xfrm>
+              <a:prstGeom prst="line">
+                <a:avLst/>
+              </a:prstGeom>
+            </p:spPr>
+            <p:style>
+              <a:lnRef idx="1">
+                <a:schemeClr val="dk1"/>
+              </a:lnRef>
+              <a:fillRef idx="0">
+                <a:schemeClr val="dk1"/>
+              </a:fillRef>
+              <a:effectRef idx="0">
+                <a:schemeClr val="dk1"/>
+              </a:effectRef>
+              <a:fontRef idx="minor">
+                <a:schemeClr val="tx1"/>
+              </a:fontRef>
+            </p:style>
+          </p:cxnSp>
+        </p:grpSp>
+      </p:grpSp>
+      <p:cxnSp>
+        <p:nvCxnSpPr>
+          <p:cNvPr id="70" name="Straight Arrow Connector 69"/>
+          <p:cNvCxnSpPr>
+            <a:stCxn id="27" idx="1"/>
+          </p:cNvCxnSpPr>
+          <p:nvPr/>
+        </p:nvCxnSpPr>
+        <p:spPr>
+          <a:xfrm flipH="1">
+            <a:off x="2019300" y="4331871"/>
+            <a:ext cx="1485900" cy="121020"/>
+          </a:xfrm>
+          <a:prstGeom prst="straightConnector1">
+            <a:avLst/>
+          </a:prstGeom>
+          <a:ln>
+            <a:solidFill>
+              <a:schemeClr val="tx1"/>
+            </a:solidFill>
+            <a:prstDash val="lgDash"/>
+            <a:tailEnd type="triangle"/>
+          </a:ln>
+        </p:spPr>
+        <p:style>
+          <a:lnRef idx="1">
+            <a:schemeClr val="dk1"/>
+          </a:lnRef>
+          <a:fillRef idx="0">
+            <a:schemeClr val="dk1"/>
+          </a:fillRef>
+          <a:effectRef idx="0">
+            <a:schemeClr val="dk1"/>
+          </a:effectRef>
+          <a:fontRef idx="minor">
+            <a:schemeClr val="tx1"/>
+          </a:fontRef>
+        </p:style>
+      </p:cxnSp>
+      <p:cxnSp>
+        <p:nvCxnSpPr>
+          <p:cNvPr id="72" name="Straight Arrow Connector 71"/>
+          <p:cNvCxnSpPr>
+            <a:stCxn id="32" idx="1"/>
+            <a:endCxn id="63" idx="3"/>
+          </p:cNvCxnSpPr>
+          <p:nvPr/>
+        </p:nvCxnSpPr>
+        <p:spPr>
+          <a:xfrm flipH="1">
+            <a:off x="2019300" y="4570751"/>
+            <a:ext cx="1485900" cy="498556"/>
+          </a:xfrm>
+          <a:prstGeom prst="straightConnector1">
+            <a:avLst/>
+          </a:prstGeom>
+          <a:ln>
+            <a:solidFill>
+              <a:schemeClr val="tx1"/>
+            </a:solidFill>
+            <a:prstDash val="lgDash"/>
+            <a:tailEnd type="triangle"/>
+          </a:ln>
+        </p:spPr>
+        <p:style>
+          <a:lnRef idx="1">
+            <a:schemeClr val="dk1"/>
+          </a:lnRef>
+          <a:fillRef idx="0">
+            <a:schemeClr val="dk1"/>
+          </a:fillRef>
+          <a:effectRef idx="0">
+            <a:schemeClr val="dk1"/>
+          </a:effectRef>
+          <a:fontRef idx="minor">
+            <a:schemeClr val="tx1"/>
+          </a:fontRef>
+        </p:style>
+      </p:cxnSp>
+    </p:spTree>
+    <p:extLst>
+      <p:ext uri="{BB962C8B-B14F-4D97-AF65-F5344CB8AC3E}">
+        <p14:creationId xmlns:p14="http://schemas.microsoft.com/office/powerpoint/2010/main" val="131456468"/>
+      </p:ext>
+    </p:extLst>
+  </p:cSld>
+  <p:clrMapOvr>
+    <a:masterClrMapping/>
+  </p:clrMapOvr>
+</p:sld>
+</file>
+
+<file path=ppt/slides/slide8.xml><?xml version="1.0" encoding="utf-8"?>
+<p:sld xmlns:a="http://schemas.openxmlformats.org/drawingml/2006/main" xmlns:r="http://schemas.openxmlformats.org/officeDocument/2006/relationships" xmlns:p="http://schemas.openxmlformats.org/presentationml/2006/main">
+  <p:cSld>
+    <p:spTree>
+      <p:nvGrpSpPr>
+        <p:cNvPr id="1" name=""/>
+        <p:cNvGrpSpPr/>
+        <p:nvPr/>
+      </p:nvGrpSpPr>
+      <p:grpSpPr>
+        <a:xfrm>
+          <a:off x="0" y="0"/>
+          <a:ext cx="0" cy="0"/>
+          <a:chOff x="0" y="0"/>
+          <a:chExt cx="0" cy="0"/>
+        </a:xfrm>
+      </p:grpSpPr>
+      <p:sp>
+        <p:nvSpPr>
+          <p:cNvPr id="2" name="Title 1"/>
+          <p:cNvSpPr>
+            <a:spLocks noGrp="1"/>
+          </p:cNvSpPr>
+          <p:nvPr>
+            <p:ph type="title"/>
+          </p:nvPr>
+        </p:nvSpPr>
+        <p:spPr/>
+        <p:txBody>
+          <a:bodyPr/>
+          <a:lstStyle/>
+          <a:p>
+            <a:r>
+              <a:rPr lang="en-US" dirty="0" smtClean="0"/>
+              <a:t>Files Slides</a:t>
+            </a:r>
+            <a:endParaRPr lang="en-US" dirty="0"/>
+          </a:p>
+        </p:txBody>
+      </p:sp>
+      <p:sp>
+        <p:nvSpPr>
+          <p:cNvPr id="3" name="Content Placeholder 2"/>
+          <p:cNvSpPr>
+            <a:spLocks noGrp="1"/>
+          </p:cNvSpPr>
+          <p:nvPr>
+            <p:ph idx="1"/>
+          </p:nvPr>
+        </p:nvSpPr>
+        <p:spPr/>
+        <p:txBody>
+          <a:bodyPr/>
+          <a:lstStyle/>
+          <a:p>
+            <a:r>
+              <a:rPr lang="en-US" dirty="0" smtClean="0"/>
+              <a:t>Remove if the file export option does not get completed</a:t>
+            </a:r>
+            <a:endParaRPr lang="en-US" dirty="0"/>
+          </a:p>
+        </p:txBody>
+      </p:sp>
+      <p:sp>
+        <p:nvSpPr>
+          <p:cNvPr id="4" name="Footer Placeholder 3"/>
+          <p:cNvSpPr>
+            <a:spLocks noGrp="1"/>
+          </p:cNvSpPr>
+          <p:nvPr>
+            <p:ph type="ftr" sz="quarter" idx="11"/>
+          </p:nvPr>
+        </p:nvSpPr>
+        <p:spPr/>
+        <p:txBody>
+          <a:bodyPr/>
+          <a:lstStyle/>
+          <a:p>
+            <a:r>
+              <a:rPr lang="en-US" smtClean="0"/>
+              <a:t>CSE 522S – Advanced Operating Systems</a:t>
+            </a:r>
+            <a:endParaRPr lang="en-US" dirty="0"/>
+          </a:p>
+        </p:txBody>
+      </p:sp>
+      <p:sp>
+        <p:nvSpPr>
+          <p:cNvPr id="5" name="Slide Number Placeholder 4"/>
+          <p:cNvSpPr>
+            <a:spLocks noGrp="1"/>
+          </p:cNvSpPr>
+          <p:nvPr>
+            <p:ph type="sldNum" sz="quarter" idx="12"/>
+          </p:nvPr>
+        </p:nvSpPr>
+        <p:spPr/>
+        <p:txBody>
+          <a:bodyPr/>
+          <a:lstStyle/>
+          <a:p>
+            <a:fld id="{A773B20C-5347-4FF9-A9F0-76F937F60217}" type="slidenum">
+              <a:rPr lang="en-US" smtClean="0"/>
+              <a:pPr/>
+              <a:t>8</a:t>
+            </a:fld>
+            <a:endParaRPr lang="en-US"/>
+          </a:p>
+        </p:txBody>
+      </p:sp>
+    </p:spTree>
+    <p:extLst>
+      <p:ext uri="{BB962C8B-B14F-4D97-AF65-F5344CB8AC3E}">
+        <p14:creationId xmlns:p14="http://schemas.microsoft.com/office/powerpoint/2010/main" val="118790339"/>
+      </p:ext>
+    </p:extLst>
+  </p:cSld>
+  <p:clrMapOvr>
+    <a:masterClrMapping/>
+  </p:clrMapOvr>
+</p:sld>
+</file>
+
+<file path=ppt/slides/slide9.xml><?xml version="1.0" encoding="utf-8"?>
+<p:sld xmlns:a="http://schemas.openxmlformats.org/drawingml/2006/main" xmlns:r="http://schemas.openxmlformats.org/officeDocument/2006/relationships" xmlns:p="http://schemas.openxmlformats.org/presentationml/2006/main">
+  <p:cSld>
+    <p:spTree>
+      <p:nvGrpSpPr>
+        <p:cNvPr id="1" name=""/>
+        <p:cNvGrpSpPr/>
+        <p:nvPr/>
+      </p:nvGrpSpPr>
+      <p:grpSpPr>
+        <a:xfrm>
+          <a:off x="0" y="0"/>
+          <a:ext cx="0" cy="0"/>
+          <a:chOff x="0" y="0"/>
+          <a:chExt cx="0" cy="0"/>
+        </a:xfrm>
+      </p:grpSpPr>
+      <p:sp>
+        <p:nvSpPr>
+          <p:cNvPr id="2" name="Title 1"/>
+          <p:cNvSpPr>
+            <a:spLocks noGrp="1"/>
+          </p:cNvSpPr>
+          <p:nvPr>
+            <p:ph type="title"/>
+          </p:nvPr>
+        </p:nvSpPr>
+        <p:spPr/>
+        <p:txBody>
+          <a:bodyPr/>
+          <a:lstStyle/>
+          <a:p>
+            <a:r>
+              <a:rPr lang="en-US" dirty="0" smtClean="0"/>
+              <a:t>Architecture</a:t>
+            </a:r>
+            <a:endParaRPr lang="en-US" dirty="0"/>
+          </a:p>
+        </p:txBody>
+      </p:sp>
+      <p:sp>
+        <p:nvSpPr>
+          <p:cNvPr id="4" name="Footer Placeholder 3"/>
+          <p:cNvSpPr>
+            <a:spLocks noGrp="1"/>
+          </p:cNvSpPr>
+          <p:nvPr>
+            <p:ph type="ftr" sz="quarter" idx="11"/>
+          </p:nvPr>
+        </p:nvSpPr>
+        <p:spPr/>
+        <p:txBody>
+          <a:bodyPr/>
+          <a:lstStyle/>
+          <a:p>
+            <a:r>
+              <a:rPr lang="en-US" smtClean="0"/>
+              <a:t>CSE 522S – Advanced Operating Systems</a:t>
+            </a:r>
+            <a:endParaRPr lang="en-US" dirty="0"/>
+          </a:p>
+        </p:txBody>
+      </p:sp>
+      <p:sp>
+        <p:nvSpPr>
+          <p:cNvPr id="5" name="Slide Number Placeholder 4"/>
+          <p:cNvSpPr>
+            <a:spLocks noGrp="1"/>
+          </p:cNvSpPr>
+          <p:nvPr>
+            <p:ph type="sldNum" sz="quarter" idx="12"/>
+          </p:nvPr>
+        </p:nvSpPr>
+        <p:spPr/>
+        <p:txBody>
+          <a:bodyPr/>
+          <a:lstStyle/>
+          <a:p>
+            <a:fld id="{A773B20C-5347-4FF9-A9F0-76F937F60217}" type="slidenum">
+              <a:rPr lang="en-US" smtClean="0"/>
+              <a:pPr/>
+              <a:t>9</a:t>
             </a:fld>
             <a:endParaRPr lang="en-US"/>
           </a:p>
@@ -4456,7 +8089,7 @@
         </p:spPr>
         <p:txBody>
           <a:bodyPr>
-            <a:normAutofit fontScale="85000" lnSpcReduction="10000"/>
+            <a:normAutofit fontScale="92500" lnSpcReduction="20000"/>
           </a:bodyPr>
           <a:lstStyle/>
           <a:p>
@@ -4477,16 +8110,9 @@
             <a:pPr lvl="1"/>
             <a:r>
               <a:rPr lang="en-US" dirty="0" smtClean="0"/>
-              <a:t>Commands the module through a </a:t>
-            </a:r>
-            <a:r>
-              <a:rPr lang="en-US" dirty="0" err="1" smtClean="0"/>
-              <a:t>sysfs</a:t>
-            </a:r>
-            <a:r>
-              <a:rPr lang="en-US" dirty="0" smtClean="0"/>
-              <a:t> file</a:t>
-            </a:r>
+              <a:t>Initiates snapshot of kernel memory</a:t>
+            </a:r>
+            <a:endParaRPr lang="en-US" dirty="0" smtClean="0"/>
           </a:p>
           <a:p>
             <a:pPr lvl="1"/>
@@ -4499,16 +8125,12 @@
             <a:pPr lvl="1"/>
             <a:r>
               <a:rPr lang="en-US" dirty="0" smtClean="0"/>
-              <a:t>Controls export frequency</a:t>
-            </a:r>
-          </a:p>
-          <a:p>
-            <a:pPr lvl="1"/>
+              <a:t>Controls </a:t>
+            </a:r>
             <a:r>
               <a:rPr lang="en-US" dirty="0" smtClean="0"/>
-              <a:t>Controls exported elements</a:t>
-            </a:r>
-            <a:endParaRPr lang="en-US" dirty="0" smtClean="0"/>
+              <a:t>exported elements</a:t>
+            </a:r>
           </a:p>
           <a:p>
             <a:r>
@@ -4557,869 +8179,6 @@
       </p:par>
     </p:tnLst>
   </p:timing>
-</p:sld>
-</file>
-
-<file path=ppt/slides/slide5.xml><?xml version="1.0" encoding="utf-8"?>
-<p:sld xmlns:a="http://schemas.openxmlformats.org/drawingml/2006/main" xmlns:r="http://schemas.openxmlformats.org/officeDocument/2006/relationships" xmlns:p="http://schemas.openxmlformats.org/presentationml/2006/main">
-  <p:cSld>
-    <p:spTree>
-      <p:nvGrpSpPr>
-        <p:cNvPr id="1" name=""/>
-        <p:cNvGrpSpPr/>
-        <p:nvPr/>
-      </p:nvGrpSpPr>
-      <p:grpSpPr>
-        <a:xfrm>
-          <a:off x="0" y="0"/>
-          <a:ext cx="0" cy="0"/>
-          <a:chOff x="0" y="0"/>
-          <a:chExt cx="0" cy="0"/>
-        </a:xfrm>
-      </p:grpSpPr>
-      <p:sp>
-        <p:nvSpPr>
-          <p:cNvPr id="2" name="Title 1"/>
-          <p:cNvSpPr>
-            <a:spLocks noGrp="1"/>
-          </p:cNvSpPr>
-          <p:nvPr>
-            <p:ph type="title"/>
-          </p:nvPr>
-        </p:nvSpPr>
-        <p:spPr/>
-        <p:txBody>
-          <a:bodyPr/>
-          <a:lstStyle/>
-          <a:p>
-            <a:r>
-              <a:rPr lang="en-US" dirty="0" smtClean="0"/>
-              <a:t>The Linux Process</a:t>
-            </a:r>
-            <a:endParaRPr lang="en-US" dirty="0"/>
-          </a:p>
-        </p:txBody>
-      </p:sp>
-      <p:sp>
-        <p:nvSpPr>
-          <p:cNvPr id="3" name="Content Placeholder 2"/>
-          <p:cNvSpPr>
-            <a:spLocks noGrp="1"/>
-          </p:cNvSpPr>
-          <p:nvPr>
-            <p:ph idx="1"/>
-          </p:nvPr>
-        </p:nvSpPr>
-        <p:spPr>
-          <a:xfrm>
-            <a:off x="457200" y="1295400"/>
-            <a:ext cx="4419600" cy="4830763"/>
-          </a:xfrm>
-        </p:spPr>
-        <p:txBody>
-          <a:bodyPr>
-            <a:normAutofit/>
-          </a:bodyPr>
-          <a:lstStyle/>
-          <a:p>
-            <a:r>
-              <a:rPr lang="en-US" sz="1800" dirty="0" smtClean="0"/>
-              <a:t>Represented by the </a:t>
-            </a:r>
-            <a:r>
-              <a:rPr lang="en-US" sz="1800" dirty="0" err="1" smtClean="0"/>
-              <a:t>task_struct</a:t>
-            </a:r>
-            <a:endParaRPr lang="en-US" sz="1800" dirty="0" smtClean="0"/>
-          </a:p>
-          <a:p>
-            <a:r>
-              <a:rPr lang="en-US" sz="1800" dirty="0" smtClean="0"/>
-              <a:t>Processes </a:t>
-            </a:r>
-            <a:r>
-              <a:rPr lang="en-US" sz="1800" dirty="0" err="1" smtClean="0"/>
-              <a:t>task_structs</a:t>
-            </a:r>
-            <a:r>
-              <a:rPr lang="en-US" sz="1800" dirty="0" smtClean="0"/>
-              <a:t> are linked together</a:t>
-            </a:r>
-          </a:p>
-          <a:p>
-            <a:r>
-              <a:rPr lang="en-US" sz="1800" dirty="0" smtClean="0"/>
-              <a:t>Approximately 1700 bytes in size, much of which are pointers</a:t>
-            </a:r>
-          </a:p>
-          <a:p>
-            <a:r>
-              <a:rPr lang="en-US" sz="1800" dirty="0" smtClean="0"/>
-              <a:t>Included attributes touch many sub-systems in kernel</a:t>
-            </a:r>
-          </a:p>
-          <a:p>
-            <a:pPr lvl="1"/>
-            <a:r>
-              <a:rPr lang="en-US" sz="1600" dirty="0" smtClean="0"/>
-              <a:t>Memory Management Unit (MMU)</a:t>
-            </a:r>
-          </a:p>
-          <a:p>
-            <a:pPr lvl="1"/>
-            <a:r>
-              <a:rPr lang="en-US" sz="1600" dirty="0" smtClean="0"/>
-              <a:t>File System (FS)</a:t>
-            </a:r>
-          </a:p>
-          <a:p>
-            <a:pPr lvl="1"/>
-            <a:r>
-              <a:rPr lang="en-US" sz="1600" dirty="0" smtClean="0"/>
-              <a:t>Completely Fair Scheduler (CFS)</a:t>
-            </a:r>
-          </a:p>
-          <a:p>
-            <a:r>
-              <a:rPr lang="en-US" sz="1800" dirty="0" smtClean="0"/>
-              <a:t>Exported by the module when the “--task” command is provided to </a:t>
-            </a:r>
-            <a:r>
-              <a:rPr lang="en-US" sz="1800" dirty="0" err="1" smtClean="0"/>
-              <a:t>tskdmp</a:t>
-            </a:r>
-            <a:endParaRPr lang="en-US" sz="1800" dirty="0" smtClean="0"/>
-          </a:p>
-          <a:p>
-            <a:endParaRPr lang="en-US" sz="1800" dirty="0" smtClean="0"/>
-          </a:p>
-          <a:p>
-            <a:endParaRPr lang="en-US" sz="1800" dirty="0" smtClean="0"/>
-          </a:p>
-          <a:p>
-            <a:endParaRPr lang="en-US" sz="1800" dirty="0" smtClean="0"/>
-          </a:p>
-          <a:p>
-            <a:endParaRPr lang="en-US" sz="1800" dirty="0"/>
-          </a:p>
-        </p:txBody>
-      </p:sp>
-      <p:sp>
-        <p:nvSpPr>
-          <p:cNvPr id="4" name="Footer Placeholder 3"/>
-          <p:cNvSpPr>
-            <a:spLocks noGrp="1"/>
-          </p:cNvSpPr>
-          <p:nvPr>
-            <p:ph type="ftr" sz="quarter" idx="11"/>
-          </p:nvPr>
-        </p:nvSpPr>
-        <p:spPr/>
-        <p:txBody>
-          <a:bodyPr/>
-          <a:lstStyle/>
-          <a:p>
-            <a:r>
-              <a:rPr lang="en-US" smtClean="0"/>
-              <a:t>CSE 522S – Advanced Operating Systems</a:t>
-            </a:r>
-            <a:endParaRPr lang="en-US" dirty="0"/>
-          </a:p>
-        </p:txBody>
-      </p:sp>
-      <p:sp>
-        <p:nvSpPr>
-          <p:cNvPr id="5" name="Slide Number Placeholder 4"/>
-          <p:cNvSpPr>
-            <a:spLocks noGrp="1"/>
-          </p:cNvSpPr>
-          <p:nvPr>
-            <p:ph type="sldNum" sz="quarter" idx="12"/>
-          </p:nvPr>
-        </p:nvSpPr>
-        <p:spPr/>
-        <p:txBody>
-          <a:bodyPr/>
-          <a:lstStyle/>
-          <a:p>
-            <a:fld id="{A773B20C-5347-4FF9-A9F0-76F937F60217}" type="slidenum">
-              <a:rPr lang="en-US" smtClean="0"/>
-              <a:pPr/>
-              <a:t>5</a:t>
-            </a:fld>
-            <a:endParaRPr lang="en-US"/>
-          </a:p>
-        </p:txBody>
-      </p:sp>
-      <p:pic>
-        <p:nvPicPr>
-          <p:cNvPr id="7" name="Picture 6"/>
-          <p:cNvPicPr>
-            <a:picLocks noChangeAspect="1"/>
-          </p:cNvPicPr>
-          <p:nvPr/>
-        </p:nvPicPr>
-        <p:blipFill>
-          <a:blip r:embed="rId2"/>
-          <a:stretch>
-            <a:fillRect/>
-          </a:stretch>
-        </p:blipFill>
-        <p:spPr>
-          <a:xfrm>
-            <a:off x="5029200" y="1524000"/>
-            <a:ext cx="3829050" cy="4038600"/>
-          </a:xfrm>
-          <a:prstGeom prst="rect">
-            <a:avLst/>
-          </a:prstGeom>
-        </p:spPr>
-      </p:pic>
-    </p:spTree>
-    <p:extLst>
-      <p:ext uri="{BB962C8B-B14F-4D97-AF65-F5344CB8AC3E}">
-        <p14:creationId xmlns:p14="http://schemas.microsoft.com/office/powerpoint/2010/main" val="3130208776"/>
-      </p:ext>
-    </p:extLst>
-  </p:cSld>
-  <p:clrMapOvr>
-    <a:masterClrMapping/>
-  </p:clrMapOvr>
-</p:sld>
-</file>
-
-<file path=ppt/slides/slide6.xml><?xml version="1.0" encoding="utf-8"?>
-<p:sld xmlns:a="http://schemas.openxmlformats.org/drawingml/2006/main" xmlns:r="http://schemas.openxmlformats.org/officeDocument/2006/relationships" xmlns:p="http://schemas.openxmlformats.org/presentationml/2006/main">
-  <p:cSld>
-    <p:spTree>
-      <p:nvGrpSpPr>
-        <p:cNvPr id="1" name=""/>
-        <p:cNvGrpSpPr/>
-        <p:nvPr/>
-      </p:nvGrpSpPr>
-      <p:grpSpPr>
-        <a:xfrm>
-          <a:off x="0" y="0"/>
-          <a:ext cx="0" cy="0"/>
-          <a:chOff x="0" y="0"/>
-          <a:chExt cx="0" cy="0"/>
-        </a:xfrm>
-      </p:grpSpPr>
-      <p:sp>
-        <p:nvSpPr>
-          <p:cNvPr id="2" name="Title 1"/>
-          <p:cNvSpPr>
-            <a:spLocks noGrp="1"/>
-          </p:cNvSpPr>
-          <p:nvPr>
-            <p:ph type="title"/>
-          </p:nvPr>
-        </p:nvSpPr>
-        <p:spPr/>
-        <p:txBody>
-          <a:bodyPr/>
-          <a:lstStyle/>
-          <a:p>
-            <a:r>
-              <a:rPr lang="en-US" dirty="0" smtClean="0"/>
-              <a:t>The Linux Address Space</a:t>
-            </a:r>
-            <a:endParaRPr lang="en-US" dirty="0"/>
-          </a:p>
-        </p:txBody>
-      </p:sp>
-      <p:sp>
-        <p:nvSpPr>
-          <p:cNvPr id="3" name="Content Placeholder 2"/>
-          <p:cNvSpPr>
-            <a:spLocks noGrp="1"/>
-          </p:cNvSpPr>
-          <p:nvPr>
-            <p:ph idx="1"/>
-          </p:nvPr>
-        </p:nvSpPr>
-        <p:spPr>
-          <a:xfrm>
-            <a:off x="457199" y="1219200"/>
-            <a:ext cx="4257675" cy="4906963"/>
-          </a:xfrm>
-        </p:spPr>
-        <p:txBody>
-          <a:bodyPr>
-            <a:normAutofit/>
-          </a:bodyPr>
-          <a:lstStyle/>
-          <a:p>
-            <a:r>
-              <a:rPr lang="en-US" sz="1800" dirty="0" smtClean="0"/>
-              <a:t>Represented by the </a:t>
-            </a:r>
-            <a:r>
-              <a:rPr lang="en-US" sz="1800" dirty="0" err="1" smtClean="0"/>
-              <a:t>mm_struct</a:t>
-            </a:r>
-            <a:endParaRPr lang="en-US" sz="1800" dirty="0" smtClean="0"/>
-          </a:p>
-          <a:p>
-            <a:r>
-              <a:rPr lang="en-US" sz="1800" dirty="0" smtClean="0"/>
-              <a:t>Contains a </a:t>
-            </a:r>
-            <a:r>
-              <a:rPr lang="en-US" sz="1800" dirty="0" err="1" smtClean="0"/>
-              <a:t>vm_area_struct</a:t>
-            </a:r>
-            <a:r>
-              <a:rPr lang="en-US" sz="1800" dirty="0" smtClean="0"/>
-              <a:t> for each section of memory (stack, heap, </a:t>
-            </a:r>
-            <a:r>
-              <a:rPr lang="en-US" sz="1800" dirty="0" err="1" smtClean="0"/>
-              <a:t>etc</a:t>
-            </a:r>
-            <a:r>
-              <a:rPr lang="en-US" sz="1800" dirty="0" smtClean="0"/>
-              <a:t>…)</a:t>
-            </a:r>
-          </a:p>
-          <a:p>
-            <a:r>
-              <a:rPr lang="en-US" sz="1800" dirty="0" smtClean="0"/>
-              <a:t>Contains atomic usage counters to protect from release</a:t>
-            </a:r>
-          </a:p>
-          <a:p>
-            <a:r>
-              <a:rPr lang="en-US" sz="1800" dirty="0" smtClean="0"/>
-              <a:t>Attribute of the </a:t>
-            </a:r>
-            <a:r>
-              <a:rPr lang="en-US" sz="1800" dirty="0" err="1" smtClean="0"/>
-              <a:t>task_struct</a:t>
-            </a:r>
-            <a:r>
-              <a:rPr lang="en-US" sz="1800" dirty="0" smtClean="0"/>
-              <a:t> for the associated process</a:t>
-            </a:r>
-          </a:p>
-          <a:p>
-            <a:r>
-              <a:rPr lang="en-US" sz="1800" dirty="0" smtClean="0"/>
-              <a:t>Exported by the module when the “--mem“ command is provided to </a:t>
-            </a:r>
-            <a:r>
-              <a:rPr lang="en-US" sz="1800" dirty="0" err="1" smtClean="0"/>
-              <a:t>tskdmp</a:t>
-            </a:r>
-            <a:endParaRPr lang="en-US" sz="1800" dirty="0"/>
-          </a:p>
-        </p:txBody>
-      </p:sp>
-      <p:sp>
-        <p:nvSpPr>
-          <p:cNvPr id="4" name="Footer Placeholder 3"/>
-          <p:cNvSpPr>
-            <a:spLocks noGrp="1"/>
-          </p:cNvSpPr>
-          <p:nvPr>
-            <p:ph type="ftr" sz="quarter" idx="11"/>
-          </p:nvPr>
-        </p:nvSpPr>
-        <p:spPr/>
-        <p:txBody>
-          <a:bodyPr/>
-          <a:lstStyle/>
-          <a:p>
-            <a:r>
-              <a:rPr lang="en-US" smtClean="0"/>
-              <a:t>CSE 522S – Advanced Operating Systems</a:t>
-            </a:r>
-            <a:endParaRPr lang="en-US" dirty="0"/>
-          </a:p>
-        </p:txBody>
-      </p:sp>
-      <p:sp>
-        <p:nvSpPr>
-          <p:cNvPr id="5" name="Slide Number Placeholder 4"/>
-          <p:cNvSpPr>
-            <a:spLocks noGrp="1"/>
-          </p:cNvSpPr>
-          <p:nvPr>
-            <p:ph type="sldNum" sz="quarter" idx="12"/>
-          </p:nvPr>
-        </p:nvSpPr>
-        <p:spPr/>
-        <p:txBody>
-          <a:bodyPr/>
-          <a:lstStyle/>
-          <a:p>
-            <a:fld id="{A773B20C-5347-4FF9-A9F0-76F937F60217}" type="slidenum">
-              <a:rPr lang="en-US" smtClean="0"/>
-              <a:pPr/>
-              <a:t>6</a:t>
-            </a:fld>
-            <a:endParaRPr lang="en-US"/>
-          </a:p>
-        </p:txBody>
-      </p:sp>
-      <p:pic>
-        <p:nvPicPr>
-          <p:cNvPr id="6" name="Picture 5"/>
-          <p:cNvPicPr>
-            <a:picLocks noChangeAspect="1"/>
-          </p:cNvPicPr>
-          <p:nvPr/>
-        </p:nvPicPr>
-        <p:blipFill>
-          <a:blip r:embed="rId2"/>
-          <a:stretch>
-            <a:fillRect/>
-          </a:stretch>
-        </p:blipFill>
-        <p:spPr>
-          <a:xfrm>
-            <a:off x="4800600" y="1219200"/>
-            <a:ext cx="3971925" cy="4143375"/>
-          </a:xfrm>
-          <a:prstGeom prst="rect">
-            <a:avLst/>
-          </a:prstGeom>
-        </p:spPr>
-      </p:pic>
-    </p:spTree>
-    <p:extLst>
-      <p:ext uri="{BB962C8B-B14F-4D97-AF65-F5344CB8AC3E}">
-        <p14:creationId xmlns:p14="http://schemas.microsoft.com/office/powerpoint/2010/main" val="2744021405"/>
-      </p:ext>
-    </p:extLst>
-  </p:cSld>
-  <p:clrMapOvr>
-    <a:masterClrMapping/>
-  </p:clrMapOvr>
-</p:sld>
-</file>
-
-<file path=ppt/slides/slide7.xml><?xml version="1.0" encoding="utf-8"?>
-<p:sld xmlns:a="http://schemas.openxmlformats.org/drawingml/2006/main" xmlns:r="http://schemas.openxmlformats.org/officeDocument/2006/relationships" xmlns:p="http://schemas.openxmlformats.org/presentationml/2006/main">
-  <p:cSld>
-    <p:spTree>
-      <p:nvGrpSpPr>
-        <p:cNvPr id="1" name=""/>
-        <p:cNvGrpSpPr/>
-        <p:nvPr/>
-      </p:nvGrpSpPr>
-      <p:grpSpPr>
-        <a:xfrm>
-          <a:off x="0" y="0"/>
-          <a:ext cx="0" cy="0"/>
-          <a:chOff x="0" y="0"/>
-          <a:chExt cx="0" cy="0"/>
-        </a:xfrm>
-      </p:grpSpPr>
-      <p:sp>
-        <p:nvSpPr>
-          <p:cNvPr id="2" name="Title 1"/>
-          <p:cNvSpPr>
-            <a:spLocks noGrp="1"/>
-          </p:cNvSpPr>
-          <p:nvPr>
-            <p:ph type="title"/>
-          </p:nvPr>
-        </p:nvSpPr>
-        <p:spPr/>
-        <p:txBody>
-          <a:bodyPr/>
-          <a:lstStyle/>
-          <a:p>
-            <a:r>
-              <a:rPr lang="en-US" dirty="0" smtClean="0"/>
-              <a:t>Challenges</a:t>
-            </a:r>
-            <a:endParaRPr lang="en-US" dirty="0"/>
-          </a:p>
-        </p:txBody>
-      </p:sp>
-      <p:sp>
-        <p:nvSpPr>
-          <p:cNvPr id="3" name="Content Placeholder 2"/>
-          <p:cNvSpPr>
-            <a:spLocks noGrp="1"/>
-          </p:cNvSpPr>
-          <p:nvPr>
-            <p:ph idx="1"/>
-          </p:nvPr>
-        </p:nvSpPr>
-        <p:spPr>
-          <a:xfrm>
-            <a:off x="457200" y="1219200"/>
-            <a:ext cx="8229600" cy="4525963"/>
-          </a:xfrm>
-        </p:spPr>
-        <p:txBody>
-          <a:bodyPr/>
-          <a:lstStyle/>
-          <a:p>
-            <a:r>
-              <a:rPr lang="en-US" dirty="0" smtClean="0"/>
-              <a:t>Kernel Synchronization</a:t>
-            </a:r>
-          </a:p>
-          <a:p>
-            <a:r>
-              <a:rPr lang="en-US" dirty="0" smtClean="0"/>
-              <a:t>Complex and Multi-tiered </a:t>
-            </a:r>
-            <a:r>
-              <a:rPr lang="en-US" dirty="0" err="1" smtClean="0"/>
-              <a:t>struct</a:t>
-            </a:r>
-            <a:r>
-              <a:rPr lang="en-US" dirty="0" smtClean="0"/>
-              <a:t> definitions</a:t>
-            </a:r>
-          </a:p>
-          <a:p>
-            <a:r>
-              <a:rPr lang="en-US" dirty="0" smtClean="0"/>
-              <a:t>Breadth of involved kernel sub-systems</a:t>
-            </a:r>
-            <a:endParaRPr lang="en-US" dirty="0" smtClean="0"/>
-          </a:p>
-          <a:p>
-            <a:r>
-              <a:rPr lang="en-US" dirty="0" smtClean="0"/>
-              <a:t>Kernel vs Module (symbol availability)</a:t>
-            </a:r>
-          </a:p>
-          <a:p>
-            <a:r>
-              <a:rPr lang="en-US" dirty="0" smtClean="0"/>
-              <a:t>Lack of formalized documentation on </a:t>
-            </a:r>
-            <a:r>
-              <a:rPr lang="en-US" dirty="0"/>
-              <a:t>L</a:t>
-            </a:r>
-            <a:r>
-              <a:rPr lang="en-US" dirty="0" smtClean="0"/>
-              <a:t>inux kernel</a:t>
-            </a:r>
-            <a:endParaRPr lang="en-US" dirty="0"/>
-          </a:p>
-        </p:txBody>
-      </p:sp>
-      <p:sp>
-        <p:nvSpPr>
-          <p:cNvPr id="4" name="Footer Placeholder 3"/>
-          <p:cNvSpPr>
-            <a:spLocks noGrp="1"/>
-          </p:cNvSpPr>
-          <p:nvPr>
-            <p:ph type="ftr" sz="quarter" idx="11"/>
-          </p:nvPr>
-        </p:nvSpPr>
-        <p:spPr/>
-        <p:txBody>
-          <a:bodyPr/>
-          <a:lstStyle/>
-          <a:p>
-            <a:r>
-              <a:rPr lang="en-US" smtClean="0"/>
-              <a:t>CSE 522S – Advanced Operating Systems</a:t>
-            </a:r>
-            <a:endParaRPr lang="en-US" dirty="0"/>
-          </a:p>
-        </p:txBody>
-      </p:sp>
-      <p:sp>
-        <p:nvSpPr>
-          <p:cNvPr id="5" name="Slide Number Placeholder 4"/>
-          <p:cNvSpPr>
-            <a:spLocks noGrp="1"/>
-          </p:cNvSpPr>
-          <p:nvPr>
-            <p:ph type="sldNum" sz="quarter" idx="12"/>
-          </p:nvPr>
-        </p:nvSpPr>
-        <p:spPr/>
-        <p:txBody>
-          <a:bodyPr/>
-          <a:lstStyle/>
-          <a:p>
-            <a:fld id="{A773B20C-5347-4FF9-A9F0-76F937F60217}" type="slidenum">
-              <a:rPr lang="en-US" smtClean="0"/>
-              <a:pPr/>
-              <a:t>7</a:t>
-            </a:fld>
-            <a:endParaRPr lang="en-US"/>
-          </a:p>
-        </p:txBody>
-      </p:sp>
-    </p:spTree>
-  </p:cSld>
-  <p:clrMapOvr>
-    <a:masterClrMapping/>
-  </p:clrMapOvr>
-  <p:timing>
-    <p:tnLst>
-      <p:par>
-        <p:cTn id="1" dur="indefinite" restart="never" nodeType="tmRoot"/>
-      </p:par>
-    </p:tnLst>
-  </p:timing>
-</p:sld>
-</file>
-
-<file path=ppt/slides/slide8.xml><?xml version="1.0" encoding="utf-8"?>
-<p:sld xmlns:a="http://schemas.openxmlformats.org/drawingml/2006/main" xmlns:r="http://schemas.openxmlformats.org/officeDocument/2006/relationships" xmlns:p="http://schemas.openxmlformats.org/presentationml/2006/main">
-  <p:cSld>
-    <p:spTree>
-      <p:nvGrpSpPr>
-        <p:cNvPr id="1" name=""/>
-        <p:cNvGrpSpPr/>
-        <p:nvPr/>
-      </p:nvGrpSpPr>
-      <p:grpSpPr>
-        <a:xfrm>
-          <a:off x="0" y="0"/>
-          <a:ext cx="0" cy="0"/>
-          <a:chOff x="0" y="0"/>
-          <a:chExt cx="0" cy="0"/>
-        </a:xfrm>
-      </p:grpSpPr>
-      <p:sp>
-        <p:nvSpPr>
-          <p:cNvPr id="2" name="Title 1"/>
-          <p:cNvSpPr>
-            <a:spLocks noGrp="1"/>
-          </p:cNvSpPr>
-          <p:nvPr>
-            <p:ph type="title"/>
-          </p:nvPr>
-        </p:nvSpPr>
-        <p:spPr/>
-        <p:txBody>
-          <a:bodyPr/>
-          <a:lstStyle/>
-          <a:p>
-            <a:r>
-              <a:rPr lang="en-US" dirty="0" smtClean="0"/>
-              <a:t>Lessons Learned</a:t>
-            </a:r>
-            <a:endParaRPr lang="en-US" dirty="0"/>
-          </a:p>
-        </p:txBody>
-      </p:sp>
-      <p:sp>
-        <p:nvSpPr>
-          <p:cNvPr id="4" name="Footer Placeholder 3"/>
-          <p:cNvSpPr>
-            <a:spLocks noGrp="1"/>
-          </p:cNvSpPr>
-          <p:nvPr>
-            <p:ph type="ftr" sz="quarter" idx="11"/>
-          </p:nvPr>
-        </p:nvSpPr>
-        <p:spPr/>
-        <p:txBody>
-          <a:bodyPr/>
-          <a:lstStyle/>
-          <a:p>
-            <a:r>
-              <a:rPr lang="en-US" smtClean="0"/>
-              <a:t>CSE 522S – Advanced Operating Systems</a:t>
-            </a:r>
-            <a:endParaRPr lang="en-US" dirty="0"/>
-          </a:p>
-        </p:txBody>
-      </p:sp>
-      <p:sp>
-        <p:nvSpPr>
-          <p:cNvPr id="5" name="Slide Number Placeholder 4"/>
-          <p:cNvSpPr>
-            <a:spLocks noGrp="1"/>
-          </p:cNvSpPr>
-          <p:nvPr>
-            <p:ph type="sldNum" sz="quarter" idx="12"/>
-          </p:nvPr>
-        </p:nvSpPr>
-        <p:spPr/>
-        <p:txBody>
-          <a:bodyPr/>
-          <a:lstStyle/>
-          <a:p>
-            <a:fld id="{A773B20C-5347-4FF9-A9F0-76F937F60217}" type="slidenum">
-              <a:rPr lang="en-US" smtClean="0"/>
-              <a:pPr/>
-              <a:t>8</a:t>
-            </a:fld>
-            <a:endParaRPr lang="en-US"/>
-          </a:p>
-        </p:txBody>
-      </p:sp>
-      <p:sp>
-        <p:nvSpPr>
-          <p:cNvPr id="42" name="Content Placeholder 2"/>
-          <p:cNvSpPr>
-            <a:spLocks noGrp="1"/>
-          </p:cNvSpPr>
-          <p:nvPr>
-            <p:ph idx="1"/>
-          </p:nvPr>
-        </p:nvSpPr>
-        <p:spPr>
-          <a:xfrm>
-            <a:off x="457200" y="1219200"/>
-            <a:ext cx="8229600" cy="4525963"/>
-          </a:xfrm>
-        </p:spPr>
-        <p:txBody>
-          <a:bodyPr>
-            <a:noAutofit/>
-          </a:bodyPr>
-          <a:lstStyle/>
-          <a:p>
-            <a:endParaRPr lang="en-US" sz="2400" dirty="0" smtClean="0"/>
-          </a:p>
-          <a:p>
-            <a:endParaRPr lang="en-US" sz="2400" dirty="0" smtClean="0"/>
-          </a:p>
-          <a:p>
-            <a:endParaRPr lang="en-US" sz="2400" dirty="0" smtClean="0"/>
-          </a:p>
-          <a:p>
-            <a:pPr>
-              <a:buNone/>
-            </a:pPr>
-            <a:endParaRPr lang="en-US" sz="2400" dirty="0" smtClean="0"/>
-          </a:p>
-        </p:txBody>
-      </p:sp>
-    </p:spTree>
-  </p:cSld>
-  <p:clrMapOvr>
-    <a:masterClrMapping/>
-  </p:clrMapOvr>
-</p:sld>
-</file>
-
-<file path=ppt/slides/slide9.xml><?xml version="1.0" encoding="utf-8"?>
-<p:sld xmlns:a="http://schemas.openxmlformats.org/drawingml/2006/main" xmlns:r="http://schemas.openxmlformats.org/officeDocument/2006/relationships" xmlns:p="http://schemas.openxmlformats.org/presentationml/2006/main">
-  <p:cSld>
-    <p:spTree>
-      <p:nvGrpSpPr>
-        <p:cNvPr id="1" name=""/>
-        <p:cNvGrpSpPr/>
-        <p:nvPr/>
-      </p:nvGrpSpPr>
-      <p:grpSpPr>
-        <a:xfrm>
-          <a:off x="0" y="0"/>
-          <a:ext cx="0" cy="0"/>
-          <a:chOff x="0" y="0"/>
-          <a:chExt cx="0" cy="0"/>
-        </a:xfrm>
-      </p:grpSpPr>
-      <p:sp>
-        <p:nvSpPr>
-          <p:cNvPr id="2" name="Title 1"/>
-          <p:cNvSpPr>
-            <a:spLocks noGrp="1"/>
-          </p:cNvSpPr>
-          <p:nvPr>
-            <p:ph type="title"/>
-          </p:nvPr>
-        </p:nvSpPr>
-        <p:spPr/>
-        <p:txBody>
-          <a:bodyPr/>
-          <a:lstStyle/>
-          <a:p>
-            <a:r>
-              <a:rPr lang="en-US" dirty="0" smtClean="0"/>
-              <a:t>Future Work</a:t>
-            </a:r>
-            <a:endParaRPr lang="en-US" dirty="0"/>
-          </a:p>
-        </p:txBody>
-      </p:sp>
-      <p:sp>
-        <p:nvSpPr>
-          <p:cNvPr id="3" name="Content Placeholder 2"/>
-          <p:cNvSpPr>
-            <a:spLocks noGrp="1"/>
-          </p:cNvSpPr>
-          <p:nvPr>
-            <p:ph idx="1"/>
-          </p:nvPr>
-        </p:nvSpPr>
-        <p:spPr/>
-        <p:txBody>
-          <a:bodyPr>
-            <a:normAutofit/>
-          </a:bodyPr>
-          <a:lstStyle/>
-          <a:p>
-            <a:pPr marL="514350" indent="-514350">
-              <a:buFont typeface="+mj-lt"/>
-              <a:buAutoNum type="arabicPeriod"/>
-            </a:pPr>
-            <a:endParaRPr lang="en-US" sz="2400" dirty="0"/>
-          </a:p>
-        </p:txBody>
-      </p:sp>
-      <p:sp>
-        <p:nvSpPr>
-          <p:cNvPr id="4" name="Footer Placeholder 3"/>
-          <p:cNvSpPr>
-            <a:spLocks noGrp="1"/>
-          </p:cNvSpPr>
-          <p:nvPr>
-            <p:ph type="ftr" sz="quarter" idx="11"/>
-          </p:nvPr>
-        </p:nvSpPr>
-        <p:spPr/>
-        <p:txBody>
-          <a:bodyPr/>
-          <a:lstStyle/>
-          <a:p>
-            <a:r>
-              <a:rPr lang="en-US" smtClean="0"/>
-              <a:t>CSE 522S – Advanced Operating Systems</a:t>
-            </a:r>
-            <a:endParaRPr lang="en-US" dirty="0"/>
-          </a:p>
-        </p:txBody>
-      </p:sp>
-      <p:sp>
-        <p:nvSpPr>
-          <p:cNvPr id="5" name="Slide Number Placeholder 4"/>
-          <p:cNvSpPr>
-            <a:spLocks noGrp="1"/>
-          </p:cNvSpPr>
-          <p:nvPr>
-            <p:ph type="sldNum" sz="quarter" idx="12"/>
-          </p:nvPr>
-        </p:nvSpPr>
-        <p:spPr/>
-        <p:txBody>
-          <a:bodyPr/>
-          <a:lstStyle/>
-          <a:p>
-            <a:fld id="{A773B20C-5347-4FF9-A9F0-76F937F60217}" type="slidenum">
-              <a:rPr lang="en-US" smtClean="0"/>
-              <a:pPr/>
-              <a:t>9</a:t>
-            </a:fld>
-            <a:endParaRPr lang="en-US"/>
-          </a:p>
-        </p:txBody>
-      </p:sp>
-    </p:spTree>
-  </p:cSld>
-  <p:clrMapOvr>
-    <a:masterClrMapping/>
-  </p:clrMapOvr>
 </p:sld>
 </file>
 

</xml_diff>

<commit_message>
Completed the initial draft of the presentation.
</commit_message>
<xml_diff>
--- a/final_presentation.pptx
+++ b/final_presentation.pptx
@@ -5,7 +5,7 @@
     <p:sldMasterId id="2147483648" r:id="rId1"/>
   </p:sldMasterIdLst>
   <p:notesMasterIdLst>
-    <p:notesMasterId r:id="rId15"/>
+    <p:notesMasterId r:id="rId19"/>
   </p:notesMasterIdLst>
   <p:sldIdLst>
     <p:sldId id="256" r:id="rId2"/>
@@ -18,9 +18,13 @@
     <p:sldId id="268" r:id="rId9"/>
     <p:sldId id="259" r:id="rId10"/>
     <p:sldId id="265" r:id="rId11"/>
-    <p:sldId id="260" r:id="rId12"/>
-    <p:sldId id="261" r:id="rId13"/>
-    <p:sldId id="262" r:id="rId14"/>
+    <p:sldId id="269" r:id="rId12"/>
+    <p:sldId id="270" r:id="rId13"/>
+    <p:sldId id="272" r:id="rId14"/>
+    <p:sldId id="273" r:id="rId15"/>
+    <p:sldId id="275" r:id="rId16"/>
+    <p:sldId id="260" r:id="rId17"/>
+    <p:sldId id="274" r:id="rId18"/>
   </p:sldIdLst>
   <p:sldSz cx="9144000" cy="6858000" type="screen4x3"/>
   <p:notesSz cx="6858000" cy="9144000"/>
@@ -3591,10 +3595,147 @@
           </a:xfrm>
         </p:spPr>
         <p:txBody>
-          <a:bodyPr/>
-          <a:lstStyle/>
-          <a:p>
-            <a:endParaRPr lang="en-US" dirty="0"/>
+          <a:bodyPr>
+            <a:normAutofit fontScale="92500" lnSpcReduction="10000"/>
+          </a:bodyPr>
+          <a:lstStyle/>
+          <a:p>
+            <a:pPr marL="342900" lvl="1" indent="-342900">
+              <a:buFont typeface="Arial" pitchFamily="34" charset="0"/>
+              <a:buChar char="•"/>
+            </a:pPr>
+            <a:r>
+              <a:rPr lang="en-US" sz="1800" dirty="0"/>
+              <a:t>Initiates </a:t>
+            </a:r>
+            <a:r>
+              <a:rPr lang="en-US" sz="1800" dirty="0" smtClean="0"/>
+              <a:t>all snapshotting operations</a:t>
+            </a:r>
+          </a:p>
+          <a:p>
+            <a:pPr marL="342900" lvl="1" indent="-342900">
+              <a:buFont typeface="Arial" pitchFamily="34" charset="0"/>
+              <a:buChar char="•"/>
+            </a:pPr>
+            <a:r>
+              <a:rPr lang="en-US" sz="1800" dirty="0"/>
+              <a:t>Communicates </a:t>
+            </a:r>
+            <a:r>
+              <a:rPr lang="en-US" sz="1800" dirty="0" smtClean="0"/>
+              <a:t>through </a:t>
+            </a:r>
+            <a:r>
+              <a:rPr lang="en-US" sz="1800" dirty="0" err="1" smtClean="0"/>
+              <a:t>sysfs</a:t>
+            </a:r>
+            <a:r>
+              <a:rPr lang="en-US" sz="1800" dirty="0" smtClean="0"/>
+              <a:t>: </a:t>
+            </a:r>
+            <a:r>
+              <a:rPr lang="en-US" sz="1400" dirty="0"/>
+              <a:t>/sys/kernel/</a:t>
+            </a:r>
+            <a:r>
+              <a:rPr lang="en-US" sz="1400" dirty="0" err="1"/>
+              <a:t>linux_inspect</a:t>
+            </a:r>
+            <a:r>
+              <a:rPr lang="en-US" sz="1400" dirty="0"/>
+              <a:t>/operation</a:t>
+            </a:r>
+            <a:endParaRPr lang="en-US" sz="1800" dirty="0" smtClean="0"/>
+          </a:p>
+          <a:p>
+            <a:pPr marL="342900" lvl="1" indent="-342900">
+              <a:buFont typeface="Arial" pitchFamily="34" charset="0"/>
+              <a:buChar char="•"/>
+            </a:pPr>
+            <a:r>
+              <a:rPr lang="en-US" sz="1800" dirty="0" smtClean="0"/>
+              <a:t>Performs snapshots on processes memory content</a:t>
+            </a:r>
+          </a:p>
+          <a:p>
+            <a:pPr marL="742950" lvl="2" indent="-342900"/>
+            <a:r>
+              <a:rPr lang="en-US" sz="1400" dirty="0" smtClean="0"/>
+              <a:t>/proc/</a:t>
+            </a:r>
+            <a:r>
+              <a:rPr lang="en-US" sz="1400" dirty="0" err="1" smtClean="0"/>
+              <a:t>pid</a:t>
+            </a:r>
+            <a:r>
+              <a:rPr lang="en-US" sz="1400" dirty="0" smtClean="0"/>
+              <a:t>/mem</a:t>
+            </a:r>
+          </a:p>
+          <a:p>
+            <a:pPr marL="742950" lvl="2" indent="-342900"/>
+            <a:r>
+              <a:rPr lang="en-US" sz="1400" dirty="0" smtClean="0"/>
+              <a:t>/proc/</a:t>
+            </a:r>
+            <a:r>
+              <a:rPr lang="en-US" sz="1400" dirty="0" err="1" smtClean="0"/>
+              <a:t>pid</a:t>
+            </a:r>
+            <a:r>
+              <a:rPr lang="en-US" sz="1400" dirty="0" smtClean="0"/>
+              <a:t>/maps</a:t>
+            </a:r>
+          </a:p>
+          <a:p>
+            <a:pPr marL="342900" lvl="1" indent="-342900"/>
+            <a:r>
+              <a:rPr lang="en-US" sz="1800" dirty="0" smtClean="0"/>
+              <a:t>Controls elements included within the snapshot</a:t>
+            </a:r>
+          </a:p>
+          <a:p>
+            <a:pPr marL="742950" lvl="2" indent="-342900"/>
+            <a:r>
+              <a:rPr lang="en-US" sz="1400" dirty="0" smtClean="0"/>
+              <a:t>Task</a:t>
+            </a:r>
+          </a:p>
+          <a:p>
+            <a:pPr marL="742950" lvl="2" indent="-342900"/>
+            <a:r>
+              <a:rPr lang="en-US" sz="1400" dirty="0" smtClean="0"/>
+              <a:t>Mem</a:t>
+            </a:r>
+          </a:p>
+          <a:p>
+            <a:pPr marL="742950" lvl="2" indent="-342900"/>
+            <a:r>
+              <a:rPr lang="en-US" sz="1400" dirty="0" smtClean="0"/>
+              <a:t>…</a:t>
+            </a:r>
+          </a:p>
+          <a:p>
+            <a:pPr marL="342900" lvl="1" indent="-342900"/>
+            <a:r>
+              <a:rPr lang="en-US" sz="1800" dirty="0" smtClean="0"/>
+              <a:t>Supports ability to perform cyclic snapshot operations</a:t>
+            </a:r>
+          </a:p>
+          <a:p>
+            <a:pPr marL="342900" lvl="1" indent="-342900"/>
+            <a:r>
+              <a:rPr lang="en-US" sz="1800" dirty="0" smtClean="0"/>
+              <a:t>Snapshots support analysis through tools such as Meld</a:t>
+            </a:r>
+          </a:p>
+          <a:p>
+            <a:pPr marL="342900" lvl="1" indent="-342900"/>
+            <a:endParaRPr lang="en-US" sz="1800" dirty="0"/>
+          </a:p>
+          <a:p>
+            <a:endParaRPr lang="en-US" sz="2000" dirty="0"/>
           </a:p>
         </p:txBody>
       </p:sp>
@@ -3669,7 +3810,7 @@
           <a:p>
             <a:r>
               <a:rPr lang="en-US" dirty="0" smtClean="0"/>
-              <a:t>Challenges</a:t>
+              <a:t>Inspect Kernel Module</a:t>
             </a:r>
             <a:endParaRPr lang="en-US" dirty="0"/>
           </a:p>
@@ -3687,59 +3828,100 @@
         </p:nvSpPr>
         <p:spPr>
           <a:xfrm>
-            <a:off x="457200" y="1219200"/>
-            <a:ext cx="8229600" cy="4525963"/>
+            <a:off x="457200" y="1600200"/>
+            <a:ext cx="4114800" cy="4525963"/>
           </a:xfrm>
         </p:spPr>
         <p:txBody>
-          <a:bodyPr/>
-          <a:lstStyle/>
-          <a:p>
-            <a:r>
-              <a:rPr lang="en-US" dirty="0" smtClean="0"/>
-              <a:t>Kernel Synchronization</a:t>
-            </a:r>
-          </a:p>
-          <a:p>
-            <a:r>
-              <a:rPr lang="en-US" dirty="0" smtClean="0"/>
-              <a:t>Complex and Multi-tiered </a:t>
-            </a:r>
-            <a:r>
-              <a:rPr lang="en-US" dirty="0" err="1" smtClean="0"/>
-              <a:t>struct</a:t>
-            </a:r>
-            <a:r>
-              <a:rPr lang="en-US" dirty="0" smtClean="0"/>
-              <a:t> definitions</a:t>
-            </a:r>
-          </a:p>
-          <a:p>
-            <a:r>
-              <a:rPr lang="en-US" dirty="0" smtClean="0"/>
-              <a:t>Breadth of involved kernel sub-systems</a:t>
-            </a:r>
-          </a:p>
-          <a:p>
-            <a:r>
-              <a:rPr lang="en-US" dirty="0" smtClean="0"/>
-              <a:t>Kernel vs Module (symbol availability)</a:t>
-            </a:r>
-          </a:p>
-          <a:p>
-            <a:r>
-              <a:rPr lang="en-US" dirty="0" smtClean="0"/>
-              <a:t>Lack of formalized documentation on </a:t>
-            </a:r>
-            <a:r>
-              <a:rPr lang="en-US" dirty="0"/>
-              <a:t>L</a:t>
-            </a:r>
-            <a:r>
-              <a:rPr lang="en-US" dirty="0" smtClean="0"/>
-              <a:t>inux kernel</a:t>
-            </a:r>
-            <a:endParaRPr lang="en-US" dirty="0"/>
+          <a:bodyPr>
+            <a:normAutofit/>
+          </a:bodyPr>
+          <a:lstStyle/>
+          <a:p>
+            <a:r>
+              <a:rPr lang="en-US" sz="1800" dirty="0" smtClean="0"/>
+              <a:t>Commands received through </a:t>
+            </a:r>
+            <a:r>
+              <a:rPr lang="en-US" sz="1800" dirty="0" err="1" smtClean="0"/>
+              <a:t>sysfs</a:t>
+            </a:r>
+            <a:r>
+              <a:rPr lang="en-US" sz="1800" dirty="0" smtClean="0"/>
+              <a:t>:</a:t>
+            </a:r>
+            <a:r>
+              <a:rPr lang="en-US" sz="1800" dirty="0"/>
+              <a:t> </a:t>
+            </a:r>
+            <a:r>
+              <a:rPr lang="en-US" sz="1400" dirty="0"/>
+              <a:t>/</a:t>
+            </a:r>
+            <a:r>
+              <a:rPr lang="en-US" sz="1400" dirty="0" smtClean="0"/>
+              <a:t>sys/kernel/</a:t>
+            </a:r>
+            <a:r>
+              <a:rPr lang="en-US" sz="1400" dirty="0" err="1" smtClean="0"/>
+              <a:t>linux_inspect</a:t>
+            </a:r>
+            <a:r>
+              <a:rPr lang="en-US" sz="1400" dirty="0" smtClean="0"/>
+              <a:t>/operation</a:t>
+            </a:r>
+          </a:p>
+          <a:p>
+            <a:r>
+              <a:rPr lang="en-US" sz="1800" dirty="0" smtClean="0"/>
+              <a:t>Processes </a:t>
+            </a:r>
+            <a:r>
+              <a:rPr lang="en-US" sz="1800" dirty="0" err="1" smtClean="0"/>
+              <a:t>LKM_Operation_t</a:t>
+            </a:r>
+            <a:r>
+              <a:rPr lang="en-US" sz="1800" dirty="0" smtClean="0"/>
+              <a:t> to determine elements to include within the snapshot</a:t>
+            </a:r>
+          </a:p>
+          <a:p>
+            <a:r>
+              <a:rPr lang="en-US" sz="1800" dirty="0"/>
+              <a:t>Removes targeted process from run </a:t>
+            </a:r>
+            <a:r>
+              <a:rPr lang="en-US" sz="1800" dirty="0" smtClean="0"/>
+              <a:t>queue</a:t>
+            </a:r>
+          </a:p>
+          <a:p>
+            <a:r>
+              <a:rPr lang="en-US" sz="1800" dirty="0" smtClean="0"/>
+              <a:t>Performs a snapshot of the specified elements</a:t>
+            </a:r>
+          </a:p>
+          <a:p>
+            <a:pPr lvl="1"/>
+            <a:r>
+              <a:rPr lang="en-US" sz="1400" dirty="0" smtClean="0"/>
+              <a:t>Task</a:t>
+            </a:r>
+          </a:p>
+          <a:p>
+            <a:pPr lvl="1"/>
+            <a:r>
+              <a:rPr lang="en-US" sz="1400" dirty="0" smtClean="0"/>
+              <a:t>Mem</a:t>
+            </a:r>
+          </a:p>
+          <a:p>
+            <a:pPr lvl="1"/>
+            <a:r>
+              <a:rPr lang="en-US" sz="1400" dirty="0" smtClean="0"/>
+              <a:t>…</a:t>
+            </a:r>
+            <a:endParaRPr lang="en-US" sz="1400" dirty="0"/>
           </a:p>
         </p:txBody>
       </p:sp>
@@ -3790,18 +3972,40 @@
           </a:p>
         </p:txBody>
       </p:sp>
+      <p:pic>
+        <p:nvPicPr>
+          <p:cNvPr id="6" name="Picture 5"/>
+          <p:cNvPicPr>
+            <a:picLocks noChangeAspect="1"/>
+          </p:cNvPicPr>
+          <p:nvPr/>
+        </p:nvPicPr>
+        <p:blipFill>
+          <a:blip r:embed="rId2"/>
+          <a:stretch>
+            <a:fillRect/>
+          </a:stretch>
+        </p:blipFill>
+        <p:spPr>
+          <a:xfrm>
+            <a:off x="4876800" y="1600200"/>
+            <a:ext cx="3974937" cy="2938527"/>
+          </a:xfrm>
+          <a:prstGeom prst="rect">
+            <a:avLst/>
+          </a:prstGeom>
+        </p:spPr>
+      </p:pic>
     </p:spTree>
+    <p:extLst>
+      <p:ext uri="{BB962C8B-B14F-4D97-AF65-F5344CB8AC3E}">
+        <p14:creationId xmlns:p14="http://schemas.microsoft.com/office/powerpoint/2010/main" val="2360834611"/>
+      </p:ext>
+    </p:extLst>
   </p:cSld>
   <p:clrMapOvr>
     <a:masterClrMapping/>
   </p:clrMapOvr>
-  <p:timing>
-    <p:tnLst>
-      <p:par>
-        <p:cTn id="1" dur="indefinite" restart="never" nodeType="tmRoot"/>
-      </p:par>
-    </p:tnLst>
-  </p:timing>
 </p:sld>
 </file>
 
@@ -3839,9 +4043,88 @@
           <a:p>
             <a:r>
               <a:rPr lang="en-US" dirty="0" smtClean="0"/>
-              <a:t>Lessons Learned</a:t>
+              <a:t>Task </a:t>
+            </a:r>
+            <a:r>
+              <a:rPr lang="en-US" dirty="0" err="1" smtClean="0"/>
+              <a:t>Struct</a:t>
+            </a:r>
+            <a:r>
+              <a:rPr lang="en-US" dirty="0" smtClean="0"/>
+              <a:t> Verification</a:t>
             </a:r>
             <a:endParaRPr lang="en-US" dirty="0"/>
+          </a:p>
+        </p:txBody>
+      </p:sp>
+      <p:sp>
+        <p:nvSpPr>
+          <p:cNvPr id="3" name="Content Placeholder 2"/>
+          <p:cNvSpPr>
+            <a:spLocks noGrp="1"/>
+          </p:cNvSpPr>
+          <p:nvPr>
+            <p:ph idx="1"/>
+          </p:nvPr>
+        </p:nvSpPr>
+        <p:spPr>
+          <a:xfrm>
+            <a:off x="457200" y="1600200"/>
+            <a:ext cx="4114800" cy="4525963"/>
+          </a:xfrm>
+        </p:spPr>
+        <p:txBody>
+          <a:bodyPr>
+            <a:normAutofit/>
+          </a:bodyPr>
+          <a:lstStyle/>
+          <a:p>
+            <a:r>
+              <a:rPr lang="en-US" sz="2000" dirty="0" smtClean="0"/>
+              <a:t>Snapshot test app</a:t>
+            </a:r>
+          </a:p>
+          <a:p>
+            <a:pPr lvl="1"/>
+            <a:r>
+              <a:rPr lang="en-US" sz="1800" dirty="0" smtClean="0"/>
+              <a:t>Same instance</a:t>
+            </a:r>
+          </a:p>
+          <a:p>
+            <a:pPr lvl="1"/>
+            <a:r>
+              <a:rPr lang="en-US" sz="1800" dirty="0" smtClean="0"/>
+              <a:t>Across instances</a:t>
+            </a:r>
+          </a:p>
+          <a:p>
+            <a:r>
+              <a:rPr lang="en-US" sz="2000" dirty="0" smtClean="0"/>
+              <a:t>Snapshot bash shell</a:t>
+            </a:r>
+          </a:p>
+          <a:p>
+            <a:pPr lvl="1"/>
+            <a:r>
+              <a:rPr lang="en-US" sz="1800" dirty="0" smtClean="0"/>
+              <a:t>Proves support for general user process</a:t>
+            </a:r>
+          </a:p>
+          <a:p>
+            <a:r>
+              <a:rPr lang="en-US" sz="1800" dirty="0"/>
+              <a:t>Snapshot directories compared with diff tools such as Meld</a:t>
+            </a:r>
+          </a:p>
+          <a:p>
+            <a:r>
+              <a:rPr lang="en-US" sz="1800" dirty="0"/>
+              <a:t>Analyze the differences in the two snapshots </a:t>
+            </a:r>
+          </a:p>
+          <a:p>
+            <a:endParaRPr lang="en-US" sz="2200" dirty="0"/>
           </a:p>
         </p:txBody>
       </p:sp>
@@ -3894,43 +4177,40 @@
       </p:sp>
       <p:sp>
         <p:nvSpPr>
-          <p:cNvPr id="42" name="Content Placeholder 2"/>
-          <p:cNvSpPr>
-            <a:spLocks noGrp="1"/>
-          </p:cNvSpPr>
-          <p:nvPr>
-            <p:ph idx="1"/>
-          </p:nvPr>
+          <p:cNvPr id="6" name="TextBox 5"/>
+          <p:cNvSpPr txBox="1"/>
+          <p:nvPr/>
         </p:nvSpPr>
         <p:spPr>
           <a:xfrm>
-            <a:off x="457200" y="1219200"/>
-            <a:ext cx="8229600" cy="4525963"/>
+            <a:off x="4800600" y="1600200"/>
+            <a:ext cx="3886200" cy="646331"/>
           </a:xfrm>
+          <a:prstGeom prst="rect">
+            <a:avLst/>
+          </a:prstGeom>
+          <a:noFill/>
         </p:spPr>
         <p:txBody>
-          <a:bodyPr>
-            <a:noAutofit/>
+          <a:bodyPr wrap="square" rtlCol="0">
+            <a:spAutoFit/>
           </a:bodyPr>
           <a:lstStyle/>
           <a:p>
-            <a:endParaRPr lang="en-US" sz="2400" dirty="0" smtClean="0"/>
-          </a:p>
-          <a:p>
-            <a:endParaRPr lang="en-US" sz="2400" dirty="0" smtClean="0"/>
-          </a:p>
-          <a:p>
-            <a:endParaRPr lang="en-US" sz="2400" dirty="0" smtClean="0"/>
-          </a:p>
-          <a:p>
-            <a:pPr>
-              <a:buNone/>
-            </a:pPr>
-            <a:endParaRPr lang="en-US" sz="2400" dirty="0" smtClean="0"/>
+            <a:r>
+              <a:rPr lang="en-US" dirty="0" smtClean="0"/>
+              <a:t>ADD PICTURE HERE SHOWING  A MELD INSTANCE FOR THE TASK STRUCT</a:t>
+            </a:r>
+            <a:endParaRPr lang="en-US" dirty="0"/>
           </a:p>
         </p:txBody>
       </p:sp>
     </p:spTree>
+    <p:extLst>
+      <p:ext uri="{BB962C8B-B14F-4D97-AF65-F5344CB8AC3E}">
+        <p14:creationId xmlns:p14="http://schemas.microsoft.com/office/powerpoint/2010/main" val="1435437809"/>
+      </p:ext>
+    </p:extLst>
   </p:cSld>
   <p:clrMapOvr>
     <a:masterClrMapping/>
@@ -3972,7 +4252,7 @@
           <a:p>
             <a:r>
               <a:rPr lang="en-US" dirty="0" smtClean="0"/>
-              <a:t>Future Work</a:t>
+              <a:t>Memory Verification</a:t>
             </a:r>
             <a:endParaRPr lang="en-US" dirty="0"/>
           </a:p>
@@ -3988,18 +4268,49 @@
             <p:ph idx="1"/>
           </p:nvPr>
         </p:nvSpPr>
-        <p:spPr/>
+        <p:spPr>
+          <a:xfrm>
+            <a:off x="457200" y="1600200"/>
+            <a:ext cx="4114800" cy="4525963"/>
+          </a:xfrm>
+        </p:spPr>
         <p:txBody>
           <a:bodyPr>
             <a:normAutofit/>
           </a:bodyPr>
           <a:lstStyle/>
           <a:p>
-            <a:pPr marL="514350" indent="-514350">
-              <a:buFont typeface="+mj-lt"/>
-              <a:buAutoNum type="arabicPeriod"/>
-            </a:pPr>
-            <a:endParaRPr lang="en-US" sz="2400" dirty="0"/>
+            <a:r>
+              <a:rPr lang="en-US" sz="2000" dirty="0" smtClean="0"/>
+              <a:t>Exported memory of a test application in two modes</a:t>
+            </a:r>
+          </a:p>
+          <a:p>
+            <a:pPr lvl="1"/>
+            <a:r>
+              <a:rPr lang="en-US" sz="1800" dirty="0" smtClean="0"/>
+              <a:t>No stack/heap manipulations</a:t>
+            </a:r>
+          </a:p>
+          <a:p>
+            <a:pPr lvl="1"/>
+            <a:r>
+              <a:rPr lang="en-US" sz="1800" dirty="0" smtClean="0"/>
+              <a:t>Stack/Heap Manipulations</a:t>
+            </a:r>
+          </a:p>
+          <a:p>
+            <a:r>
+              <a:rPr lang="en-US" sz="2000" dirty="0" smtClean="0"/>
+              <a:t>Snapshot directories compared with diff tools such as Meld</a:t>
+            </a:r>
+          </a:p>
+          <a:p>
+            <a:r>
+              <a:rPr lang="en-US" sz="2000" dirty="0" smtClean="0"/>
+              <a:t>Analyze the differences in the two snapshots </a:t>
+            </a:r>
+            <a:endParaRPr lang="en-US" sz="2000" dirty="0"/>
           </a:p>
         </p:txBody>
       </p:sp>
@@ -4050,7 +4361,558 @@
           </a:p>
         </p:txBody>
       </p:sp>
+      <p:pic>
+        <p:nvPicPr>
+          <p:cNvPr id="6" name="Picture 5"/>
+          <p:cNvPicPr>
+            <a:picLocks noChangeAspect="1"/>
+          </p:cNvPicPr>
+          <p:nvPr/>
+        </p:nvPicPr>
+        <p:blipFill>
+          <a:blip r:embed="rId2" cstate="print">
+            <a:extLst>
+              <a:ext uri="{28A0092B-C50C-407E-A947-70E740481C1C}">
+                <a14:useLocalDpi xmlns:a14="http://schemas.microsoft.com/office/drawing/2010/main" val="0"/>
+              </a:ext>
+            </a:extLst>
+          </a:blip>
+          <a:stretch>
+            <a:fillRect/>
+          </a:stretch>
+        </p:blipFill>
+        <p:spPr>
+          <a:xfrm>
+            <a:off x="4648200" y="2286000"/>
+            <a:ext cx="4148253" cy="2237873"/>
+          </a:xfrm>
+          <a:prstGeom prst="rect">
+            <a:avLst/>
+          </a:prstGeom>
+        </p:spPr>
+      </p:pic>
     </p:spTree>
+    <p:extLst>
+      <p:ext uri="{BB962C8B-B14F-4D97-AF65-F5344CB8AC3E}">
+        <p14:creationId xmlns:p14="http://schemas.microsoft.com/office/powerpoint/2010/main" val="1438366000"/>
+      </p:ext>
+    </p:extLst>
+  </p:cSld>
+  <p:clrMapOvr>
+    <a:masterClrMapping/>
+  </p:clrMapOvr>
+</p:sld>
+</file>
+
+<file path=ppt/slides/slide14.xml><?xml version="1.0" encoding="utf-8"?>
+<p:sld xmlns:a="http://schemas.openxmlformats.org/drawingml/2006/main" xmlns:r="http://schemas.openxmlformats.org/officeDocument/2006/relationships" xmlns:p="http://schemas.openxmlformats.org/presentationml/2006/main">
+  <p:cSld>
+    <p:spTree>
+      <p:nvGrpSpPr>
+        <p:cNvPr id="1" name=""/>
+        <p:cNvGrpSpPr/>
+        <p:nvPr/>
+      </p:nvGrpSpPr>
+      <p:grpSpPr>
+        <a:xfrm>
+          <a:off x="0" y="0"/>
+          <a:ext cx="0" cy="0"/>
+          <a:chOff x="0" y="0"/>
+          <a:chExt cx="0" cy="0"/>
+        </a:xfrm>
+      </p:grpSpPr>
+      <p:sp>
+        <p:nvSpPr>
+          <p:cNvPr id="2" name="Title 1"/>
+          <p:cNvSpPr>
+            <a:spLocks noGrp="1"/>
+          </p:cNvSpPr>
+          <p:nvPr>
+            <p:ph type="title"/>
+          </p:nvPr>
+        </p:nvSpPr>
+        <p:spPr/>
+        <p:txBody>
+          <a:bodyPr/>
+          <a:lstStyle/>
+          <a:p>
+            <a:r>
+              <a:rPr lang="en-US" dirty="0" smtClean="0"/>
+              <a:t>Files Verification</a:t>
+            </a:r>
+            <a:endParaRPr lang="en-US" dirty="0"/>
+          </a:p>
+        </p:txBody>
+      </p:sp>
+      <p:sp>
+        <p:nvSpPr>
+          <p:cNvPr id="3" name="Content Placeholder 2"/>
+          <p:cNvSpPr>
+            <a:spLocks noGrp="1"/>
+          </p:cNvSpPr>
+          <p:nvPr>
+            <p:ph idx="1"/>
+          </p:nvPr>
+        </p:nvSpPr>
+        <p:spPr>
+          <a:xfrm>
+            <a:off x="457200" y="1600200"/>
+            <a:ext cx="8229600" cy="4525963"/>
+          </a:xfrm>
+        </p:spPr>
+        <p:txBody>
+          <a:bodyPr/>
+          <a:lstStyle/>
+          <a:p>
+            <a:r>
+              <a:rPr lang="en-US" dirty="0" smtClean="0"/>
+              <a:t>Robert – I will leave this slide for you to populate</a:t>
+            </a:r>
+            <a:endParaRPr lang="en-US" dirty="0"/>
+          </a:p>
+        </p:txBody>
+      </p:sp>
+      <p:sp>
+        <p:nvSpPr>
+          <p:cNvPr id="4" name="Footer Placeholder 3"/>
+          <p:cNvSpPr>
+            <a:spLocks noGrp="1"/>
+          </p:cNvSpPr>
+          <p:nvPr>
+            <p:ph type="ftr" sz="quarter" idx="11"/>
+          </p:nvPr>
+        </p:nvSpPr>
+        <p:spPr/>
+        <p:txBody>
+          <a:bodyPr/>
+          <a:lstStyle/>
+          <a:p>
+            <a:r>
+              <a:rPr lang="en-US" smtClean="0"/>
+              <a:t>CSE 522S – Advanced Operating Systems</a:t>
+            </a:r>
+            <a:endParaRPr lang="en-US" dirty="0"/>
+          </a:p>
+        </p:txBody>
+      </p:sp>
+      <p:sp>
+        <p:nvSpPr>
+          <p:cNvPr id="5" name="Slide Number Placeholder 4"/>
+          <p:cNvSpPr>
+            <a:spLocks noGrp="1"/>
+          </p:cNvSpPr>
+          <p:nvPr>
+            <p:ph type="sldNum" sz="quarter" idx="12"/>
+          </p:nvPr>
+        </p:nvSpPr>
+        <p:spPr/>
+        <p:txBody>
+          <a:bodyPr/>
+          <a:lstStyle/>
+          <a:p>
+            <a:fld id="{A773B20C-5347-4FF9-A9F0-76F937F60217}" type="slidenum">
+              <a:rPr lang="en-US" smtClean="0"/>
+              <a:pPr/>
+              <a:t>14</a:t>
+            </a:fld>
+            <a:endParaRPr lang="en-US"/>
+          </a:p>
+        </p:txBody>
+      </p:sp>
+    </p:spTree>
+    <p:extLst>
+      <p:ext uri="{BB962C8B-B14F-4D97-AF65-F5344CB8AC3E}">
+        <p14:creationId xmlns:p14="http://schemas.microsoft.com/office/powerpoint/2010/main" val="2823327238"/>
+      </p:ext>
+    </p:extLst>
+  </p:cSld>
+  <p:clrMapOvr>
+    <a:masterClrMapping/>
+  </p:clrMapOvr>
+</p:sld>
+</file>
+
+<file path=ppt/slides/slide15.xml><?xml version="1.0" encoding="utf-8"?>
+<p:sld xmlns:a="http://schemas.openxmlformats.org/drawingml/2006/main" xmlns:r="http://schemas.openxmlformats.org/officeDocument/2006/relationships" xmlns:p="http://schemas.openxmlformats.org/presentationml/2006/main">
+  <p:cSld>
+    <p:spTree>
+      <p:nvGrpSpPr>
+        <p:cNvPr id="1" name=""/>
+        <p:cNvGrpSpPr/>
+        <p:nvPr/>
+      </p:nvGrpSpPr>
+      <p:grpSpPr>
+        <a:xfrm>
+          <a:off x="0" y="0"/>
+          <a:ext cx="0" cy="0"/>
+          <a:chOff x="0" y="0"/>
+          <a:chExt cx="0" cy="0"/>
+        </a:xfrm>
+      </p:grpSpPr>
+      <p:sp>
+        <p:nvSpPr>
+          <p:cNvPr id="2" name="Title 1"/>
+          <p:cNvSpPr>
+            <a:spLocks noGrp="1"/>
+          </p:cNvSpPr>
+          <p:nvPr>
+            <p:ph type="title"/>
+          </p:nvPr>
+        </p:nvSpPr>
+        <p:spPr/>
+        <p:txBody>
+          <a:bodyPr/>
+          <a:lstStyle/>
+          <a:p>
+            <a:r>
+              <a:rPr lang="en-US" dirty="0" smtClean="0"/>
+              <a:t>Demo</a:t>
+            </a:r>
+            <a:endParaRPr lang="en-US" dirty="0"/>
+          </a:p>
+        </p:txBody>
+      </p:sp>
+      <p:sp>
+        <p:nvSpPr>
+          <p:cNvPr id="3" name="Content Placeholder 2"/>
+          <p:cNvSpPr>
+            <a:spLocks noGrp="1"/>
+          </p:cNvSpPr>
+          <p:nvPr>
+            <p:ph idx="1"/>
+          </p:nvPr>
+        </p:nvSpPr>
+        <p:spPr/>
+        <p:txBody>
+          <a:bodyPr/>
+          <a:lstStyle/>
+          <a:p>
+            <a:endParaRPr lang="en-US" dirty="0"/>
+          </a:p>
+        </p:txBody>
+      </p:sp>
+      <p:sp>
+        <p:nvSpPr>
+          <p:cNvPr id="4" name="Footer Placeholder 3"/>
+          <p:cNvSpPr>
+            <a:spLocks noGrp="1"/>
+          </p:cNvSpPr>
+          <p:nvPr>
+            <p:ph type="ftr" sz="quarter" idx="11"/>
+          </p:nvPr>
+        </p:nvSpPr>
+        <p:spPr/>
+        <p:txBody>
+          <a:bodyPr/>
+          <a:lstStyle/>
+          <a:p>
+            <a:r>
+              <a:rPr lang="en-US" smtClean="0"/>
+              <a:t>CSE 522S – Advanced Operating Systems</a:t>
+            </a:r>
+            <a:endParaRPr lang="en-US" dirty="0"/>
+          </a:p>
+        </p:txBody>
+      </p:sp>
+      <p:sp>
+        <p:nvSpPr>
+          <p:cNvPr id="5" name="Slide Number Placeholder 4"/>
+          <p:cNvSpPr>
+            <a:spLocks noGrp="1"/>
+          </p:cNvSpPr>
+          <p:nvPr>
+            <p:ph type="sldNum" sz="quarter" idx="12"/>
+          </p:nvPr>
+        </p:nvSpPr>
+        <p:spPr/>
+        <p:txBody>
+          <a:bodyPr/>
+          <a:lstStyle/>
+          <a:p>
+            <a:fld id="{A773B20C-5347-4FF9-A9F0-76F937F60217}" type="slidenum">
+              <a:rPr lang="en-US" smtClean="0"/>
+              <a:pPr/>
+              <a:t>15</a:t>
+            </a:fld>
+            <a:endParaRPr lang="en-US"/>
+          </a:p>
+        </p:txBody>
+      </p:sp>
+    </p:spTree>
+    <p:extLst>
+      <p:ext uri="{BB962C8B-B14F-4D97-AF65-F5344CB8AC3E}">
+        <p14:creationId xmlns:p14="http://schemas.microsoft.com/office/powerpoint/2010/main" val="3022129970"/>
+      </p:ext>
+    </p:extLst>
+  </p:cSld>
+  <p:clrMapOvr>
+    <a:masterClrMapping/>
+  </p:clrMapOvr>
+</p:sld>
+</file>
+
+<file path=ppt/slides/slide16.xml><?xml version="1.0" encoding="utf-8"?>
+<p:sld xmlns:a="http://schemas.openxmlformats.org/drawingml/2006/main" xmlns:r="http://schemas.openxmlformats.org/officeDocument/2006/relationships" xmlns:p="http://schemas.openxmlformats.org/presentationml/2006/main">
+  <p:cSld>
+    <p:spTree>
+      <p:nvGrpSpPr>
+        <p:cNvPr id="1" name=""/>
+        <p:cNvGrpSpPr/>
+        <p:nvPr/>
+      </p:nvGrpSpPr>
+      <p:grpSpPr>
+        <a:xfrm>
+          <a:off x="0" y="0"/>
+          <a:ext cx="0" cy="0"/>
+          <a:chOff x="0" y="0"/>
+          <a:chExt cx="0" cy="0"/>
+        </a:xfrm>
+      </p:grpSpPr>
+      <p:sp>
+        <p:nvSpPr>
+          <p:cNvPr id="2" name="Title 1"/>
+          <p:cNvSpPr>
+            <a:spLocks noGrp="1"/>
+          </p:cNvSpPr>
+          <p:nvPr>
+            <p:ph type="title"/>
+          </p:nvPr>
+        </p:nvSpPr>
+        <p:spPr/>
+        <p:txBody>
+          <a:bodyPr/>
+          <a:lstStyle/>
+          <a:p>
+            <a:r>
+              <a:rPr lang="en-US" dirty="0" smtClean="0"/>
+              <a:t>Challenges</a:t>
+            </a:r>
+            <a:endParaRPr lang="en-US" dirty="0"/>
+          </a:p>
+        </p:txBody>
+      </p:sp>
+      <p:sp>
+        <p:nvSpPr>
+          <p:cNvPr id="3" name="Content Placeholder 2"/>
+          <p:cNvSpPr>
+            <a:spLocks noGrp="1"/>
+          </p:cNvSpPr>
+          <p:nvPr>
+            <p:ph idx="1"/>
+          </p:nvPr>
+        </p:nvSpPr>
+        <p:spPr>
+          <a:xfrm>
+            <a:off x="457200" y="1219200"/>
+            <a:ext cx="8229600" cy="4525963"/>
+          </a:xfrm>
+        </p:spPr>
+        <p:txBody>
+          <a:bodyPr/>
+          <a:lstStyle/>
+          <a:p>
+            <a:r>
+              <a:rPr lang="en-US" dirty="0" smtClean="0"/>
+              <a:t>Complex </a:t>
+            </a:r>
+            <a:r>
+              <a:rPr lang="en-US" dirty="0" smtClean="0"/>
+              <a:t>and Multi-tiered </a:t>
+            </a:r>
+            <a:r>
+              <a:rPr lang="en-US" dirty="0" err="1" smtClean="0"/>
+              <a:t>struct</a:t>
+            </a:r>
+            <a:r>
+              <a:rPr lang="en-US" dirty="0" smtClean="0"/>
+              <a:t> definitions</a:t>
+            </a:r>
+          </a:p>
+          <a:p>
+            <a:r>
+              <a:rPr lang="en-US" dirty="0" smtClean="0"/>
+              <a:t>Breadth of involved kernel sub-systems</a:t>
+            </a:r>
+          </a:p>
+          <a:p>
+            <a:r>
+              <a:rPr lang="en-US" dirty="0" smtClean="0"/>
+              <a:t>Kernel vs </a:t>
+            </a:r>
+            <a:r>
+              <a:rPr lang="en-US" dirty="0" smtClean="0"/>
+              <a:t>Module</a:t>
+            </a:r>
+          </a:p>
+          <a:p>
+            <a:r>
+              <a:rPr lang="en-US" dirty="0" smtClean="0"/>
+              <a:t>Lack of documentation</a:t>
+            </a:r>
+            <a:endParaRPr lang="en-US" dirty="0"/>
+          </a:p>
+        </p:txBody>
+      </p:sp>
+      <p:sp>
+        <p:nvSpPr>
+          <p:cNvPr id="4" name="Footer Placeholder 3"/>
+          <p:cNvSpPr>
+            <a:spLocks noGrp="1"/>
+          </p:cNvSpPr>
+          <p:nvPr>
+            <p:ph type="ftr" sz="quarter" idx="11"/>
+          </p:nvPr>
+        </p:nvSpPr>
+        <p:spPr/>
+        <p:txBody>
+          <a:bodyPr/>
+          <a:lstStyle/>
+          <a:p>
+            <a:r>
+              <a:rPr lang="en-US" smtClean="0"/>
+              <a:t>CSE 522S – Advanced Operating Systems</a:t>
+            </a:r>
+            <a:endParaRPr lang="en-US" dirty="0"/>
+          </a:p>
+        </p:txBody>
+      </p:sp>
+      <p:sp>
+        <p:nvSpPr>
+          <p:cNvPr id="5" name="Slide Number Placeholder 4"/>
+          <p:cNvSpPr>
+            <a:spLocks noGrp="1"/>
+          </p:cNvSpPr>
+          <p:nvPr>
+            <p:ph type="sldNum" sz="quarter" idx="12"/>
+          </p:nvPr>
+        </p:nvSpPr>
+        <p:spPr/>
+        <p:txBody>
+          <a:bodyPr/>
+          <a:lstStyle/>
+          <a:p>
+            <a:fld id="{A773B20C-5347-4FF9-A9F0-76F937F60217}" type="slidenum">
+              <a:rPr lang="en-US" smtClean="0"/>
+              <a:pPr/>
+              <a:t>16</a:t>
+            </a:fld>
+            <a:endParaRPr lang="en-US"/>
+          </a:p>
+        </p:txBody>
+      </p:sp>
+    </p:spTree>
+  </p:cSld>
+  <p:clrMapOvr>
+    <a:masterClrMapping/>
+  </p:clrMapOvr>
+  <p:timing>
+    <p:tnLst>
+      <p:par>
+        <p:cTn id="1" dur="indefinite" restart="never" nodeType="tmRoot"/>
+      </p:par>
+    </p:tnLst>
+  </p:timing>
+</p:sld>
+</file>
+
+<file path=ppt/slides/slide17.xml><?xml version="1.0" encoding="utf-8"?>
+<p:sld xmlns:a="http://schemas.openxmlformats.org/drawingml/2006/main" xmlns:r="http://schemas.openxmlformats.org/officeDocument/2006/relationships" xmlns:p="http://schemas.openxmlformats.org/presentationml/2006/main">
+  <p:cSld>
+    <p:spTree>
+      <p:nvGrpSpPr>
+        <p:cNvPr id="1" name=""/>
+        <p:cNvGrpSpPr/>
+        <p:nvPr/>
+      </p:nvGrpSpPr>
+      <p:grpSpPr>
+        <a:xfrm>
+          <a:off x="0" y="0"/>
+          <a:ext cx="0" cy="0"/>
+          <a:chOff x="0" y="0"/>
+          <a:chExt cx="0" cy="0"/>
+        </a:xfrm>
+      </p:grpSpPr>
+      <p:sp>
+        <p:nvSpPr>
+          <p:cNvPr id="2" name="Title 1"/>
+          <p:cNvSpPr>
+            <a:spLocks noGrp="1"/>
+          </p:cNvSpPr>
+          <p:nvPr>
+            <p:ph type="title"/>
+          </p:nvPr>
+        </p:nvSpPr>
+        <p:spPr>
+          <a:xfrm>
+            <a:off x="457200" y="2362200"/>
+            <a:ext cx="8229600" cy="1143000"/>
+          </a:xfrm>
+        </p:spPr>
+        <p:txBody>
+          <a:bodyPr/>
+          <a:lstStyle/>
+          <a:p>
+            <a:r>
+              <a:rPr lang="en-US" dirty="0" smtClean="0"/>
+              <a:t>Questions</a:t>
+            </a:r>
+            <a:endParaRPr lang="en-US" dirty="0"/>
+          </a:p>
+        </p:txBody>
+      </p:sp>
+      <p:sp>
+        <p:nvSpPr>
+          <p:cNvPr id="4" name="Footer Placeholder 3"/>
+          <p:cNvSpPr>
+            <a:spLocks noGrp="1"/>
+          </p:cNvSpPr>
+          <p:nvPr>
+            <p:ph type="ftr" sz="quarter" idx="11"/>
+          </p:nvPr>
+        </p:nvSpPr>
+        <p:spPr/>
+        <p:txBody>
+          <a:bodyPr/>
+          <a:lstStyle/>
+          <a:p>
+            <a:r>
+              <a:rPr lang="en-US" smtClean="0"/>
+              <a:t>CSE 522S – Advanced Operating Systems</a:t>
+            </a:r>
+            <a:endParaRPr lang="en-US" dirty="0"/>
+          </a:p>
+        </p:txBody>
+      </p:sp>
+      <p:sp>
+        <p:nvSpPr>
+          <p:cNvPr id="5" name="Slide Number Placeholder 4"/>
+          <p:cNvSpPr>
+            <a:spLocks noGrp="1"/>
+          </p:cNvSpPr>
+          <p:nvPr>
+            <p:ph type="sldNum" sz="quarter" idx="12"/>
+          </p:nvPr>
+        </p:nvSpPr>
+        <p:spPr/>
+        <p:txBody>
+          <a:bodyPr/>
+          <a:lstStyle/>
+          <a:p>
+            <a:fld id="{A773B20C-5347-4FF9-A9F0-76F937F60217}" type="slidenum">
+              <a:rPr lang="en-US" smtClean="0"/>
+              <a:pPr/>
+              <a:t>17</a:t>
+            </a:fld>
+            <a:endParaRPr lang="en-US"/>
+          </a:p>
+        </p:txBody>
+      </p:sp>
+    </p:spTree>
+    <p:extLst>
+      <p:ext uri="{BB962C8B-B14F-4D97-AF65-F5344CB8AC3E}">
+        <p14:creationId xmlns:p14="http://schemas.microsoft.com/office/powerpoint/2010/main" val="1730277611"/>
+      </p:ext>
+    </p:extLst>
   </p:cSld>
   <p:clrMapOvr>
     <a:masterClrMapping/>
@@ -4313,88 +5175,88 @@
         </p:spPr>
         <p:txBody>
           <a:bodyPr>
-            <a:normAutofit lnSpcReduction="10000"/>
+            <a:normAutofit/>
           </a:bodyPr>
           <a:lstStyle/>
           <a:p>
             <a:r>
-              <a:rPr lang="en-US" dirty="0" smtClean="0"/>
+              <a:rPr lang="en-US" sz="2000" dirty="0" smtClean="0"/>
               <a:t>Cyber Security</a:t>
             </a:r>
           </a:p>
           <a:p>
             <a:pPr lvl="1"/>
             <a:r>
-              <a:rPr lang="en-US" dirty="0" smtClean="0"/>
+              <a:rPr lang="en-US" sz="1800" dirty="0" smtClean="0"/>
               <a:t>Reverse Engineering</a:t>
             </a:r>
           </a:p>
           <a:p>
             <a:pPr lvl="1"/>
             <a:r>
-              <a:rPr lang="en-US" dirty="0" smtClean="0"/>
+              <a:rPr lang="en-US" sz="1800" dirty="0" smtClean="0"/>
               <a:t>Malware Analysis</a:t>
             </a:r>
           </a:p>
           <a:p>
             <a:pPr lvl="1"/>
             <a:r>
-              <a:rPr lang="en-US" dirty="0" smtClean="0"/>
+              <a:rPr lang="en-US" sz="1800" dirty="0" smtClean="0"/>
               <a:t>Research</a:t>
             </a:r>
           </a:p>
           <a:p>
             <a:r>
-              <a:rPr lang="en-US" dirty="0" smtClean="0"/>
+              <a:rPr lang="en-US" sz="2000" dirty="0" smtClean="0"/>
               <a:t>Software Development</a:t>
             </a:r>
           </a:p>
           <a:p>
             <a:pPr lvl="1"/>
             <a:r>
-              <a:rPr lang="en-US" dirty="0" smtClean="0"/>
+              <a:rPr lang="en-US" sz="1800" dirty="0" smtClean="0"/>
               <a:t>Memory Layout</a:t>
             </a:r>
           </a:p>
           <a:p>
             <a:pPr lvl="1"/>
             <a:r>
-              <a:rPr lang="en-US" dirty="0" smtClean="0"/>
+              <a:rPr lang="en-US" sz="1800" dirty="0" smtClean="0"/>
               <a:t>Performance Tuning</a:t>
             </a:r>
           </a:p>
           <a:p>
             <a:pPr lvl="1"/>
             <a:r>
-              <a:rPr lang="en-US" dirty="0" smtClean="0"/>
+              <a:rPr lang="en-US" sz="1800" dirty="0" smtClean="0"/>
               <a:t>Software Verification</a:t>
             </a:r>
           </a:p>
           <a:p>
             <a:r>
-              <a:rPr lang="en-US" dirty="0" smtClean="0"/>
+              <a:rPr lang="en-US" sz="2000" dirty="0" smtClean="0"/>
               <a:t>Existing Tools</a:t>
             </a:r>
           </a:p>
           <a:p>
             <a:pPr lvl="1"/>
             <a:r>
-              <a:rPr lang="en-US" dirty="0" err="1"/>
+              <a:rPr lang="en-US" sz="1800" dirty="0" err="1"/>
               <a:t>f</a:t>
             </a:r>
             <a:r>
-              <a:rPr lang="en-US" dirty="0" err="1" smtClean="0"/>
+              <a:rPr lang="en-US" sz="1800" dirty="0" err="1" smtClean="0"/>
               <a:t>trace</a:t>
             </a:r>
-            <a:endParaRPr lang="en-US" dirty="0" smtClean="0"/>
+            <a:endParaRPr lang="en-US" sz="1800" dirty="0" smtClean="0"/>
           </a:p>
           <a:p>
             <a:pPr lvl="1"/>
             <a:r>
-              <a:rPr lang="en-US" dirty="0" err="1" smtClean="0"/>
+              <a:rPr lang="en-US" sz="1800" dirty="0" err="1" smtClean="0"/>
               <a:t>strace</a:t>
             </a:r>
-            <a:endParaRPr lang="en-US" dirty="0" smtClean="0"/>
+            <a:endParaRPr lang="en-US" sz="1800" dirty="0" smtClean="0"/>
           </a:p>
         </p:txBody>
       </p:sp>
@@ -5043,7 +5905,7 @@
         </p:spPr>
         <p:txBody>
           <a:bodyPr>
-            <a:normAutofit/>
+            <a:normAutofit fontScale="92500" lnSpcReduction="10000"/>
           </a:bodyPr>
           <a:lstStyle/>
           <a:p>
@@ -5060,7 +5922,7 @@
           <a:p>
             <a:r>
               <a:rPr lang="en-US" sz="1800" dirty="0" smtClean="0"/>
-              <a:t>All virtual memory allocated (VMA) regions connected through linked list</a:t>
+              <a:t>All virtual memory area (VMA) regions connected through linked list</a:t>
             </a:r>
           </a:p>
           <a:p>
@@ -5096,6 +5958,7 @@
               <a:rPr lang="en-US" sz="1400" dirty="0" smtClean="0"/>
               <a:t>…</a:t>
             </a:r>
+            <a:endParaRPr lang="en-US" sz="1800" dirty="0" smtClean="0"/>
           </a:p>
           <a:p>
             <a:r>
@@ -5103,10 +5966,46 @@
               <a:t>Exported by the module when the “--mem“ command is provided to </a:t>
             </a:r>
             <a:r>
-              <a:rPr lang="en-US" sz="1800" dirty="0" err="1"/>
+              <a:rPr lang="en-US" sz="1800" dirty="0" err="1" smtClean="0"/>
               <a:t>tskdmp</a:t>
             </a:r>
-            <a:endParaRPr lang="en-US" sz="1800" dirty="0"/>
+            <a:endParaRPr lang="en-US" sz="1800" dirty="0" smtClean="0"/>
+          </a:p>
+          <a:p>
+            <a:r>
+              <a:rPr lang="en-US" sz="1800" dirty="0" smtClean="0"/>
+              <a:t>Examples</a:t>
+            </a:r>
+          </a:p>
+          <a:p>
+            <a:pPr lvl="1"/>
+            <a:r>
+              <a:rPr lang="en-US" sz="1400" dirty="0" smtClean="0"/>
+              <a:t>Stack</a:t>
+            </a:r>
+          </a:p>
+          <a:p>
+            <a:pPr lvl="1"/>
+            <a:r>
+              <a:rPr lang="en-US" sz="1400" dirty="0" smtClean="0"/>
+              <a:t>Heap</a:t>
+            </a:r>
+          </a:p>
+          <a:p>
+            <a:pPr lvl="1"/>
+            <a:r>
+              <a:rPr lang="en-US" sz="1400" dirty="0" smtClean="0"/>
+              <a:t>BSS</a:t>
+            </a:r>
+            <a:endParaRPr lang="en-US" sz="1400" dirty="0"/>
+          </a:p>
+          <a:p>
+            <a:pPr lvl="1"/>
+            <a:r>
+              <a:rPr lang="en-US" sz="1400" dirty="0" smtClean="0"/>
+              <a:t>…</a:t>
+            </a:r>
+            <a:endParaRPr lang="en-US" sz="1400" dirty="0"/>
           </a:p>
           <a:p>
             <a:endParaRPr lang="en-US" sz="1800" dirty="0" smtClean="0"/>
@@ -7508,7 +8407,7 @@
           <a:p>
             <a:r>
               <a:rPr lang="en-US" dirty="0" smtClean="0"/>
-              <a:t>Remove if the file export option does not get completed</a:t>
+              <a:t>Robert – I will leave this portion for you as well.</a:t>
             </a:r>
             <a:endParaRPr lang="en-US" dirty="0"/>
           </a:p>
@@ -7670,9 +8569,9 @@
         <p:grpSpPr>
           <a:xfrm>
             <a:off x="5181600" y="1676400"/>
-            <a:ext cx="3962400" cy="3466422"/>
+            <a:ext cx="3545305" cy="3466422"/>
             <a:chOff x="533400" y="1715970"/>
-            <a:chExt cx="4343400" cy="3466422"/>
+            <a:chExt cx="3886200" cy="3466422"/>
           </a:xfrm>
         </p:grpSpPr>
         <p:sp>
@@ -8033,40 +8932,6 @@
                 <a:t>Kernel Space</a:t>
               </a:r>
               <a:endParaRPr lang="en-US" dirty="0"/>
-            </a:p>
-          </p:txBody>
-        </p:sp>
-        <p:sp>
-          <p:nvSpPr>
-            <p:cNvPr id="38" name="TextBox 37"/>
-            <p:cNvSpPr txBox="1"/>
-            <p:nvPr/>
-          </p:nvSpPr>
-          <p:spPr>
-            <a:xfrm>
-              <a:off x="3581400" y="2959020"/>
-              <a:ext cx="1295400" cy="246221"/>
-            </a:xfrm>
-            <a:prstGeom prst="rect">
-              <a:avLst/>
-            </a:prstGeom>
-            <a:noFill/>
-          </p:spPr>
-          <p:txBody>
-            <a:bodyPr wrap="square" rtlCol="0">
-              <a:spAutoFit/>
-            </a:bodyPr>
-            <a:lstStyle/>
-            <a:p>
-              <a:r>
-                <a:rPr lang="en-US" sz="1000" dirty="0" smtClean="0"/>
-                <a:t>1. Target </a:t>
-              </a:r>
-              <a:r>
-                <a:rPr lang="en-US" sz="1000" dirty="0" err="1" smtClean="0"/>
-                <a:t>pid</a:t>
-              </a:r>
-              <a:endParaRPr lang="en-US" sz="1000" dirty="0"/>
             </a:p>
           </p:txBody>
         </p:sp>

</xml_diff>

<commit_message>
Added the captures that can be utilized with meld to show the characteristics discussed in the presentation. Also, added some final touches to the presentation.
</commit_message>
<xml_diff>
--- a/final_presentation.pptx
+++ b/final_presentation.pptx
@@ -17,13 +17,13 @@
     <p:sldId id="266" r:id="rId8"/>
     <p:sldId id="268" r:id="rId9"/>
     <p:sldId id="259" r:id="rId10"/>
-    <p:sldId id="265" r:id="rId11"/>
+    <p:sldId id="276" r:id="rId11"/>
     <p:sldId id="269" r:id="rId12"/>
     <p:sldId id="270" r:id="rId13"/>
     <p:sldId id="272" r:id="rId14"/>
     <p:sldId id="273" r:id="rId15"/>
-    <p:sldId id="275" r:id="rId16"/>
-    <p:sldId id="260" r:id="rId17"/>
+    <p:sldId id="260" r:id="rId16"/>
+    <p:sldId id="275" r:id="rId17"/>
     <p:sldId id="274" r:id="rId18"/>
   </p:sldIdLst>
   <p:sldSz cx="9144000" cy="6858000" type="screen4x3"/>
@@ -225,7 +225,7 @@
             <a:fld id="{8274FB44-D9BB-4AE5-A1A8-90C00510A7C0}" type="datetimeFigureOut">
               <a:rPr lang="en-US" smtClean="0"/>
               <a:pPr/>
-              <a:t>4/26/2016</a:t>
+              <a:t>4/27/2016</a:t>
             </a:fld>
             <a:endParaRPr lang="en-US"/>
           </a:p>
@@ -494,6 +494,1429 @@
     </a:lvl9pPr>
   </p:notesStyle>
 </p:notesMaster>
+</file>
+
+<file path=ppt/notesSlides/notesSlide1.xml><?xml version="1.0" encoding="utf-8"?>
+<p:notes xmlns:a="http://schemas.openxmlformats.org/drawingml/2006/main" xmlns:r="http://schemas.openxmlformats.org/officeDocument/2006/relationships" xmlns:p="http://schemas.openxmlformats.org/presentationml/2006/main">
+  <p:cSld>
+    <p:spTree>
+      <p:nvGrpSpPr>
+        <p:cNvPr id="1" name=""/>
+        <p:cNvGrpSpPr/>
+        <p:nvPr/>
+      </p:nvGrpSpPr>
+      <p:grpSpPr>
+        <a:xfrm>
+          <a:off x="0" y="0"/>
+          <a:ext cx="0" cy="0"/>
+          <a:chOff x="0" y="0"/>
+          <a:chExt cx="0" cy="0"/>
+        </a:xfrm>
+      </p:grpSpPr>
+      <p:sp>
+        <p:nvSpPr>
+          <p:cNvPr id="2" name="Slide Image Placeholder 1"/>
+          <p:cNvSpPr>
+            <a:spLocks noGrp="1" noRot="1" noChangeAspect="1"/>
+          </p:cNvSpPr>
+          <p:nvPr>
+            <p:ph type="sldImg"/>
+          </p:nvPr>
+        </p:nvSpPr>
+        <p:spPr/>
+      </p:sp>
+      <p:sp>
+        <p:nvSpPr>
+          <p:cNvPr id="3" name="Notes Placeholder 2"/>
+          <p:cNvSpPr>
+            <a:spLocks noGrp="1"/>
+          </p:cNvSpPr>
+          <p:nvPr>
+            <p:ph type="body" idx="1"/>
+          </p:nvPr>
+        </p:nvSpPr>
+        <p:spPr/>
+        <p:txBody>
+          <a:bodyPr/>
+          <a:lstStyle/>
+          <a:p>
+            <a:r>
+              <a:rPr lang="en-US" dirty="0" smtClean="0"/>
+              <a:t>Cameron</a:t>
+            </a:r>
+            <a:endParaRPr lang="en-US" dirty="0"/>
+          </a:p>
+        </p:txBody>
+      </p:sp>
+      <p:sp>
+        <p:nvSpPr>
+          <p:cNvPr id="4" name="Slide Number Placeholder 3"/>
+          <p:cNvSpPr>
+            <a:spLocks noGrp="1"/>
+          </p:cNvSpPr>
+          <p:nvPr>
+            <p:ph type="sldNum" sz="quarter" idx="10"/>
+          </p:nvPr>
+        </p:nvSpPr>
+        <p:spPr/>
+        <p:txBody>
+          <a:bodyPr/>
+          <a:lstStyle/>
+          <a:p>
+            <a:fld id="{0EDD4BF9-4F82-4169-95B0-797E1744D4AD}" type="slidenum">
+              <a:rPr lang="en-US" smtClean="0"/>
+              <a:pPr/>
+              <a:t>1</a:t>
+            </a:fld>
+            <a:endParaRPr lang="en-US"/>
+          </a:p>
+        </p:txBody>
+      </p:sp>
+    </p:spTree>
+    <p:extLst>
+      <p:ext uri="{BB962C8B-B14F-4D97-AF65-F5344CB8AC3E}">
+        <p14:creationId xmlns:p14="http://schemas.microsoft.com/office/powerpoint/2010/main" val="240976954"/>
+      </p:ext>
+    </p:extLst>
+  </p:cSld>
+  <p:clrMapOvr>
+    <a:masterClrMapping/>
+  </p:clrMapOvr>
+</p:notes>
+</file>
+
+<file path=ppt/notesSlides/notesSlide10.xml><?xml version="1.0" encoding="utf-8"?>
+<p:notes xmlns:a="http://schemas.openxmlformats.org/drawingml/2006/main" xmlns:r="http://schemas.openxmlformats.org/officeDocument/2006/relationships" xmlns:p="http://schemas.openxmlformats.org/presentationml/2006/main">
+  <p:cSld>
+    <p:spTree>
+      <p:nvGrpSpPr>
+        <p:cNvPr id="1" name=""/>
+        <p:cNvGrpSpPr/>
+        <p:nvPr/>
+      </p:nvGrpSpPr>
+      <p:grpSpPr>
+        <a:xfrm>
+          <a:off x="0" y="0"/>
+          <a:ext cx="0" cy="0"/>
+          <a:chOff x="0" y="0"/>
+          <a:chExt cx="0" cy="0"/>
+        </a:xfrm>
+      </p:grpSpPr>
+      <p:sp>
+        <p:nvSpPr>
+          <p:cNvPr id="2" name="Slide Image Placeholder 1"/>
+          <p:cNvSpPr>
+            <a:spLocks noGrp="1" noRot="1" noChangeAspect="1"/>
+          </p:cNvSpPr>
+          <p:nvPr>
+            <p:ph type="sldImg"/>
+          </p:nvPr>
+        </p:nvSpPr>
+        <p:spPr/>
+      </p:sp>
+      <p:sp>
+        <p:nvSpPr>
+          <p:cNvPr id="3" name="Notes Placeholder 2"/>
+          <p:cNvSpPr>
+            <a:spLocks noGrp="1"/>
+          </p:cNvSpPr>
+          <p:nvPr>
+            <p:ph type="body" idx="1"/>
+          </p:nvPr>
+        </p:nvSpPr>
+        <p:spPr/>
+        <p:txBody>
+          <a:bodyPr/>
+          <a:lstStyle/>
+          <a:p>
+            <a:r>
+              <a:rPr lang="en-US" dirty="0" smtClean="0"/>
+              <a:t>Robert</a:t>
+            </a:r>
+            <a:endParaRPr lang="en-US" dirty="0"/>
+          </a:p>
+        </p:txBody>
+      </p:sp>
+      <p:sp>
+        <p:nvSpPr>
+          <p:cNvPr id="4" name="Slide Number Placeholder 3"/>
+          <p:cNvSpPr>
+            <a:spLocks noGrp="1"/>
+          </p:cNvSpPr>
+          <p:nvPr>
+            <p:ph type="sldNum" sz="quarter" idx="10"/>
+          </p:nvPr>
+        </p:nvSpPr>
+        <p:spPr/>
+        <p:txBody>
+          <a:bodyPr/>
+          <a:lstStyle/>
+          <a:p>
+            <a:fld id="{0EDD4BF9-4F82-4169-95B0-797E1744D4AD}" type="slidenum">
+              <a:rPr lang="en-US" smtClean="0"/>
+              <a:pPr/>
+              <a:t>10</a:t>
+            </a:fld>
+            <a:endParaRPr lang="en-US"/>
+          </a:p>
+        </p:txBody>
+      </p:sp>
+    </p:spTree>
+    <p:extLst>
+      <p:ext uri="{BB962C8B-B14F-4D97-AF65-F5344CB8AC3E}">
+        <p14:creationId xmlns:p14="http://schemas.microsoft.com/office/powerpoint/2010/main" val="476306339"/>
+      </p:ext>
+    </p:extLst>
+  </p:cSld>
+  <p:clrMapOvr>
+    <a:masterClrMapping/>
+  </p:clrMapOvr>
+</p:notes>
+</file>
+
+<file path=ppt/notesSlides/notesSlide11.xml><?xml version="1.0" encoding="utf-8"?>
+<p:notes xmlns:a="http://schemas.openxmlformats.org/drawingml/2006/main" xmlns:r="http://schemas.openxmlformats.org/officeDocument/2006/relationships" xmlns:p="http://schemas.openxmlformats.org/presentationml/2006/main">
+  <p:cSld>
+    <p:spTree>
+      <p:nvGrpSpPr>
+        <p:cNvPr id="1" name=""/>
+        <p:cNvGrpSpPr/>
+        <p:nvPr/>
+      </p:nvGrpSpPr>
+      <p:grpSpPr>
+        <a:xfrm>
+          <a:off x="0" y="0"/>
+          <a:ext cx="0" cy="0"/>
+          <a:chOff x="0" y="0"/>
+          <a:chExt cx="0" cy="0"/>
+        </a:xfrm>
+      </p:grpSpPr>
+      <p:sp>
+        <p:nvSpPr>
+          <p:cNvPr id="2" name="Slide Image Placeholder 1"/>
+          <p:cNvSpPr>
+            <a:spLocks noGrp="1" noRot="1" noChangeAspect="1"/>
+          </p:cNvSpPr>
+          <p:nvPr>
+            <p:ph type="sldImg"/>
+          </p:nvPr>
+        </p:nvSpPr>
+        <p:spPr/>
+      </p:sp>
+      <p:sp>
+        <p:nvSpPr>
+          <p:cNvPr id="3" name="Notes Placeholder 2"/>
+          <p:cNvSpPr>
+            <a:spLocks noGrp="1"/>
+          </p:cNvSpPr>
+          <p:nvPr>
+            <p:ph type="body" idx="1"/>
+          </p:nvPr>
+        </p:nvSpPr>
+        <p:spPr/>
+        <p:txBody>
+          <a:bodyPr/>
+          <a:lstStyle/>
+          <a:p>
+            <a:r>
+              <a:rPr lang="en-US" dirty="0" smtClean="0"/>
+              <a:t>Robert</a:t>
+            </a:r>
+            <a:endParaRPr lang="en-US" dirty="0"/>
+          </a:p>
+        </p:txBody>
+      </p:sp>
+      <p:sp>
+        <p:nvSpPr>
+          <p:cNvPr id="4" name="Slide Number Placeholder 3"/>
+          <p:cNvSpPr>
+            <a:spLocks noGrp="1"/>
+          </p:cNvSpPr>
+          <p:nvPr>
+            <p:ph type="sldNum" sz="quarter" idx="10"/>
+          </p:nvPr>
+        </p:nvSpPr>
+        <p:spPr/>
+        <p:txBody>
+          <a:bodyPr/>
+          <a:lstStyle/>
+          <a:p>
+            <a:fld id="{0EDD4BF9-4F82-4169-95B0-797E1744D4AD}" type="slidenum">
+              <a:rPr lang="en-US" smtClean="0"/>
+              <a:pPr/>
+              <a:t>11</a:t>
+            </a:fld>
+            <a:endParaRPr lang="en-US"/>
+          </a:p>
+        </p:txBody>
+      </p:sp>
+    </p:spTree>
+    <p:extLst>
+      <p:ext uri="{BB962C8B-B14F-4D97-AF65-F5344CB8AC3E}">
+        <p14:creationId xmlns:p14="http://schemas.microsoft.com/office/powerpoint/2010/main" val="4263333593"/>
+      </p:ext>
+    </p:extLst>
+  </p:cSld>
+  <p:clrMapOvr>
+    <a:masterClrMapping/>
+  </p:clrMapOvr>
+</p:notes>
+</file>
+
+<file path=ppt/notesSlides/notesSlide12.xml><?xml version="1.0" encoding="utf-8"?>
+<p:notes xmlns:a="http://schemas.openxmlformats.org/drawingml/2006/main" xmlns:r="http://schemas.openxmlformats.org/officeDocument/2006/relationships" xmlns:p="http://schemas.openxmlformats.org/presentationml/2006/main">
+  <p:cSld>
+    <p:spTree>
+      <p:nvGrpSpPr>
+        <p:cNvPr id="1" name=""/>
+        <p:cNvGrpSpPr/>
+        <p:nvPr/>
+      </p:nvGrpSpPr>
+      <p:grpSpPr>
+        <a:xfrm>
+          <a:off x="0" y="0"/>
+          <a:ext cx="0" cy="0"/>
+          <a:chOff x="0" y="0"/>
+          <a:chExt cx="0" cy="0"/>
+        </a:xfrm>
+      </p:grpSpPr>
+      <p:sp>
+        <p:nvSpPr>
+          <p:cNvPr id="2" name="Slide Image Placeholder 1"/>
+          <p:cNvSpPr>
+            <a:spLocks noGrp="1" noRot="1" noChangeAspect="1"/>
+          </p:cNvSpPr>
+          <p:nvPr>
+            <p:ph type="sldImg"/>
+          </p:nvPr>
+        </p:nvSpPr>
+        <p:spPr/>
+      </p:sp>
+      <p:sp>
+        <p:nvSpPr>
+          <p:cNvPr id="3" name="Notes Placeholder 2"/>
+          <p:cNvSpPr>
+            <a:spLocks noGrp="1"/>
+          </p:cNvSpPr>
+          <p:nvPr>
+            <p:ph type="body" idx="1"/>
+          </p:nvPr>
+        </p:nvSpPr>
+        <p:spPr/>
+        <p:txBody>
+          <a:bodyPr/>
+          <a:lstStyle/>
+          <a:p>
+            <a:r>
+              <a:rPr lang="en-US" dirty="0" smtClean="0"/>
+              <a:t>Cameron</a:t>
+            </a:r>
+            <a:endParaRPr lang="en-US" dirty="0"/>
+          </a:p>
+        </p:txBody>
+      </p:sp>
+      <p:sp>
+        <p:nvSpPr>
+          <p:cNvPr id="4" name="Slide Number Placeholder 3"/>
+          <p:cNvSpPr>
+            <a:spLocks noGrp="1"/>
+          </p:cNvSpPr>
+          <p:nvPr>
+            <p:ph type="sldNum" sz="quarter" idx="10"/>
+          </p:nvPr>
+        </p:nvSpPr>
+        <p:spPr/>
+        <p:txBody>
+          <a:bodyPr/>
+          <a:lstStyle/>
+          <a:p>
+            <a:fld id="{0EDD4BF9-4F82-4169-95B0-797E1744D4AD}" type="slidenum">
+              <a:rPr lang="en-US" smtClean="0"/>
+              <a:pPr/>
+              <a:t>12</a:t>
+            </a:fld>
+            <a:endParaRPr lang="en-US"/>
+          </a:p>
+        </p:txBody>
+      </p:sp>
+    </p:spTree>
+    <p:extLst>
+      <p:ext uri="{BB962C8B-B14F-4D97-AF65-F5344CB8AC3E}">
+        <p14:creationId xmlns:p14="http://schemas.microsoft.com/office/powerpoint/2010/main" val="3256458268"/>
+      </p:ext>
+    </p:extLst>
+  </p:cSld>
+  <p:clrMapOvr>
+    <a:masterClrMapping/>
+  </p:clrMapOvr>
+</p:notes>
+</file>
+
+<file path=ppt/notesSlides/notesSlide13.xml><?xml version="1.0" encoding="utf-8"?>
+<p:notes xmlns:a="http://schemas.openxmlformats.org/drawingml/2006/main" xmlns:r="http://schemas.openxmlformats.org/officeDocument/2006/relationships" xmlns:p="http://schemas.openxmlformats.org/presentationml/2006/main">
+  <p:cSld>
+    <p:spTree>
+      <p:nvGrpSpPr>
+        <p:cNvPr id="1" name=""/>
+        <p:cNvGrpSpPr/>
+        <p:nvPr/>
+      </p:nvGrpSpPr>
+      <p:grpSpPr>
+        <a:xfrm>
+          <a:off x="0" y="0"/>
+          <a:ext cx="0" cy="0"/>
+          <a:chOff x="0" y="0"/>
+          <a:chExt cx="0" cy="0"/>
+        </a:xfrm>
+      </p:grpSpPr>
+      <p:sp>
+        <p:nvSpPr>
+          <p:cNvPr id="2" name="Slide Image Placeholder 1"/>
+          <p:cNvSpPr>
+            <a:spLocks noGrp="1" noRot="1" noChangeAspect="1"/>
+          </p:cNvSpPr>
+          <p:nvPr>
+            <p:ph type="sldImg"/>
+          </p:nvPr>
+        </p:nvSpPr>
+        <p:spPr/>
+      </p:sp>
+      <p:sp>
+        <p:nvSpPr>
+          <p:cNvPr id="3" name="Notes Placeholder 2"/>
+          <p:cNvSpPr>
+            <a:spLocks noGrp="1"/>
+          </p:cNvSpPr>
+          <p:nvPr>
+            <p:ph type="body" idx="1"/>
+          </p:nvPr>
+        </p:nvSpPr>
+        <p:spPr/>
+        <p:txBody>
+          <a:bodyPr/>
+          <a:lstStyle/>
+          <a:p>
+            <a:r>
+              <a:rPr lang="en-US" dirty="0" smtClean="0"/>
+              <a:t>Cameron</a:t>
+            </a:r>
+            <a:endParaRPr lang="en-US" dirty="0"/>
+          </a:p>
+        </p:txBody>
+      </p:sp>
+      <p:sp>
+        <p:nvSpPr>
+          <p:cNvPr id="4" name="Slide Number Placeholder 3"/>
+          <p:cNvSpPr>
+            <a:spLocks noGrp="1"/>
+          </p:cNvSpPr>
+          <p:nvPr>
+            <p:ph type="sldNum" sz="quarter" idx="10"/>
+          </p:nvPr>
+        </p:nvSpPr>
+        <p:spPr/>
+        <p:txBody>
+          <a:bodyPr/>
+          <a:lstStyle/>
+          <a:p>
+            <a:fld id="{0EDD4BF9-4F82-4169-95B0-797E1744D4AD}" type="slidenum">
+              <a:rPr lang="en-US" smtClean="0"/>
+              <a:pPr/>
+              <a:t>13</a:t>
+            </a:fld>
+            <a:endParaRPr lang="en-US"/>
+          </a:p>
+        </p:txBody>
+      </p:sp>
+    </p:spTree>
+    <p:extLst>
+      <p:ext uri="{BB962C8B-B14F-4D97-AF65-F5344CB8AC3E}">
+        <p14:creationId xmlns:p14="http://schemas.microsoft.com/office/powerpoint/2010/main" val="73182233"/>
+      </p:ext>
+    </p:extLst>
+  </p:cSld>
+  <p:clrMapOvr>
+    <a:masterClrMapping/>
+  </p:clrMapOvr>
+</p:notes>
+</file>
+
+<file path=ppt/notesSlides/notesSlide14.xml><?xml version="1.0" encoding="utf-8"?>
+<p:notes xmlns:a="http://schemas.openxmlformats.org/drawingml/2006/main" xmlns:r="http://schemas.openxmlformats.org/officeDocument/2006/relationships" xmlns:p="http://schemas.openxmlformats.org/presentationml/2006/main">
+  <p:cSld>
+    <p:spTree>
+      <p:nvGrpSpPr>
+        <p:cNvPr id="1" name=""/>
+        <p:cNvGrpSpPr/>
+        <p:nvPr/>
+      </p:nvGrpSpPr>
+      <p:grpSpPr>
+        <a:xfrm>
+          <a:off x="0" y="0"/>
+          <a:ext cx="0" cy="0"/>
+          <a:chOff x="0" y="0"/>
+          <a:chExt cx="0" cy="0"/>
+        </a:xfrm>
+      </p:grpSpPr>
+      <p:sp>
+        <p:nvSpPr>
+          <p:cNvPr id="2" name="Slide Image Placeholder 1"/>
+          <p:cNvSpPr>
+            <a:spLocks noGrp="1" noRot="1" noChangeAspect="1"/>
+          </p:cNvSpPr>
+          <p:nvPr>
+            <p:ph type="sldImg"/>
+          </p:nvPr>
+        </p:nvSpPr>
+        <p:spPr/>
+      </p:sp>
+      <p:sp>
+        <p:nvSpPr>
+          <p:cNvPr id="3" name="Notes Placeholder 2"/>
+          <p:cNvSpPr>
+            <a:spLocks noGrp="1"/>
+          </p:cNvSpPr>
+          <p:nvPr>
+            <p:ph type="body" idx="1"/>
+          </p:nvPr>
+        </p:nvSpPr>
+        <p:spPr/>
+        <p:txBody>
+          <a:bodyPr/>
+          <a:lstStyle/>
+          <a:p>
+            <a:r>
+              <a:rPr lang="en-US" dirty="0" smtClean="0"/>
+              <a:t>Robert</a:t>
+            </a:r>
+            <a:endParaRPr lang="en-US" dirty="0"/>
+          </a:p>
+        </p:txBody>
+      </p:sp>
+      <p:sp>
+        <p:nvSpPr>
+          <p:cNvPr id="4" name="Slide Number Placeholder 3"/>
+          <p:cNvSpPr>
+            <a:spLocks noGrp="1"/>
+          </p:cNvSpPr>
+          <p:nvPr>
+            <p:ph type="sldNum" sz="quarter" idx="10"/>
+          </p:nvPr>
+        </p:nvSpPr>
+        <p:spPr/>
+        <p:txBody>
+          <a:bodyPr/>
+          <a:lstStyle/>
+          <a:p>
+            <a:fld id="{0EDD4BF9-4F82-4169-95B0-797E1744D4AD}" type="slidenum">
+              <a:rPr lang="en-US" smtClean="0"/>
+              <a:pPr/>
+              <a:t>14</a:t>
+            </a:fld>
+            <a:endParaRPr lang="en-US"/>
+          </a:p>
+        </p:txBody>
+      </p:sp>
+    </p:spTree>
+    <p:extLst>
+      <p:ext uri="{BB962C8B-B14F-4D97-AF65-F5344CB8AC3E}">
+        <p14:creationId xmlns:p14="http://schemas.microsoft.com/office/powerpoint/2010/main" val="2119718887"/>
+      </p:ext>
+    </p:extLst>
+  </p:cSld>
+  <p:clrMapOvr>
+    <a:masterClrMapping/>
+  </p:clrMapOvr>
+</p:notes>
+</file>
+
+<file path=ppt/notesSlides/notesSlide15.xml><?xml version="1.0" encoding="utf-8"?>
+<p:notes xmlns:a="http://schemas.openxmlformats.org/drawingml/2006/main" xmlns:r="http://schemas.openxmlformats.org/officeDocument/2006/relationships" xmlns:p="http://schemas.openxmlformats.org/presentationml/2006/main">
+  <p:cSld>
+    <p:spTree>
+      <p:nvGrpSpPr>
+        <p:cNvPr id="1" name=""/>
+        <p:cNvGrpSpPr/>
+        <p:nvPr/>
+      </p:nvGrpSpPr>
+      <p:grpSpPr>
+        <a:xfrm>
+          <a:off x="0" y="0"/>
+          <a:ext cx="0" cy="0"/>
+          <a:chOff x="0" y="0"/>
+          <a:chExt cx="0" cy="0"/>
+        </a:xfrm>
+      </p:grpSpPr>
+      <p:sp>
+        <p:nvSpPr>
+          <p:cNvPr id="2" name="Slide Image Placeholder 1"/>
+          <p:cNvSpPr>
+            <a:spLocks noGrp="1" noRot="1" noChangeAspect="1"/>
+          </p:cNvSpPr>
+          <p:nvPr>
+            <p:ph type="sldImg"/>
+          </p:nvPr>
+        </p:nvSpPr>
+        <p:spPr/>
+      </p:sp>
+      <p:sp>
+        <p:nvSpPr>
+          <p:cNvPr id="3" name="Notes Placeholder 2"/>
+          <p:cNvSpPr>
+            <a:spLocks noGrp="1"/>
+          </p:cNvSpPr>
+          <p:nvPr>
+            <p:ph type="body" idx="1"/>
+          </p:nvPr>
+        </p:nvSpPr>
+        <p:spPr/>
+        <p:txBody>
+          <a:bodyPr/>
+          <a:lstStyle/>
+          <a:p>
+            <a:r>
+              <a:rPr lang="en-US" dirty="0" smtClean="0"/>
+              <a:t>Robert</a:t>
+            </a:r>
+          </a:p>
+        </p:txBody>
+      </p:sp>
+      <p:sp>
+        <p:nvSpPr>
+          <p:cNvPr id="4" name="Slide Number Placeholder 3"/>
+          <p:cNvSpPr>
+            <a:spLocks noGrp="1"/>
+          </p:cNvSpPr>
+          <p:nvPr>
+            <p:ph type="sldNum" sz="quarter" idx="10"/>
+          </p:nvPr>
+        </p:nvSpPr>
+        <p:spPr/>
+        <p:txBody>
+          <a:bodyPr/>
+          <a:lstStyle/>
+          <a:p>
+            <a:fld id="{0EDD4BF9-4F82-4169-95B0-797E1744D4AD}" type="slidenum">
+              <a:rPr lang="en-US" smtClean="0"/>
+              <a:pPr/>
+              <a:t>15</a:t>
+            </a:fld>
+            <a:endParaRPr lang="en-US"/>
+          </a:p>
+        </p:txBody>
+      </p:sp>
+    </p:spTree>
+    <p:extLst>
+      <p:ext uri="{BB962C8B-B14F-4D97-AF65-F5344CB8AC3E}">
+        <p14:creationId xmlns:p14="http://schemas.microsoft.com/office/powerpoint/2010/main" val="1617949763"/>
+      </p:ext>
+    </p:extLst>
+  </p:cSld>
+  <p:clrMapOvr>
+    <a:masterClrMapping/>
+  </p:clrMapOvr>
+</p:notes>
+</file>
+
+<file path=ppt/notesSlides/notesSlide16.xml><?xml version="1.0" encoding="utf-8"?>
+<p:notes xmlns:a="http://schemas.openxmlformats.org/drawingml/2006/main" xmlns:r="http://schemas.openxmlformats.org/officeDocument/2006/relationships" xmlns:p="http://schemas.openxmlformats.org/presentationml/2006/main">
+  <p:cSld>
+    <p:spTree>
+      <p:nvGrpSpPr>
+        <p:cNvPr id="1" name=""/>
+        <p:cNvGrpSpPr/>
+        <p:nvPr/>
+      </p:nvGrpSpPr>
+      <p:grpSpPr>
+        <a:xfrm>
+          <a:off x="0" y="0"/>
+          <a:ext cx="0" cy="0"/>
+          <a:chOff x="0" y="0"/>
+          <a:chExt cx="0" cy="0"/>
+        </a:xfrm>
+      </p:grpSpPr>
+      <p:sp>
+        <p:nvSpPr>
+          <p:cNvPr id="2" name="Slide Image Placeholder 1"/>
+          <p:cNvSpPr>
+            <a:spLocks noGrp="1" noRot="1" noChangeAspect="1"/>
+          </p:cNvSpPr>
+          <p:nvPr>
+            <p:ph type="sldImg"/>
+          </p:nvPr>
+        </p:nvSpPr>
+        <p:spPr/>
+      </p:sp>
+      <p:sp>
+        <p:nvSpPr>
+          <p:cNvPr id="3" name="Notes Placeholder 2"/>
+          <p:cNvSpPr>
+            <a:spLocks noGrp="1"/>
+          </p:cNvSpPr>
+          <p:nvPr>
+            <p:ph type="body" idx="1"/>
+          </p:nvPr>
+        </p:nvSpPr>
+        <p:spPr/>
+        <p:txBody>
+          <a:bodyPr/>
+          <a:lstStyle/>
+          <a:p>
+            <a:r>
+              <a:rPr lang="en-US" dirty="0" smtClean="0"/>
+              <a:t>Robert</a:t>
+            </a:r>
+            <a:endParaRPr lang="en-US" dirty="0"/>
+          </a:p>
+        </p:txBody>
+      </p:sp>
+      <p:sp>
+        <p:nvSpPr>
+          <p:cNvPr id="4" name="Slide Number Placeholder 3"/>
+          <p:cNvSpPr>
+            <a:spLocks noGrp="1"/>
+          </p:cNvSpPr>
+          <p:nvPr>
+            <p:ph type="sldNum" sz="quarter" idx="10"/>
+          </p:nvPr>
+        </p:nvSpPr>
+        <p:spPr/>
+        <p:txBody>
+          <a:bodyPr/>
+          <a:lstStyle/>
+          <a:p>
+            <a:fld id="{0EDD4BF9-4F82-4169-95B0-797E1744D4AD}" type="slidenum">
+              <a:rPr lang="en-US" smtClean="0"/>
+              <a:pPr/>
+              <a:t>16</a:t>
+            </a:fld>
+            <a:endParaRPr lang="en-US"/>
+          </a:p>
+        </p:txBody>
+      </p:sp>
+    </p:spTree>
+    <p:extLst>
+      <p:ext uri="{BB962C8B-B14F-4D97-AF65-F5344CB8AC3E}">
+        <p14:creationId xmlns:p14="http://schemas.microsoft.com/office/powerpoint/2010/main" val="1531711225"/>
+      </p:ext>
+    </p:extLst>
+  </p:cSld>
+  <p:clrMapOvr>
+    <a:masterClrMapping/>
+  </p:clrMapOvr>
+</p:notes>
+</file>
+
+<file path=ppt/notesSlides/notesSlide2.xml><?xml version="1.0" encoding="utf-8"?>
+<p:notes xmlns:a="http://schemas.openxmlformats.org/drawingml/2006/main" xmlns:r="http://schemas.openxmlformats.org/officeDocument/2006/relationships" xmlns:p="http://schemas.openxmlformats.org/presentationml/2006/main">
+  <p:cSld>
+    <p:spTree>
+      <p:nvGrpSpPr>
+        <p:cNvPr id="1" name=""/>
+        <p:cNvGrpSpPr/>
+        <p:nvPr/>
+      </p:nvGrpSpPr>
+      <p:grpSpPr>
+        <a:xfrm>
+          <a:off x="0" y="0"/>
+          <a:ext cx="0" cy="0"/>
+          <a:chOff x="0" y="0"/>
+          <a:chExt cx="0" cy="0"/>
+        </a:xfrm>
+      </p:grpSpPr>
+      <p:sp>
+        <p:nvSpPr>
+          <p:cNvPr id="2" name="Slide Image Placeholder 1"/>
+          <p:cNvSpPr>
+            <a:spLocks noGrp="1" noRot="1" noChangeAspect="1"/>
+          </p:cNvSpPr>
+          <p:nvPr>
+            <p:ph type="sldImg"/>
+          </p:nvPr>
+        </p:nvSpPr>
+        <p:spPr/>
+      </p:sp>
+      <p:sp>
+        <p:nvSpPr>
+          <p:cNvPr id="3" name="Notes Placeholder 2"/>
+          <p:cNvSpPr>
+            <a:spLocks noGrp="1"/>
+          </p:cNvSpPr>
+          <p:nvPr>
+            <p:ph type="body" idx="1"/>
+          </p:nvPr>
+        </p:nvSpPr>
+        <p:spPr/>
+        <p:txBody>
+          <a:bodyPr/>
+          <a:lstStyle/>
+          <a:p>
+            <a:r>
+              <a:rPr lang="en-US" dirty="0" smtClean="0"/>
+              <a:t>Cameron</a:t>
+            </a:r>
+            <a:endParaRPr lang="en-US" dirty="0"/>
+          </a:p>
+        </p:txBody>
+      </p:sp>
+      <p:sp>
+        <p:nvSpPr>
+          <p:cNvPr id="4" name="Slide Number Placeholder 3"/>
+          <p:cNvSpPr>
+            <a:spLocks noGrp="1"/>
+          </p:cNvSpPr>
+          <p:nvPr>
+            <p:ph type="sldNum" sz="quarter" idx="10"/>
+          </p:nvPr>
+        </p:nvSpPr>
+        <p:spPr/>
+        <p:txBody>
+          <a:bodyPr/>
+          <a:lstStyle/>
+          <a:p>
+            <a:fld id="{0EDD4BF9-4F82-4169-95B0-797E1744D4AD}" type="slidenum">
+              <a:rPr lang="en-US" smtClean="0"/>
+              <a:pPr/>
+              <a:t>2</a:t>
+            </a:fld>
+            <a:endParaRPr lang="en-US"/>
+          </a:p>
+        </p:txBody>
+      </p:sp>
+    </p:spTree>
+    <p:extLst>
+      <p:ext uri="{BB962C8B-B14F-4D97-AF65-F5344CB8AC3E}">
+        <p14:creationId xmlns:p14="http://schemas.microsoft.com/office/powerpoint/2010/main" val="542395767"/>
+      </p:ext>
+    </p:extLst>
+  </p:cSld>
+  <p:clrMapOvr>
+    <a:masterClrMapping/>
+  </p:clrMapOvr>
+</p:notes>
+</file>
+
+<file path=ppt/notesSlides/notesSlide3.xml><?xml version="1.0" encoding="utf-8"?>
+<p:notes xmlns:a="http://schemas.openxmlformats.org/drawingml/2006/main" xmlns:r="http://schemas.openxmlformats.org/officeDocument/2006/relationships" xmlns:p="http://schemas.openxmlformats.org/presentationml/2006/main">
+  <p:cSld>
+    <p:spTree>
+      <p:nvGrpSpPr>
+        <p:cNvPr id="1" name=""/>
+        <p:cNvGrpSpPr/>
+        <p:nvPr/>
+      </p:nvGrpSpPr>
+      <p:grpSpPr>
+        <a:xfrm>
+          <a:off x="0" y="0"/>
+          <a:ext cx="0" cy="0"/>
+          <a:chOff x="0" y="0"/>
+          <a:chExt cx="0" cy="0"/>
+        </a:xfrm>
+      </p:grpSpPr>
+      <p:sp>
+        <p:nvSpPr>
+          <p:cNvPr id="2" name="Slide Image Placeholder 1"/>
+          <p:cNvSpPr>
+            <a:spLocks noGrp="1" noRot="1" noChangeAspect="1"/>
+          </p:cNvSpPr>
+          <p:nvPr>
+            <p:ph type="sldImg"/>
+          </p:nvPr>
+        </p:nvSpPr>
+        <p:spPr/>
+      </p:sp>
+      <p:sp>
+        <p:nvSpPr>
+          <p:cNvPr id="3" name="Notes Placeholder 2"/>
+          <p:cNvSpPr>
+            <a:spLocks noGrp="1"/>
+          </p:cNvSpPr>
+          <p:nvPr>
+            <p:ph type="body" idx="1"/>
+          </p:nvPr>
+        </p:nvSpPr>
+        <p:spPr/>
+        <p:txBody>
+          <a:bodyPr/>
+          <a:lstStyle/>
+          <a:p>
+            <a:r>
+              <a:rPr lang="en-US" dirty="0" smtClean="0"/>
+              <a:t>Cameron</a:t>
+            </a:r>
+            <a:endParaRPr lang="en-US" dirty="0"/>
+          </a:p>
+        </p:txBody>
+      </p:sp>
+      <p:sp>
+        <p:nvSpPr>
+          <p:cNvPr id="4" name="Slide Number Placeholder 3"/>
+          <p:cNvSpPr>
+            <a:spLocks noGrp="1"/>
+          </p:cNvSpPr>
+          <p:nvPr>
+            <p:ph type="sldNum" sz="quarter" idx="10"/>
+          </p:nvPr>
+        </p:nvSpPr>
+        <p:spPr/>
+        <p:txBody>
+          <a:bodyPr/>
+          <a:lstStyle/>
+          <a:p>
+            <a:fld id="{0EDD4BF9-4F82-4169-95B0-797E1744D4AD}" type="slidenum">
+              <a:rPr lang="en-US" smtClean="0"/>
+              <a:pPr/>
+              <a:t>3</a:t>
+            </a:fld>
+            <a:endParaRPr lang="en-US"/>
+          </a:p>
+        </p:txBody>
+      </p:sp>
+    </p:spTree>
+    <p:extLst>
+      <p:ext uri="{BB962C8B-B14F-4D97-AF65-F5344CB8AC3E}">
+        <p14:creationId xmlns:p14="http://schemas.microsoft.com/office/powerpoint/2010/main" val="2490603488"/>
+      </p:ext>
+    </p:extLst>
+  </p:cSld>
+  <p:clrMapOvr>
+    <a:masterClrMapping/>
+  </p:clrMapOvr>
+</p:notes>
+</file>
+
+<file path=ppt/notesSlides/notesSlide4.xml><?xml version="1.0" encoding="utf-8"?>
+<p:notes xmlns:a="http://schemas.openxmlformats.org/drawingml/2006/main" xmlns:r="http://schemas.openxmlformats.org/officeDocument/2006/relationships" xmlns:p="http://schemas.openxmlformats.org/presentationml/2006/main">
+  <p:cSld>
+    <p:spTree>
+      <p:nvGrpSpPr>
+        <p:cNvPr id="1" name=""/>
+        <p:cNvGrpSpPr/>
+        <p:nvPr/>
+      </p:nvGrpSpPr>
+      <p:grpSpPr>
+        <a:xfrm>
+          <a:off x="0" y="0"/>
+          <a:ext cx="0" cy="0"/>
+          <a:chOff x="0" y="0"/>
+          <a:chExt cx="0" cy="0"/>
+        </a:xfrm>
+      </p:grpSpPr>
+      <p:sp>
+        <p:nvSpPr>
+          <p:cNvPr id="2" name="Slide Image Placeholder 1"/>
+          <p:cNvSpPr>
+            <a:spLocks noGrp="1" noRot="1" noChangeAspect="1"/>
+          </p:cNvSpPr>
+          <p:nvPr>
+            <p:ph type="sldImg"/>
+          </p:nvPr>
+        </p:nvSpPr>
+        <p:spPr/>
+      </p:sp>
+      <p:sp>
+        <p:nvSpPr>
+          <p:cNvPr id="3" name="Notes Placeholder 2"/>
+          <p:cNvSpPr>
+            <a:spLocks noGrp="1"/>
+          </p:cNvSpPr>
+          <p:nvPr>
+            <p:ph type="body" idx="1"/>
+          </p:nvPr>
+        </p:nvSpPr>
+        <p:spPr/>
+        <p:txBody>
+          <a:bodyPr/>
+          <a:lstStyle/>
+          <a:p>
+            <a:r>
+              <a:rPr lang="en-US" dirty="0" smtClean="0"/>
+              <a:t>Cameron</a:t>
+            </a:r>
+            <a:endParaRPr lang="en-US" dirty="0"/>
+          </a:p>
+        </p:txBody>
+      </p:sp>
+      <p:sp>
+        <p:nvSpPr>
+          <p:cNvPr id="4" name="Slide Number Placeholder 3"/>
+          <p:cNvSpPr>
+            <a:spLocks noGrp="1"/>
+          </p:cNvSpPr>
+          <p:nvPr>
+            <p:ph type="sldNum" sz="quarter" idx="10"/>
+          </p:nvPr>
+        </p:nvSpPr>
+        <p:spPr/>
+        <p:txBody>
+          <a:bodyPr/>
+          <a:lstStyle/>
+          <a:p>
+            <a:fld id="{0EDD4BF9-4F82-4169-95B0-797E1744D4AD}" type="slidenum">
+              <a:rPr lang="en-US" smtClean="0"/>
+              <a:pPr/>
+              <a:t>4</a:t>
+            </a:fld>
+            <a:endParaRPr lang="en-US"/>
+          </a:p>
+        </p:txBody>
+      </p:sp>
+    </p:spTree>
+    <p:extLst>
+      <p:ext uri="{BB962C8B-B14F-4D97-AF65-F5344CB8AC3E}">
+        <p14:creationId xmlns:p14="http://schemas.microsoft.com/office/powerpoint/2010/main" val="1951136713"/>
+      </p:ext>
+    </p:extLst>
+  </p:cSld>
+  <p:clrMapOvr>
+    <a:masterClrMapping/>
+  </p:clrMapOvr>
+</p:notes>
+</file>
+
+<file path=ppt/notesSlides/notesSlide5.xml><?xml version="1.0" encoding="utf-8"?>
+<p:notes xmlns:a="http://schemas.openxmlformats.org/drawingml/2006/main" xmlns:r="http://schemas.openxmlformats.org/officeDocument/2006/relationships" xmlns:p="http://schemas.openxmlformats.org/presentationml/2006/main">
+  <p:cSld>
+    <p:spTree>
+      <p:nvGrpSpPr>
+        <p:cNvPr id="1" name=""/>
+        <p:cNvGrpSpPr/>
+        <p:nvPr/>
+      </p:nvGrpSpPr>
+      <p:grpSpPr>
+        <a:xfrm>
+          <a:off x="0" y="0"/>
+          <a:ext cx="0" cy="0"/>
+          <a:chOff x="0" y="0"/>
+          <a:chExt cx="0" cy="0"/>
+        </a:xfrm>
+      </p:grpSpPr>
+      <p:sp>
+        <p:nvSpPr>
+          <p:cNvPr id="2" name="Slide Image Placeholder 1"/>
+          <p:cNvSpPr>
+            <a:spLocks noGrp="1" noRot="1" noChangeAspect="1"/>
+          </p:cNvSpPr>
+          <p:nvPr>
+            <p:ph type="sldImg"/>
+          </p:nvPr>
+        </p:nvSpPr>
+        <p:spPr/>
+      </p:sp>
+      <p:sp>
+        <p:nvSpPr>
+          <p:cNvPr id="3" name="Notes Placeholder 2"/>
+          <p:cNvSpPr>
+            <a:spLocks noGrp="1"/>
+          </p:cNvSpPr>
+          <p:nvPr>
+            <p:ph type="body" idx="1"/>
+          </p:nvPr>
+        </p:nvSpPr>
+        <p:spPr/>
+        <p:txBody>
+          <a:bodyPr/>
+          <a:lstStyle/>
+          <a:p>
+            <a:r>
+              <a:rPr lang="en-US" dirty="0" smtClean="0"/>
+              <a:t>Cameron</a:t>
+            </a:r>
+            <a:endParaRPr lang="en-US" dirty="0"/>
+          </a:p>
+        </p:txBody>
+      </p:sp>
+      <p:sp>
+        <p:nvSpPr>
+          <p:cNvPr id="4" name="Slide Number Placeholder 3"/>
+          <p:cNvSpPr>
+            <a:spLocks noGrp="1"/>
+          </p:cNvSpPr>
+          <p:nvPr>
+            <p:ph type="sldNum" sz="quarter" idx="10"/>
+          </p:nvPr>
+        </p:nvSpPr>
+        <p:spPr/>
+        <p:txBody>
+          <a:bodyPr/>
+          <a:lstStyle/>
+          <a:p>
+            <a:fld id="{0EDD4BF9-4F82-4169-95B0-797E1744D4AD}" type="slidenum">
+              <a:rPr lang="en-US" smtClean="0"/>
+              <a:pPr/>
+              <a:t>5</a:t>
+            </a:fld>
+            <a:endParaRPr lang="en-US"/>
+          </a:p>
+        </p:txBody>
+      </p:sp>
+    </p:spTree>
+    <p:extLst>
+      <p:ext uri="{BB962C8B-B14F-4D97-AF65-F5344CB8AC3E}">
+        <p14:creationId xmlns:p14="http://schemas.microsoft.com/office/powerpoint/2010/main" val="2403803003"/>
+      </p:ext>
+    </p:extLst>
+  </p:cSld>
+  <p:clrMapOvr>
+    <a:masterClrMapping/>
+  </p:clrMapOvr>
+</p:notes>
+</file>
+
+<file path=ppt/notesSlides/notesSlide6.xml><?xml version="1.0" encoding="utf-8"?>
+<p:notes xmlns:a="http://schemas.openxmlformats.org/drawingml/2006/main" xmlns:r="http://schemas.openxmlformats.org/officeDocument/2006/relationships" xmlns:p="http://schemas.openxmlformats.org/presentationml/2006/main">
+  <p:cSld>
+    <p:spTree>
+      <p:nvGrpSpPr>
+        <p:cNvPr id="1" name=""/>
+        <p:cNvGrpSpPr/>
+        <p:nvPr/>
+      </p:nvGrpSpPr>
+      <p:grpSpPr>
+        <a:xfrm>
+          <a:off x="0" y="0"/>
+          <a:ext cx="0" cy="0"/>
+          <a:chOff x="0" y="0"/>
+          <a:chExt cx="0" cy="0"/>
+        </a:xfrm>
+      </p:grpSpPr>
+      <p:sp>
+        <p:nvSpPr>
+          <p:cNvPr id="2" name="Slide Image Placeholder 1"/>
+          <p:cNvSpPr>
+            <a:spLocks noGrp="1" noRot="1" noChangeAspect="1"/>
+          </p:cNvSpPr>
+          <p:nvPr>
+            <p:ph type="sldImg"/>
+          </p:nvPr>
+        </p:nvSpPr>
+        <p:spPr/>
+      </p:sp>
+      <p:sp>
+        <p:nvSpPr>
+          <p:cNvPr id="3" name="Notes Placeholder 2"/>
+          <p:cNvSpPr>
+            <a:spLocks noGrp="1"/>
+          </p:cNvSpPr>
+          <p:nvPr>
+            <p:ph type="body" idx="1"/>
+          </p:nvPr>
+        </p:nvSpPr>
+        <p:spPr/>
+        <p:txBody>
+          <a:bodyPr/>
+          <a:lstStyle/>
+          <a:p>
+            <a:r>
+              <a:rPr lang="en-US" dirty="0" smtClean="0"/>
+              <a:t>Cameron</a:t>
+            </a:r>
+            <a:endParaRPr lang="en-US" dirty="0"/>
+          </a:p>
+        </p:txBody>
+      </p:sp>
+      <p:sp>
+        <p:nvSpPr>
+          <p:cNvPr id="4" name="Slide Number Placeholder 3"/>
+          <p:cNvSpPr>
+            <a:spLocks noGrp="1"/>
+          </p:cNvSpPr>
+          <p:nvPr>
+            <p:ph type="sldNum" sz="quarter" idx="10"/>
+          </p:nvPr>
+        </p:nvSpPr>
+        <p:spPr/>
+        <p:txBody>
+          <a:bodyPr/>
+          <a:lstStyle/>
+          <a:p>
+            <a:fld id="{0EDD4BF9-4F82-4169-95B0-797E1744D4AD}" type="slidenum">
+              <a:rPr lang="en-US" smtClean="0"/>
+              <a:pPr/>
+              <a:t>6</a:t>
+            </a:fld>
+            <a:endParaRPr lang="en-US"/>
+          </a:p>
+        </p:txBody>
+      </p:sp>
+    </p:spTree>
+    <p:extLst>
+      <p:ext uri="{BB962C8B-B14F-4D97-AF65-F5344CB8AC3E}">
+        <p14:creationId xmlns:p14="http://schemas.microsoft.com/office/powerpoint/2010/main" val="2531089687"/>
+      </p:ext>
+    </p:extLst>
+  </p:cSld>
+  <p:clrMapOvr>
+    <a:masterClrMapping/>
+  </p:clrMapOvr>
+</p:notes>
+</file>
+
+<file path=ppt/notesSlides/notesSlide7.xml><?xml version="1.0" encoding="utf-8"?>
+<p:notes xmlns:a="http://schemas.openxmlformats.org/drawingml/2006/main" xmlns:r="http://schemas.openxmlformats.org/officeDocument/2006/relationships" xmlns:p="http://schemas.openxmlformats.org/presentationml/2006/main">
+  <p:cSld>
+    <p:spTree>
+      <p:nvGrpSpPr>
+        <p:cNvPr id="1" name=""/>
+        <p:cNvGrpSpPr/>
+        <p:nvPr/>
+      </p:nvGrpSpPr>
+      <p:grpSpPr>
+        <a:xfrm>
+          <a:off x="0" y="0"/>
+          <a:ext cx="0" cy="0"/>
+          <a:chOff x="0" y="0"/>
+          <a:chExt cx="0" cy="0"/>
+        </a:xfrm>
+      </p:grpSpPr>
+      <p:sp>
+        <p:nvSpPr>
+          <p:cNvPr id="2" name="Slide Image Placeholder 1"/>
+          <p:cNvSpPr>
+            <a:spLocks noGrp="1" noRot="1" noChangeAspect="1"/>
+          </p:cNvSpPr>
+          <p:nvPr>
+            <p:ph type="sldImg"/>
+          </p:nvPr>
+        </p:nvSpPr>
+        <p:spPr/>
+      </p:sp>
+      <p:sp>
+        <p:nvSpPr>
+          <p:cNvPr id="3" name="Notes Placeholder 2"/>
+          <p:cNvSpPr>
+            <a:spLocks noGrp="1"/>
+          </p:cNvSpPr>
+          <p:nvPr>
+            <p:ph type="body" idx="1"/>
+          </p:nvPr>
+        </p:nvSpPr>
+        <p:spPr/>
+        <p:txBody>
+          <a:bodyPr/>
+          <a:lstStyle/>
+          <a:p>
+            <a:r>
+              <a:rPr lang="en-US" dirty="0" smtClean="0"/>
+              <a:t>Cameron</a:t>
+            </a:r>
+            <a:endParaRPr lang="en-US" dirty="0"/>
+          </a:p>
+        </p:txBody>
+      </p:sp>
+      <p:sp>
+        <p:nvSpPr>
+          <p:cNvPr id="4" name="Slide Number Placeholder 3"/>
+          <p:cNvSpPr>
+            <a:spLocks noGrp="1"/>
+          </p:cNvSpPr>
+          <p:nvPr>
+            <p:ph type="sldNum" sz="quarter" idx="10"/>
+          </p:nvPr>
+        </p:nvSpPr>
+        <p:spPr/>
+        <p:txBody>
+          <a:bodyPr/>
+          <a:lstStyle/>
+          <a:p>
+            <a:fld id="{0EDD4BF9-4F82-4169-95B0-797E1744D4AD}" type="slidenum">
+              <a:rPr lang="en-US" smtClean="0"/>
+              <a:pPr/>
+              <a:t>7</a:t>
+            </a:fld>
+            <a:endParaRPr lang="en-US"/>
+          </a:p>
+        </p:txBody>
+      </p:sp>
+    </p:spTree>
+    <p:extLst>
+      <p:ext uri="{BB962C8B-B14F-4D97-AF65-F5344CB8AC3E}">
+        <p14:creationId xmlns:p14="http://schemas.microsoft.com/office/powerpoint/2010/main" val="1033729967"/>
+      </p:ext>
+    </p:extLst>
+  </p:cSld>
+  <p:clrMapOvr>
+    <a:masterClrMapping/>
+  </p:clrMapOvr>
+</p:notes>
+</file>
+
+<file path=ppt/notesSlides/notesSlide8.xml><?xml version="1.0" encoding="utf-8"?>
+<p:notes xmlns:a="http://schemas.openxmlformats.org/drawingml/2006/main" xmlns:r="http://schemas.openxmlformats.org/officeDocument/2006/relationships" xmlns:p="http://schemas.openxmlformats.org/presentationml/2006/main">
+  <p:cSld>
+    <p:spTree>
+      <p:nvGrpSpPr>
+        <p:cNvPr id="1" name=""/>
+        <p:cNvGrpSpPr/>
+        <p:nvPr/>
+      </p:nvGrpSpPr>
+      <p:grpSpPr>
+        <a:xfrm>
+          <a:off x="0" y="0"/>
+          <a:ext cx="0" cy="0"/>
+          <a:chOff x="0" y="0"/>
+          <a:chExt cx="0" cy="0"/>
+        </a:xfrm>
+      </p:grpSpPr>
+      <p:sp>
+        <p:nvSpPr>
+          <p:cNvPr id="2" name="Slide Image Placeholder 1"/>
+          <p:cNvSpPr>
+            <a:spLocks noGrp="1" noRot="1" noChangeAspect="1"/>
+          </p:cNvSpPr>
+          <p:nvPr>
+            <p:ph type="sldImg"/>
+          </p:nvPr>
+        </p:nvSpPr>
+        <p:spPr/>
+      </p:sp>
+      <p:sp>
+        <p:nvSpPr>
+          <p:cNvPr id="3" name="Notes Placeholder 2"/>
+          <p:cNvSpPr>
+            <a:spLocks noGrp="1"/>
+          </p:cNvSpPr>
+          <p:nvPr>
+            <p:ph type="body" idx="1"/>
+          </p:nvPr>
+        </p:nvSpPr>
+        <p:spPr/>
+        <p:txBody>
+          <a:bodyPr/>
+          <a:lstStyle/>
+          <a:p>
+            <a:r>
+              <a:rPr lang="en-US" dirty="0" smtClean="0"/>
+              <a:t>Robert</a:t>
+            </a:r>
+            <a:endParaRPr lang="en-US" dirty="0"/>
+          </a:p>
+        </p:txBody>
+      </p:sp>
+      <p:sp>
+        <p:nvSpPr>
+          <p:cNvPr id="4" name="Slide Number Placeholder 3"/>
+          <p:cNvSpPr>
+            <a:spLocks noGrp="1"/>
+          </p:cNvSpPr>
+          <p:nvPr>
+            <p:ph type="sldNum" sz="quarter" idx="10"/>
+          </p:nvPr>
+        </p:nvSpPr>
+        <p:spPr/>
+        <p:txBody>
+          <a:bodyPr/>
+          <a:lstStyle/>
+          <a:p>
+            <a:fld id="{0EDD4BF9-4F82-4169-95B0-797E1744D4AD}" type="slidenum">
+              <a:rPr lang="en-US" smtClean="0"/>
+              <a:pPr/>
+              <a:t>8</a:t>
+            </a:fld>
+            <a:endParaRPr lang="en-US"/>
+          </a:p>
+        </p:txBody>
+      </p:sp>
+    </p:spTree>
+    <p:extLst>
+      <p:ext uri="{BB962C8B-B14F-4D97-AF65-F5344CB8AC3E}">
+        <p14:creationId xmlns:p14="http://schemas.microsoft.com/office/powerpoint/2010/main" val="2599156660"/>
+      </p:ext>
+    </p:extLst>
+  </p:cSld>
+  <p:clrMapOvr>
+    <a:masterClrMapping/>
+  </p:clrMapOvr>
+</p:notes>
+</file>
+
+<file path=ppt/notesSlides/notesSlide9.xml><?xml version="1.0" encoding="utf-8"?>
+<p:notes xmlns:a="http://schemas.openxmlformats.org/drawingml/2006/main" xmlns:r="http://schemas.openxmlformats.org/officeDocument/2006/relationships" xmlns:p="http://schemas.openxmlformats.org/presentationml/2006/main">
+  <p:cSld>
+    <p:spTree>
+      <p:nvGrpSpPr>
+        <p:cNvPr id="1" name=""/>
+        <p:cNvGrpSpPr/>
+        <p:nvPr/>
+      </p:nvGrpSpPr>
+      <p:grpSpPr>
+        <a:xfrm>
+          <a:off x="0" y="0"/>
+          <a:ext cx="0" cy="0"/>
+          <a:chOff x="0" y="0"/>
+          <a:chExt cx="0" cy="0"/>
+        </a:xfrm>
+      </p:grpSpPr>
+      <p:sp>
+        <p:nvSpPr>
+          <p:cNvPr id="2" name="Slide Image Placeholder 1"/>
+          <p:cNvSpPr>
+            <a:spLocks noGrp="1" noRot="1" noChangeAspect="1"/>
+          </p:cNvSpPr>
+          <p:nvPr>
+            <p:ph type="sldImg"/>
+          </p:nvPr>
+        </p:nvSpPr>
+        <p:spPr/>
+      </p:sp>
+      <p:sp>
+        <p:nvSpPr>
+          <p:cNvPr id="3" name="Notes Placeholder 2"/>
+          <p:cNvSpPr>
+            <a:spLocks noGrp="1"/>
+          </p:cNvSpPr>
+          <p:nvPr>
+            <p:ph type="body" idx="1"/>
+          </p:nvPr>
+        </p:nvSpPr>
+        <p:spPr/>
+        <p:txBody>
+          <a:bodyPr/>
+          <a:lstStyle/>
+          <a:p>
+            <a:r>
+              <a:rPr lang="en-US" dirty="0" smtClean="0"/>
+              <a:t>Robert</a:t>
+            </a:r>
+            <a:endParaRPr lang="en-US" dirty="0"/>
+          </a:p>
+        </p:txBody>
+      </p:sp>
+      <p:sp>
+        <p:nvSpPr>
+          <p:cNvPr id="4" name="Slide Number Placeholder 3"/>
+          <p:cNvSpPr>
+            <a:spLocks noGrp="1"/>
+          </p:cNvSpPr>
+          <p:nvPr>
+            <p:ph type="sldNum" sz="quarter" idx="10"/>
+          </p:nvPr>
+        </p:nvSpPr>
+        <p:spPr/>
+        <p:txBody>
+          <a:bodyPr/>
+          <a:lstStyle/>
+          <a:p>
+            <a:fld id="{0EDD4BF9-4F82-4169-95B0-797E1744D4AD}" type="slidenum">
+              <a:rPr lang="en-US" smtClean="0"/>
+              <a:pPr/>
+              <a:t>9</a:t>
+            </a:fld>
+            <a:endParaRPr lang="en-US"/>
+          </a:p>
+        </p:txBody>
+      </p:sp>
+    </p:spTree>
+    <p:extLst>
+      <p:ext uri="{BB962C8B-B14F-4D97-AF65-F5344CB8AC3E}">
+        <p14:creationId xmlns:p14="http://schemas.microsoft.com/office/powerpoint/2010/main" val="3559523673"/>
+      </p:ext>
+    </p:extLst>
+  </p:cSld>
+  <p:clrMapOvr>
+    <a:masterClrMapping/>
+  </p:clrMapOvr>
+</p:notes>
 </file>
 
 <file path=ppt/slideLayouts/slideLayout1.xml><?xml version="1.0" encoding="utf-8"?>
@@ -3520,253 +4943,208 @@
           <a:lstStyle/>
           <a:p>
             <a:r>
-              <a:rPr lang="en-US" dirty="0" err="1" smtClean="0"/>
-              <a:t>Tskdmp</a:t>
-            </a:r>
+              <a:rPr lang="en-US" dirty="0"/>
+              <a:t>Tskdmp Interface</a:t>
+            </a:r>
+          </a:p>
+        </p:txBody>
+      </p:sp>
+      <p:sp>
+        <p:nvSpPr>
+          <p:cNvPr id="3" name="Content Placeholder 2"/>
+          <p:cNvSpPr>
+            <a:spLocks noGrp="1"/>
+          </p:cNvSpPr>
+          <p:nvPr>
+            <p:ph sz="half" idx="1"/>
+          </p:nvPr>
+        </p:nvSpPr>
+        <p:spPr/>
+        <p:txBody>
+          <a:bodyPr>
+            <a:normAutofit fontScale="70000" lnSpcReduction="20000"/>
+          </a:bodyPr>
+          <a:lstStyle/>
+          <a:p>
+            <a:r>
+              <a:rPr lang="en-US" dirty="0"/>
+              <a:t>Initiates all snapshot operations</a:t>
+            </a:r>
+          </a:p>
+          <a:p>
+            <a:r>
+              <a:rPr lang="en-US" dirty="0"/>
+              <a:t>Communicates through </a:t>
+            </a:r>
+            <a:r>
+              <a:rPr lang="en-US" dirty="0" err="1"/>
+              <a:t>sysfs</a:t>
+            </a:r>
+            <a:r>
+              <a:rPr lang="en-US" dirty="0"/>
+              <a:t>: </a:t>
+            </a:r>
+            <a:r>
+              <a:rPr lang="en-US" sz="2200" dirty="0"/>
+              <a:t>/sys/kernel/</a:t>
+            </a:r>
+            <a:r>
+              <a:rPr lang="en-US" sz="2200" dirty="0" err="1"/>
+              <a:t>linux_inspect</a:t>
+            </a:r>
+            <a:r>
+              <a:rPr lang="en-US" sz="2200" dirty="0"/>
+              <a:t>/operation</a:t>
+            </a:r>
+          </a:p>
+          <a:p>
+            <a:r>
+              <a:rPr lang="en-US" dirty="0"/>
+              <a:t>Performs snapshots on processes memory content</a:t>
+            </a:r>
+          </a:p>
+          <a:p>
+            <a:pPr lvl="1"/>
+            <a:r>
+              <a:rPr lang="en-US" dirty="0"/>
+              <a:t>/proc/</a:t>
+            </a:r>
+            <a:r>
+              <a:rPr lang="en-US" dirty="0" err="1"/>
+              <a:t>pid</a:t>
+            </a:r>
+            <a:r>
+              <a:rPr lang="en-US" dirty="0"/>
+              <a:t>/mem</a:t>
+            </a:r>
+          </a:p>
+          <a:p>
+            <a:pPr lvl="1"/>
+            <a:r>
+              <a:rPr lang="en-US" dirty="0"/>
+              <a:t>/proc/</a:t>
+            </a:r>
+            <a:r>
+              <a:rPr lang="en-US" dirty="0" err="1"/>
+              <a:t>pid</a:t>
+            </a:r>
+            <a:r>
+              <a:rPr lang="en-US" dirty="0"/>
+              <a:t>/maps</a:t>
+            </a:r>
+          </a:p>
+          <a:p>
+            <a:r>
+              <a:rPr lang="en-US" dirty="0"/>
+              <a:t>Controls elements included within the snapshot</a:t>
+            </a:r>
+          </a:p>
+          <a:p>
+            <a:pPr lvl="1"/>
+            <a:r>
+              <a:rPr lang="en-US" dirty="0"/>
+              <a:t>Task</a:t>
+            </a:r>
+          </a:p>
+          <a:p>
+            <a:pPr lvl="1"/>
+            <a:r>
+              <a:rPr lang="en-US" dirty="0"/>
+              <a:t>Mem</a:t>
+            </a:r>
+          </a:p>
+          <a:p>
             <a:r>
               <a:rPr lang="en-US" dirty="0" smtClean="0"/>
-              <a:t> Interface</a:t>
-            </a:r>
+              <a:t>Snapshots </a:t>
+            </a:r>
+            <a:r>
+              <a:rPr lang="en-US" dirty="0"/>
+              <a:t>support analysis through tools such as Meld</a:t>
+            </a:r>
+          </a:p>
+          <a:p>
             <a:endParaRPr lang="en-US" dirty="0"/>
-          </a:p>
-        </p:txBody>
-      </p:sp>
-      <p:sp>
-        <p:nvSpPr>
-          <p:cNvPr id="4" name="Footer Placeholder 3"/>
-          <p:cNvSpPr>
-            <a:spLocks noGrp="1"/>
-          </p:cNvSpPr>
-          <p:nvPr>
-            <p:ph type="ftr" sz="quarter" idx="11"/>
-          </p:nvPr>
-        </p:nvSpPr>
-        <p:spPr/>
-        <p:txBody>
-          <a:bodyPr/>
-          <a:lstStyle/>
-          <a:p>
-            <a:r>
-              <a:rPr lang="en-US" smtClean="0"/>
-              <a:t>CSE 522S – Advanced Operating Systems</a:t>
-            </a:r>
-            <a:endParaRPr lang="en-US" dirty="0"/>
-          </a:p>
-        </p:txBody>
-      </p:sp>
-      <p:sp>
-        <p:nvSpPr>
-          <p:cNvPr id="5" name="Slide Number Placeholder 4"/>
-          <p:cNvSpPr>
-            <a:spLocks noGrp="1"/>
-          </p:cNvSpPr>
-          <p:nvPr>
-            <p:ph type="sldNum" sz="quarter" idx="12"/>
-          </p:nvPr>
-        </p:nvSpPr>
-        <p:spPr/>
-        <p:txBody>
-          <a:bodyPr/>
-          <a:lstStyle/>
-          <a:p>
-            <a:fld id="{A773B20C-5347-4FF9-A9F0-76F937F60217}" type="slidenum">
-              <a:rPr lang="en-US" smtClean="0"/>
-              <a:pPr/>
-              <a:t>10</a:t>
-            </a:fld>
-            <a:endParaRPr lang="en-US"/>
-          </a:p>
-        </p:txBody>
-      </p:sp>
-      <p:sp>
-        <p:nvSpPr>
-          <p:cNvPr id="7" name="Content Placeholder 6"/>
-          <p:cNvSpPr>
-            <a:spLocks noGrp="1"/>
-          </p:cNvSpPr>
-          <p:nvPr>
-            <p:ph idx="1"/>
-          </p:nvPr>
-        </p:nvSpPr>
-        <p:spPr>
-          <a:xfrm>
-            <a:off x="457200" y="1600200"/>
-            <a:ext cx="4114800" cy="4525963"/>
-          </a:xfrm>
-        </p:spPr>
-        <p:txBody>
-          <a:bodyPr>
-            <a:normAutofit fontScale="92500" lnSpcReduction="10000"/>
-          </a:bodyPr>
-          <a:lstStyle/>
-          <a:p>
-            <a:pPr marL="342900" lvl="1" indent="-342900">
-              <a:buFont typeface="Arial" pitchFamily="34" charset="0"/>
-              <a:buChar char="•"/>
-            </a:pPr>
-            <a:r>
-              <a:rPr lang="en-US" sz="1800" dirty="0"/>
-              <a:t>Initiates </a:t>
-            </a:r>
-            <a:r>
-              <a:rPr lang="en-US" sz="1800" dirty="0" smtClean="0"/>
-              <a:t>all snapshotting operations</a:t>
-            </a:r>
-          </a:p>
-          <a:p>
-            <a:pPr marL="342900" lvl="1" indent="-342900">
-              <a:buFont typeface="Arial" pitchFamily="34" charset="0"/>
-              <a:buChar char="•"/>
-            </a:pPr>
-            <a:r>
-              <a:rPr lang="en-US" sz="1800" dirty="0"/>
-              <a:t>Communicates </a:t>
-            </a:r>
-            <a:r>
-              <a:rPr lang="en-US" sz="1800" dirty="0" smtClean="0"/>
-              <a:t>through </a:t>
-            </a:r>
-            <a:r>
-              <a:rPr lang="en-US" sz="1800" dirty="0" err="1" smtClean="0"/>
-              <a:t>sysfs</a:t>
-            </a:r>
-            <a:r>
-              <a:rPr lang="en-US" sz="1800" dirty="0" smtClean="0"/>
-              <a:t>: </a:t>
-            </a:r>
-            <a:r>
-              <a:rPr lang="en-US" sz="1400" dirty="0"/>
-              <a:t>/sys/kernel/</a:t>
-            </a:r>
-            <a:r>
-              <a:rPr lang="en-US" sz="1400" dirty="0" err="1"/>
-              <a:t>linux_inspect</a:t>
-            </a:r>
-            <a:r>
-              <a:rPr lang="en-US" sz="1400" dirty="0"/>
-              <a:t>/operation</a:t>
-            </a:r>
-            <a:endParaRPr lang="en-US" sz="1800" dirty="0" smtClean="0"/>
-          </a:p>
-          <a:p>
-            <a:pPr marL="342900" lvl="1" indent="-342900">
-              <a:buFont typeface="Arial" pitchFamily="34" charset="0"/>
-              <a:buChar char="•"/>
-            </a:pPr>
-            <a:r>
-              <a:rPr lang="en-US" sz="1800" dirty="0" smtClean="0"/>
-              <a:t>Performs snapshots on processes memory content</a:t>
-            </a:r>
-          </a:p>
-          <a:p>
-            <a:pPr marL="742950" lvl="2" indent="-342900"/>
-            <a:r>
-              <a:rPr lang="en-US" sz="1400" dirty="0" smtClean="0"/>
-              <a:t>/proc/</a:t>
-            </a:r>
-            <a:r>
-              <a:rPr lang="en-US" sz="1400" dirty="0" err="1" smtClean="0"/>
-              <a:t>pid</a:t>
-            </a:r>
-            <a:r>
-              <a:rPr lang="en-US" sz="1400" dirty="0" smtClean="0"/>
-              <a:t>/mem</a:t>
-            </a:r>
-          </a:p>
-          <a:p>
-            <a:pPr marL="742950" lvl="2" indent="-342900"/>
-            <a:r>
-              <a:rPr lang="en-US" sz="1400" dirty="0" smtClean="0"/>
-              <a:t>/proc/</a:t>
-            </a:r>
-            <a:r>
-              <a:rPr lang="en-US" sz="1400" dirty="0" err="1" smtClean="0"/>
-              <a:t>pid</a:t>
-            </a:r>
-            <a:r>
-              <a:rPr lang="en-US" sz="1400" dirty="0" smtClean="0"/>
-              <a:t>/maps</a:t>
-            </a:r>
-          </a:p>
-          <a:p>
-            <a:pPr marL="342900" lvl="1" indent="-342900"/>
-            <a:r>
-              <a:rPr lang="en-US" sz="1800" dirty="0" smtClean="0"/>
-              <a:t>Controls elements included within the snapshot</a:t>
-            </a:r>
-          </a:p>
-          <a:p>
-            <a:pPr marL="742950" lvl="2" indent="-342900"/>
-            <a:r>
-              <a:rPr lang="en-US" sz="1400" dirty="0" smtClean="0"/>
-              <a:t>Task</a:t>
-            </a:r>
-          </a:p>
-          <a:p>
-            <a:pPr marL="742950" lvl="2" indent="-342900"/>
-            <a:r>
-              <a:rPr lang="en-US" sz="1400" dirty="0" smtClean="0"/>
-              <a:t>Mem</a:t>
-            </a:r>
-          </a:p>
-          <a:p>
-            <a:pPr marL="742950" lvl="2" indent="-342900"/>
-            <a:r>
-              <a:rPr lang="en-US" sz="1400" dirty="0" smtClean="0"/>
-              <a:t>…</a:t>
-            </a:r>
-          </a:p>
-          <a:p>
-            <a:pPr marL="342900" lvl="1" indent="-342900"/>
-            <a:r>
-              <a:rPr lang="en-US" sz="1800" dirty="0" smtClean="0"/>
-              <a:t>Supports ability to perform cyclic snapshot operations</a:t>
-            </a:r>
-          </a:p>
-          <a:p>
-            <a:pPr marL="342900" lvl="1" indent="-342900"/>
-            <a:r>
-              <a:rPr lang="en-US" sz="1800" dirty="0" smtClean="0"/>
-              <a:t>Snapshots support analysis through tools such as Meld</a:t>
-            </a:r>
-          </a:p>
-          <a:p>
-            <a:pPr marL="342900" lvl="1" indent="-342900"/>
-            <a:endParaRPr lang="en-US" sz="1800" dirty="0"/>
-          </a:p>
-          <a:p>
-            <a:endParaRPr lang="en-US" sz="2000" dirty="0"/>
           </a:p>
         </p:txBody>
       </p:sp>
       <p:pic>
         <p:nvPicPr>
-          <p:cNvPr id="8" name="Picture 7"/>
+          <p:cNvPr id="7" name="Content Placeholder 6"/>
           <p:cNvPicPr>
-            <a:picLocks noChangeAspect="1"/>
+            <a:picLocks noGrp="1" noChangeAspect="1"/>
           </p:cNvPicPr>
-          <p:nvPr/>
+          <p:nvPr>
+            <p:ph sz="half" idx="2"/>
+          </p:nvPr>
         </p:nvPicPr>
         <p:blipFill>
-          <a:blip r:embed="rId2"/>
+          <a:blip r:embed="rId3"/>
           <a:stretch>
             <a:fillRect/>
           </a:stretch>
         </p:blipFill>
         <p:spPr>
           <a:xfrm>
-            <a:off x="4714875" y="2057400"/>
-            <a:ext cx="3971925" cy="2943225"/>
+            <a:off x="4702338" y="1600200"/>
+            <a:ext cx="3974937" cy="2938527"/>
           </a:xfrm>
           <a:prstGeom prst="rect">
             <a:avLst/>
           </a:prstGeom>
         </p:spPr>
       </p:pic>
+      <p:sp>
+        <p:nvSpPr>
+          <p:cNvPr id="5" name="Footer Placeholder 4"/>
+          <p:cNvSpPr>
+            <a:spLocks noGrp="1"/>
+          </p:cNvSpPr>
+          <p:nvPr>
+            <p:ph type="ftr" sz="quarter" idx="11"/>
+          </p:nvPr>
+        </p:nvSpPr>
+        <p:spPr/>
+        <p:txBody>
+          <a:bodyPr/>
+          <a:lstStyle/>
+          <a:p>
+            <a:r>
+              <a:rPr lang="en-US" smtClean="0"/>
+              <a:t>CSE 522S – Advanced Operating Systems</a:t>
+            </a:r>
+            <a:endParaRPr lang="en-US"/>
+          </a:p>
+        </p:txBody>
+      </p:sp>
+      <p:sp>
+        <p:nvSpPr>
+          <p:cNvPr id="6" name="Slide Number Placeholder 5"/>
+          <p:cNvSpPr>
+            <a:spLocks noGrp="1"/>
+          </p:cNvSpPr>
+          <p:nvPr>
+            <p:ph type="sldNum" sz="quarter" idx="12"/>
+          </p:nvPr>
+        </p:nvSpPr>
+        <p:spPr/>
+        <p:txBody>
+          <a:bodyPr/>
+          <a:lstStyle/>
+          <a:p>
+            <a:fld id="{A773B20C-5347-4FF9-A9F0-76F937F60217}" type="slidenum">
+              <a:rPr lang="en-US" smtClean="0"/>
+              <a:pPr/>
+              <a:t>10</a:t>
+            </a:fld>
+            <a:endParaRPr lang="en-US"/>
+          </a:p>
+        </p:txBody>
+      </p:sp>
     </p:spTree>
     <p:extLst>
       <p:ext uri="{BB962C8B-B14F-4D97-AF65-F5344CB8AC3E}">
-        <p14:creationId xmlns:p14="http://schemas.microsoft.com/office/powerpoint/2010/main" val="2374119210"/>
+        <p14:creationId xmlns:p14="http://schemas.microsoft.com/office/powerpoint/2010/main" val="3815035506"/>
       </p:ext>
     </p:extLst>
   </p:cSld>
@@ -3887,12 +5265,8 @@
           </a:p>
           <a:p>
             <a:r>
-              <a:rPr lang="en-US" sz="1800" dirty="0"/>
-              <a:t>Removes targeted process from run </a:t>
-            </a:r>
-            <a:r>
               <a:rPr lang="en-US" sz="1800" dirty="0" smtClean="0"/>
-              <a:t>queue</a:t>
+              <a:t>Removes targeted process from run queue</a:t>
             </a:r>
           </a:p>
           <a:p>
@@ -3914,14 +5288,6 @@
               <a:rPr lang="en-US" sz="1400" dirty="0" smtClean="0"/>
               <a:t>Mem</a:t>
             </a:r>
-          </a:p>
-          <a:p>
-            <a:pPr lvl="1"/>
-            <a:r>
-              <a:rPr lang="en-US" sz="1400" dirty="0" smtClean="0"/>
-              <a:t>…</a:t>
-            </a:r>
-            <a:endParaRPr lang="en-US" sz="1400" dirty="0"/>
           </a:p>
         </p:txBody>
       </p:sp>
@@ -3981,7 +5347,7 @@
           <p:nvPr/>
         </p:nvPicPr>
         <p:blipFill>
-          <a:blip r:embed="rId2"/>
+          <a:blip r:embed="rId3"/>
           <a:stretch>
             <a:fillRect/>
           </a:stretch>
@@ -4006,6 +5372,13 @@
   <p:clrMapOvr>
     <a:masterClrMapping/>
   </p:clrMapOvr>
+  <p:timing>
+    <p:tnLst>
+      <p:par>
+        <p:cTn id="1" dur="indefinite" restart="never" nodeType="tmRoot"/>
+      </p:par>
+    </p:tnLst>
+  </p:timing>
 </p:sld>
 </file>
 
@@ -4175,36 +5548,36 @@
           </a:p>
         </p:txBody>
       </p:sp>
-      <p:sp>
-        <p:nvSpPr>
-          <p:cNvPr id="6" name="TextBox 5"/>
-          <p:cNvSpPr txBox="1"/>
+      <p:pic>
+        <p:nvPicPr>
+          <p:cNvPr id="7" name="Picture 6"/>
+          <p:cNvPicPr>
+            <a:picLocks noChangeAspect="1"/>
+          </p:cNvPicPr>
           <p:nvPr/>
-        </p:nvSpPr>
+        </p:nvPicPr>
+        <p:blipFill>
+          <a:blip r:embed="rId3" cstate="print">
+            <a:extLst>
+              <a:ext uri="{28A0092B-C50C-407E-A947-70E740481C1C}">
+                <a14:useLocalDpi xmlns:a14="http://schemas.microsoft.com/office/drawing/2010/main" val="0"/>
+              </a:ext>
+            </a:extLst>
+          </a:blip>
+          <a:stretch>
+            <a:fillRect/>
+          </a:stretch>
+        </p:blipFill>
         <p:spPr>
           <a:xfrm>
-            <a:off x="4800600" y="1600200"/>
-            <a:ext cx="3886200" cy="646331"/>
+            <a:off x="4641697" y="2057400"/>
+            <a:ext cx="4007003" cy="2161673"/>
           </a:xfrm>
           <a:prstGeom prst="rect">
             <a:avLst/>
           </a:prstGeom>
-          <a:noFill/>
         </p:spPr>
-        <p:txBody>
-          <a:bodyPr wrap="square" rtlCol="0">
-            <a:spAutoFit/>
-          </a:bodyPr>
-          <a:lstStyle/>
-          <a:p>
-            <a:r>
-              <a:rPr lang="en-US" dirty="0" smtClean="0"/>
-              <a:t>ADD PICTURE HERE SHOWING  A MELD INSTANCE FOR THE TASK STRUCT</a:t>
-            </a:r>
-            <a:endParaRPr lang="en-US" dirty="0"/>
-          </a:p>
-        </p:txBody>
-      </p:sp>
+      </p:pic>
     </p:spTree>
     <p:extLst>
       <p:ext uri="{BB962C8B-B14F-4D97-AF65-F5344CB8AC3E}">
@@ -4215,6 +5588,13 @@
   <p:clrMapOvr>
     <a:masterClrMapping/>
   </p:clrMapOvr>
+  <p:timing>
+    <p:tnLst>
+      <p:par>
+        <p:cTn id="1" dur="indefinite" restart="never" nodeType="tmRoot"/>
+      </p:par>
+    </p:tnLst>
+  </p:timing>
 </p:sld>
 </file>
 
@@ -4370,7 +5750,7 @@
           <p:nvPr/>
         </p:nvPicPr>
         <p:blipFill>
-          <a:blip r:embed="rId2" cstate="print">
+          <a:blip r:embed="rId3" cstate="print">
             <a:extLst>
               <a:ext uri="{28A0092B-C50C-407E-A947-70E740481C1C}">
                 <a14:useLocalDpi xmlns:a14="http://schemas.microsoft.com/office/drawing/2010/main" val="0"/>
@@ -4401,6 +5781,13 @@
   <p:clrMapOvr>
     <a:masterClrMapping/>
   </p:clrMapOvr>
+  <p:timing>
+    <p:tnLst>
+      <p:par>
+        <p:cTn id="1" dur="indefinite" restart="never" nodeType="tmRoot"/>
+      </p:par>
+    </p:tnLst>
+  </p:timing>
 </p:sld>
 </file>
 
@@ -4529,6 +5916,13 @@
   <p:clrMapOvr>
     <a:masterClrMapping/>
   </p:clrMapOvr>
+  <p:timing>
+    <p:tnLst>
+      <p:par>
+        <p:cTn id="1" dur="indefinite" restart="never" nodeType="tmRoot"/>
+      </p:par>
+    </p:tnLst>
+  </p:timing>
 </p:sld>
 </file>
 
@@ -4566,7 +5960,7 @@
           <a:p>
             <a:r>
               <a:rPr lang="en-US" dirty="0" smtClean="0"/>
-              <a:t>Demo</a:t>
+              <a:t>Challenges</a:t>
             </a:r>
             <a:endParaRPr lang="en-US" dirty="0"/>
           </a:p>
@@ -4582,12 +5976,49 @@
             <p:ph idx="1"/>
           </p:nvPr>
         </p:nvSpPr>
-        <p:spPr/>
-        <p:txBody>
-          <a:bodyPr/>
-          <a:lstStyle/>
-          <a:p>
-            <a:endParaRPr lang="en-US" dirty="0"/>
+        <p:spPr>
+          <a:xfrm>
+            <a:off x="457200" y="1219200"/>
+            <a:ext cx="8229600" cy="4525963"/>
+          </a:xfrm>
+        </p:spPr>
+        <p:txBody>
+          <a:bodyPr>
+            <a:normAutofit/>
+          </a:bodyPr>
+          <a:lstStyle/>
+          <a:p>
+            <a:r>
+              <a:rPr lang="en-US" sz="2000" dirty="0" smtClean="0"/>
+              <a:t>Complex and multi-tiered </a:t>
+            </a:r>
+            <a:r>
+              <a:rPr lang="en-US" sz="2000" dirty="0" err="1" smtClean="0"/>
+              <a:t>struct</a:t>
+            </a:r>
+            <a:r>
+              <a:rPr lang="en-US" sz="2000" dirty="0" smtClean="0"/>
+              <a:t> definitions</a:t>
+            </a:r>
+          </a:p>
+          <a:p>
+            <a:r>
+              <a:rPr lang="en-US" sz="2000" dirty="0" smtClean="0"/>
+              <a:t>Breadth of involved kernel sub-systems</a:t>
+            </a:r>
+          </a:p>
+          <a:p>
+            <a:r>
+              <a:rPr lang="en-US" sz="2000" dirty="0" smtClean="0"/>
+              <a:t>Kernel vs Module application programming interface (API)</a:t>
+            </a:r>
+          </a:p>
+          <a:p>
+            <a:r>
+              <a:rPr lang="en-US" sz="2000" dirty="0" smtClean="0"/>
+              <a:t>Lack of kernel API documentation</a:t>
+            </a:r>
+            <a:endParaRPr lang="en-US" sz="2000" dirty="0"/>
           </a:p>
         </p:txBody>
       </p:sp>
@@ -4639,15 +6070,17 @@
         </p:txBody>
       </p:sp>
     </p:spTree>
-    <p:extLst>
-      <p:ext uri="{BB962C8B-B14F-4D97-AF65-F5344CB8AC3E}">
-        <p14:creationId xmlns:p14="http://schemas.microsoft.com/office/powerpoint/2010/main" val="3022129970"/>
-      </p:ext>
-    </p:extLst>
   </p:cSld>
   <p:clrMapOvr>
     <a:masterClrMapping/>
   </p:clrMapOvr>
+  <p:timing>
+    <p:tnLst>
+      <p:par>
+        <p:cTn id="1" dur="indefinite" restart="never" nodeType="tmRoot"/>
+      </p:par>
+    </p:tnLst>
+  </p:timing>
 </p:sld>
 </file>
 
@@ -4685,7 +6118,7 @@
           <a:p>
             <a:r>
               <a:rPr lang="en-US" dirty="0" smtClean="0"/>
-              <a:t>Challenges</a:t>
+              <a:t>Demo</a:t>
             </a:r>
             <a:endParaRPr lang="en-US" dirty="0"/>
           </a:p>
@@ -4701,55 +6134,32 @@
             <p:ph idx="1"/>
           </p:nvPr>
         </p:nvSpPr>
-        <p:spPr>
-          <a:xfrm>
-            <a:off x="457200" y="1219200"/>
-            <a:ext cx="8229600" cy="4525963"/>
-          </a:xfrm>
-        </p:spPr>
-        <p:txBody>
-          <a:bodyPr/>
-          <a:lstStyle/>
-          <a:p>
-            <a:r>
-              <a:rPr lang="en-US" dirty="0" smtClean="0"/>
-              <a:t>Complex </a:t>
-            </a:r>
-            <a:r>
-              <a:rPr lang="en-US" dirty="0" smtClean="0"/>
-              <a:t>and Multi-tiered </a:t>
-            </a:r>
-            <a:r>
-              <a:rPr lang="en-US" dirty="0" err="1" smtClean="0"/>
-              <a:t>struct</a:t>
-            </a:r>
-            <a:r>
-              <a:rPr lang="en-US" dirty="0" smtClean="0"/>
-              <a:t> definitions</a:t>
-            </a:r>
-          </a:p>
-          <a:p>
-            <a:r>
-              <a:rPr lang="en-US" dirty="0" smtClean="0"/>
-              <a:t>Breadth of involved kernel sub-systems</a:t>
-            </a:r>
-          </a:p>
-          <a:p>
-            <a:r>
-              <a:rPr lang="en-US" dirty="0" smtClean="0"/>
-              <a:t>Kernel vs </a:t>
-            </a:r>
-            <a:r>
-              <a:rPr lang="en-US" dirty="0" smtClean="0"/>
-              <a:t>Module</a:t>
-            </a:r>
-          </a:p>
-          <a:p>
-            <a:r>
-              <a:rPr lang="en-US" dirty="0" smtClean="0"/>
-              <a:t>Lack of documentation</a:t>
-            </a:r>
-            <a:endParaRPr lang="en-US" dirty="0"/>
+        <p:spPr/>
+        <p:txBody>
+          <a:bodyPr>
+            <a:normAutofit/>
+          </a:bodyPr>
+          <a:lstStyle/>
+          <a:p>
+            <a:r>
+              <a:rPr lang="en-US" sz="1800" dirty="0" smtClean="0"/>
+              <a:t>Snapshot being performed against bash</a:t>
+            </a:r>
+          </a:p>
+          <a:p>
+            <a:r>
+              <a:rPr lang="en-US" sz="1800" dirty="0" smtClean="0"/>
+              <a:t>“Tskdmp -p &lt;</a:t>
+            </a:r>
+            <a:r>
+              <a:rPr lang="en-US" sz="1800" dirty="0" err="1" smtClean="0"/>
+              <a:t>pid</a:t>
+            </a:r>
+            <a:r>
+              <a:rPr lang="en-US" sz="1800" dirty="0" smtClean="0"/>
+              <a:t>&gt; --task --mem”</a:t>
+            </a:r>
+            <a:endParaRPr lang="en-US" sz="1800" dirty="0"/>
           </a:p>
         </p:txBody>
       </p:sp>
@@ -4801,6 +6211,11 @@
         </p:txBody>
       </p:sp>
     </p:spTree>
+    <p:extLst>
+      <p:ext uri="{BB962C8B-B14F-4D97-AF65-F5344CB8AC3E}">
+        <p14:creationId xmlns:p14="http://schemas.microsoft.com/office/powerpoint/2010/main" val="3022129970"/>
+      </p:ext>
+    </p:extLst>
   </p:cSld>
   <p:clrMapOvr>
     <a:masterClrMapping/>
@@ -4854,7 +6269,7 @@
           <a:p>
             <a:r>
               <a:rPr lang="en-US" dirty="0" smtClean="0"/>
-              <a:t>Questions</a:t>
+              <a:t>Questions?</a:t>
             </a:r>
             <a:endParaRPr lang="en-US" dirty="0"/>
           </a:p>
@@ -4917,6 +6332,13 @@
   <p:clrMapOvr>
     <a:masterClrMapping/>
   </p:clrMapOvr>
+  <p:timing>
+    <p:tnLst>
+      <p:par>
+        <p:cTn id="1" dur="indefinite" restart="never" nodeType="tmRoot"/>
+      </p:par>
+    </p:tnLst>
+  </p:timing>
 </p:sld>
 </file>
 
@@ -5027,7 +6449,7 @@
         </p:spPr>
         <p:txBody>
           <a:bodyPr>
-            <a:normAutofit fontScale="92500" lnSpcReduction="20000"/>
+            <a:normAutofit fontScale="92500"/>
           </a:bodyPr>
           <a:lstStyle/>
           <a:p>
@@ -5040,7 +6462,7 @@
             <a:pPr lvl="1"/>
             <a:r>
               <a:rPr lang="en-US" dirty="0" smtClean="0"/>
-              <a:t>Snapshot process state information as seen by kernel</a:t>
+              <a:t>Snapshot process state </a:t>
             </a:r>
           </a:p>
           <a:p>
@@ -5048,13 +6470,6 @@
             <a:r>
               <a:rPr lang="en-US" dirty="0" smtClean="0"/>
               <a:t>Snapshot process memory (stack, heap, etc..)</a:t>
-            </a:r>
-          </a:p>
-          <a:p>
-            <a:pPr lvl="1"/>
-            <a:r>
-              <a:rPr lang="en-US" dirty="0" smtClean="0"/>
-              <a:t>Snapshot files currently opened by process</a:t>
             </a:r>
           </a:p>
           <a:p>
@@ -5316,7 +6731,7 @@
           <p:nvPr/>
         </p:nvPicPr>
         <p:blipFill>
-          <a:blip r:embed="rId2">
+          <a:blip r:embed="rId3">
             <a:extLst>
               <a:ext uri="{28A0092B-C50C-407E-A947-70E740481C1C}">
                 <a14:useLocalDpi xmlns:a14="http://schemas.microsoft.com/office/drawing/2010/main" val="0"/>
@@ -5415,11 +6830,7 @@
           <a:p>
             <a:r>
               <a:rPr lang="en-US" dirty="0" smtClean="0"/>
-              <a:t>Linux </a:t>
-            </a:r>
-            <a:r>
-              <a:rPr lang="en-US" dirty="0" smtClean="0"/>
-              <a:t>Process</a:t>
+              <a:t>Linux Process</a:t>
             </a:r>
             <a:endParaRPr lang="en-US" dirty="0"/>
           </a:p>
@@ -5585,7 +6996,7 @@
           <p:nvPr/>
         </p:nvPicPr>
         <p:blipFill>
-          <a:blip r:embed="rId2"/>
+          <a:blip r:embed="rId3"/>
           <a:stretch>
             <a:fillRect/>
           </a:stretch>
@@ -5610,6 +7021,13 @@
   <p:clrMapOvr>
     <a:masterClrMapping/>
   </p:clrMapOvr>
+  <p:timing>
+    <p:tnLst>
+      <p:par>
+        <p:cTn id="1" dur="indefinite" restart="never" nodeType="tmRoot"/>
+      </p:par>
+    </p:tnLst>
+  </p:timing>
 </p:sld>
 </file>
 
@@ -5647,11 +7065,7 @@
           <a:p>
             <a:r>
               <a:rPr lang="en-US" dirty="0" smtClean="0"/>
-              <a:t>Linux </a:t>
-            </a:r>
-            <a:r>
-              <a:rPr lang="en-US" dirty="0" smtClean="0"/>
-              <a:t>Address Space</a:t>
+              <a:t>Linux Address Space</a:t>
             </a:r>
             <a:endParaRPr lang="en-US" dirty="0"/>
           </a:p>
@@ -5714,21 +7128,13 @@
           <a:p>
             <a:r>
               <a:rPr lang="en-US" sz="1800" dirty="0" smtClean="0"/>
-              <a:t>Contains atomic usage counters </a:t>
-            </a:r>
+              <a:t>Contains atomic usage counters for synchronization</a:t>
+            </a:r>
+          </a:p>
+          <a:p>
             <a:r>
               <a:rPr lang="en-US" sz="1800" dirty="0" smtClean="0"/>
-              <a:t>for synchronization</a:t>
-            </a:r>
-          </a:p>
-          <a:p>
-            <a:r>
-              <a:rPr lang="en-US" sz="1800" dirty="0" smtClean="0"/>
-              <a:t>Attribute </a:t>
-            </a:r>
-            <a:r>
-              <a:rPr lang="en-US" sz="1800" dirty="0" smtClean="0"/>
-              <a:t>of the </a:t>
+              <a:t>Attribute of the </a:t>
             </a:r>
             <a:r>
               <a:rPr lang="en-US" sz="1800" dirty="0" err="1" smtClean="0"/>
@@ -5736,11 +7142,7 @@
             </a:r>
             <a:r>
               <a:rPr lang="en-US" sz="1800" dirty="0" smtClean="0"/>
-              <a:t> for the associated </a:t>
-            </a:r>
-            <a:r>
-              <a:rPr lang="en-US" sz="1800" dirty="0" smtClean="0"/>
-              <a:t>process</a:t>
+              <a:t> for the associated process</a:t>
             </a:r>
           </a:p>
           <a:p>
@@ -5748,7 +7150,6 @@
               <a:rPr lang="en-US" sz="1800" dirty="0" smtClean="0"/>
               <a:t>Holds reference to page tables to support virtual to physical address translations</a:t>
             </a:r>
-            <a:endParaRPr lang="en-US" sz="1800" dirty="0" smtClean="0"/>
           </a:p>
           <a:p>
             <a:r>
@@ -5819,7 +7220,7 @@
           <p:nvPr/>
         </p:nvPicPr>
         <p:blipFill>
-          <a:blip r:embed="rId2"/>
+          <a:blip r:embed="rId3"/>
           <a:stretch>
             <a:fillRect/>
           </a:stretch>
@@ -5844,6 +7245,13 @@
   <p:clrMapOvr>
     <a:masterClrMapping/>
   </p:clrMapOvr>
+  <p:timing>
+    <p:tnLst>
+      <p:par>
+        <p:cTn id="1" dur="indefinite" restart="never" nodeType="tmRoot"/>
+      </p:par>
+    </p:tnLst>
+  </p:timing>
 </p:sld>
 </file>
 
@@ -5905,7 +7313,7 @@
         </p:spPr>
         <p:txBody>
           <a:bodyPr>
-            <a:normAutofit fontScale="92500" lnSpcReduction="10000"/>
+            <a:normAutofit lnSpcReduction="10000"/>
           </a:bodyPr>
           <a:lstStyle/>
           <a:p>
@@ -5951,13 +7359,6 @@
               <a:rPr lang="en-US" sz="1400" dirty="0" smtClean="0"/>
               <a:t>VM_EXEC</a:t>
             </a:r>
-          </a:p>
-          <a:p>
-            <a:pPr lvl="1"/>
-            <a:r>
-              <a:rPr lang="en-US" sz="1400" dirty="0" smtClean="0"/>
-              <a:t>…</a:t>
-            </a:r>
             <a:endParaRPr lang="en-US" sz="1800" dirty="0" smtClean="0"/>
           </a:p>
           <a:p>
@@ -5998,17 +7399,6 @@
               <a:t>BSS</a:t>
             </a:r>
             <a:endParaRPr lang="en-US" sz="1400" dirty="0"/>
-          </a:p>
-          <a:p>
-            <a:pPr lvl="1"/>
-            <a:r>
-              <a:rPr lang="en-US" sz="1400" dirty="0" smtClean="0"/>
-              <a:t>…</a:t>
-            </a:r>
-            <a:endParaRPr lang="en-US" sz="1400" dirty="0"/>
-          </a:p>
-          <a:p>
-            <a:endParaRPr lang="en-US" sz="1800" dirty="0" smtClean="0"/>
           </a:p>
         </p:txBody>
       </p:sp>
@@ -6068,7 +7458,7 @@
           <p:nvPr/>
         </p:nvPicPr>
         <p:blipFill>
-          <a:blip r:embed="rId2"/>
+          <a:blip r:embed="rId3"/>
           <a:stretch>
             <a:fillRect/>
           </a:stretch>
@@ -6093,6 +7483,13 @@
   <p:clrMapOvr>
     <a:masterClrMapping/>
   </p:clrMapOvr>
+  <p:timing>
+    <p:tnLst>
+      <p:par>
+        <p:cTn id="1" dur="indefinite" restart="never" nodeType="tmRoot"/>
+      </p:par>
+    </p:tnLst>
+  </p:timing>
 </p:sld>
 </file>
 
@@ -8347,6 +9744,13 @@
   <p:clrMapOvr>
     <a:masterClrMapping/>
   </p:clrMapOvr>
+  <p:timing>
+    <p:tnLst>
+      <p:par>
+        <p:cTn id="1" dur="indefinite" restart="never" nodeType="tmRoot"/>
+      </p:par>
+    </p:tnLst>
+  </p:timing>
 </p:sld>
 </file>
 
@@ -8470,6 +9874,13 @@
   <p:clrMapOvr>
     <a:masterClrMapping/>
   </p:clrMapOvr>
+  <p:timing>
+    <p:tnLst>
+      <p:par>
+        <p:cTn id="1" dur="indefinite" restart="never" nodeType="tmRoot"/>
+      </p:par>
+    </p:tnLst>
+  </p:timing>
 </p:sld>
 </file>
 
@@ -8977,7 +10388,6 @@
               <a:rPr lang="en-US" dirty="0" smtClean="0"/>
               <a:t>Initiates snapshot of kernel memory</a:t>
             </a:r>
-            <a:endParaRPr lang="en-US" dirty="0" smtClean="0"/>
           </a:p>
           <a:p>
             <a:pPr lvl="1"/>
@@ -8990,11 +10400,7 @@
             <a:pPr lvl="1"/>
             <a:r>
               <a:rPr lang="en-US" dirty="0" smtClean="0"/>
-              <a:t>Controls </a:t>
-            </a:r>
-            <a:r>
-              <a:rPr lang="en-US" dirty="0" smtClean="0"/>
-              <a:t>exported elements</a:t>
+              <a:t>Controls exported elements</a:t>
             </a:r>
           </a:p>
           <a:p>

</xml_diff>